<commit_message>
agregue nombres y definición de singleton
</commit_message>
<xml_diff>
--- a/Taller Nicolas Hoyos  y Mariana Gomez.pptx
+++ b/Taller Nicolas Hoyos  y Mariana Gomez.pptx
@@ -6,6 +6,7 @@
   </p:sldMasterIdLst>
   <p:sldIdLst>
     <p:sldId id="256" r:id="rId2"/>
+    <p:sldId id="257" r:id="rId3"/>
   </p:sldIdLst>
   <p:sldSz cx="12192000" cy="6858000"/>
   <p:notesSz cx="6858000" cy="9144000"/>
@@ -104,6 +105,11 @@
       </a:defRPr>
     </a:lvl9pPr>
   </p:defaultTextStyle>
+  <p:extLst>
+    <p:ext uri="{EFAFB233-063F-42B5-8137-9DF3F51BA10A}">
+      <p15:sldGuideLst xmlns:p15="http://schemas.microsoft.com/office/powerpoint/2012/main"/>
+    </p:ext>
+  </p:extLst>
 </p:presentation>
 </file>
 
@@ -3364,8 +3370,16 @@
           <a:lstStyle/>
           <a:p>
             <a:r>
+              <a:rPr lang="es-CO" dirty="0"/>
+              <a:t>T</a:t>
+            </a:r>
+            <a:r>
+              <a:rPr lang="es-ES" dirty="0" err="1"/>
+              <a:t>aller</a:t>
+            </a:r>
+            <a:r>
               <a:rPr lang="es-ES" dirty="0"/>
-              <a:t>:p</a:t>
+              <a:t> 2 - Scripting</a:t>
             </a:r>
             <a:endParaRPr lang="es-CO" dirty="0"/>
           </a:p>
@@ -3392,7 +3406,21 @@
           <a:bodyPr/>
           <a:lstStyle/>
           <a:p>
+            <a:r>
+              <a:rPr lang="es-CO" dirty="0"/>
+              <a:t>Mariana </a:t>
+            </a:r>
+            <a:r>
+              <a:rPr lang="es-CO" dirty="0" err="1"/>
+              <a:t>Gomez</a:t>
+            </a:r>
             <a:endParaRPr lang="es-CO" dirty="0"/>
+          </a:p>
+          <a:p>
+            <a:r>
+              <a:rPr lang="es-CO" dirty="0"/>
+              <a:t>Nicolas Hoyos</a:t>
+            </a:r>
           </a:p>
         </p:txBody>
       </p:sp>
@@ -3400,6 +3428,119 @@
     <p:extLst>
       <p:ext uri="{BB962C8B-B14F-4D97-AF65-F5344CB8AC3E}">
         <p14:creationId xmlns:p14="http://schemas.microsoft.com/office/powerpoint/2010/main" val="2780714462"/>
+      </p:ext>
+    </p:extLst>
+  </p:cSld>
+  <p:clrMapOvr>
+    <a:masterClrMapping/>
+  </p:clrMapOvr>
+</p:sld>
+</file>
+
+<file path=ppt/slides/slide2.xml><?xml version="1.0" encoding="utf-8"?>
+<p:sld xmlns:a="http://schemas.openxmlformats.org/drawingml/2006/main" xmlns:r="http://schemas.openxmlformats.org/officeDocument/2006/relationships" xmlns:p="http://schemas.openxmlformats.org/presentationml/2006/main">
+  <p:cSld>
+    <p:spTree>
+      <p:nvGrpSpPr>
+        <p:cNvPr id="1" name=""/>
+        <p:cNvGrpSpPr/>
+        <p:nvPr/>
+      </p:nvGrpSpPr>
+      <p:grpSpPr>
+        <a:xfrm>
+          <a:off x="0" y="0"/>
+          <a:ext cx="0" cy="0"/>
+          <a:chOff x="0" y="0"/>
+          <a:chExt cx="0" cy="0"/>
+        </a:xfrm>
+      </p:grpSpPr>
+      <p:sp>
+        <p:nvSpPr>
+          <p:cNvPr id="2" name="Título 1">
+            <a:extLst>
+              <a:ext uri="{FF2B5EF4-FFF2-40B4-BE49-F238E27FC236}">
+                <a16:creationId xmlns:a16="http://schemas.microsoft.com/office/drawing/2014/main" id="{2ACBD37B-9421-944A-BC2F-5F0DE4CE19B2}"/>
+              </a:ext>
+            </a:extLst>
+          </p:cNvPr>
+          <p:cNvSpPr>
+            <a:spLocks noGrp="1"/>
+          </p:cNvSpPr>
+          <p:nvPr>
+            <p:ph type="title"/>
+          </p:nvPr>
+        </p:nvSpPr>
+        <p:spPr/>
+        <p:txBody>
+          <a:bodyPr/>
+          <a:lstStyle/>
+          <a:p>
+            <a:r>
+              <a:rPr lang="es-CO" dirty="0"/>
+              <a:t>¿Qué es un </a:t>
+            </a:r>
+            <a:r>
+              <a:rPr lang="es-CO" dirty="0" err="1"/>
+              <a:t>singleton</a:t>
+            </a:r>
+            <a:r>
+              <a:rPr lang="es-CO" dirty="0"/>
+              <a:t>?</a:t>
+            </a:r>
+            <a:endParaRPr lang="es-ES" dirty="0"/>
+          </a:p>
+        </p:txBody>
+      </p:sp>
+      <p:sp>
+        <p:nvSpPr>
+          <p:cNvPr id="3" name="Marcador de contenido 2">
+            <a:extLst>
+              <a:ext uri="{FF2B5EF4-FFF2-40B4-BE49-F238E27FC236}">
+                <a16:creationId xmlns:a16="http://schemas.microsoft.com/office/drawing/2014/main" id="{E660050E-060B-A6F4-3173-65DB8A7E656F}"/>
+              </a:ext>
+            </a:extLst>
+          </p:cNvPr>
+          <p:cNvSpPr>
+            <a:spLocks noGrp="1"/>
+          </p:cNvSpPr>
+          <p:nvPr>
+            <p:ph idx="1"/>
+          </p:nvPr>
+        </p:nvSpPr>
+        <p:spPr/>
+        <p:txBody>
+          <a:bodyPr/>
+          <a:lstStyle/>
+          <a:p>
+            <a:r>
+              <a:rPr lang="es-MX" dirty="0"/>
+              <a:t>Un </a:t>
+            </a:r>
+            <a:r>
+              <a:rPr lang="es-MX" dirty="0" err="1"/>
+              <a:t>singleton</a:t>
+            </a:r>
+            <a:r>
+              <a:rPr lang="es-MX" dirty="0"/>
+              <a:t> es un patrón de diseño en programación que garantiza que una clase tenga una única instancia y proporciona un punto de acceso global a esa instancia.</a:t>
+            </a:r>
+          </a:p>
+          <a:p>
+            <a:endParaRPr lang="es-MX" dirty="0"/>
+          </a:p>
+          <a:p>
+            <a:r>
+              <a:rPr lang="es-MX" dirty="0"/>
+              <a:t>Es como tener una única copia de algo importante en tu programa, como un personaje principal en un videojuego.</a:t>
+            </a:r>
+            <a:endParaRPr lang="es-ES" dirty="0"/>
+          </a:p>
+        </p:txBody>
+      </p:sp>
+    </p:spTree>
+    <p:extLst>
+      <p:ext uri="{BB962C8B-B14F-4D97-AF65-F5344CB8AC3E}">
+        <p14:creationId xmlns:p14="http://schemas.microsoft.com/office/powerpoint/2010/main" val="906066510"/>
       </p:ext>
     </p:extLst>
   </p:cSld>

</xml_diff>

<commit_message>
Pros y contras del singleton
</commit_message>
<xml_diff>
--- a/Taller Nicolas Hoyos  y Mariana Gomez.pptx
+++ b/Taller Nicolas Hoyos  y Mariana Gomez.pptx
@@ -7,6 +7,7 @@
   <p:sldIdLst>
     <p:sldId id="256" r:id="rId2"/>
     <p:sldId id="257" r:id="rId3"/>
+    <p:sldId id="258" r:id="rId4"/>
   </p:sldIdLst>
   <p:sldSz cx="12192000" cy="6858000"/>
   <p:notesSz cx="6858000" cy="9144000"/>
@@ -3541,6 +3542,161 @@
     <p:extLst>
       <p:ext uri="{BB962C8B-B14F-4D97-AF65-F5344CB8AC3E}">
         <p14:creationId xmlns:p14="http://schemas.microsoft.com/office/powerpoint/2010/main" val="906066510"/>
+      </p:ext>
+    </p:extLst>
+  </p:cSld>
+  <p:clrMapOvr>
+    <a:masterClrMapping/>
+  </p:clrMapOvr>
+</p:sld>
+</file>
+
+<file path=ppt/slides/slide3.xml><?xml version="1.0" encoding="utf-8"?>
+<p:sld xmlns:a="http://schemas.openxmlformats.org/drawingml/2006/main" xmlns:r="http://schemas.openxmlformats.org/officeDocument/2006/relationships" xmlns:p="http://schemas.openxmlformats.org/presentationml/2006/main">
+  <p:cSld>
+    <p:spTree>
+      <p:nvGrpSpPr>
+        <p:cNvPr id="1" name=""/>
+        <p:cNvGrpSpPr/>
+        <p:nvPr/>
+      </p:nvGrpSpPr>
+      <p:grpSpPr>
+        <a:xfrm>
+          <a:off x="0" y="0"/>
+          <a:ext cx="0" cy="0"/>
+          <a:chOff x="0" y="0"/>
+          <a:chExt cx="0" cy="0"/>
+        </a:xfrm>
+      </p:grpSpPr>
+      <p:sp>
+        <p:nvSpPr>
+          <p:cNvPr id="2" name="Título 1">
+            <a:extLst>
+              <a:ext uri="{FF2B5EF4-FFF2-40B4-BE49-F238E27FC236}">
+                <a16:creationId xmlns:a16="http://schemas.microsoft.com/office/drawing/2014/main" id="{50E76838-37FD-0706-836D-95D53AB000DC}"/>
+              </a:ext>
+            </a:extLst>
+          </p:cNvPr>
+          <p:cNvSpPr>
+            <a:spLocks noGrp="1"/>
+          </p:cNvSpPr>
+          <p:nvPr>
+            <p:ph type="title"/>
+          </p:nvPr>
+        </p:nvSpPr>
+        <p:spPr/>
+        <p:txBody>
+          <a:bodyPr/>
+          <a:lstStyle/>
+          <a:p>
+            <a:r>
+              <a:rPr lang="es-CO" dirty="0"/>
+              <a:t>Pros y contras</a:t>
+            </a:r>
+            <a:endParaRPr lang="es-ES" dirty="0"/>
+          </a:p>
+        </p:txBody>
+      </p:sp>
+      <p:sp>
+        <p:nvSpPr>
+          <p:cNvPr id="3" name="Marcador de contenido 2">
+            <a:extLst>
+              <a:ext uri="{FF2B5EF4-FFF2-40B4-BE49-F238E27FC236}">
+                <a16:creationId xmlns:a16="http://schemas.microsoft.com/office/drawing/2014/main" id="{4E2A4AA7-C574-B03D-0294-ED0EEAA80ACC}"/>
+              </a:ext>
+            </a:extLst>
+          </p:cNvPr>
+          <p:cNvSpPr>
+            <a:spLocks noGrp="1"/>
+          </p:cNvSpPr>
+          <p:nvPr>
+            <p:ph idx="1"/>
+          </p:nvPr>
+        </p:nvSpPr>
+        <p:spPr/>
+        <p:txBody>
+          <a:bodyPr>
+            <a:normAutofit fontScale="85000" lnSpcReduction="20000"/>
+          </a:bodyPr>
+          <a:lstStyle/>
+          <a:p>
+            <a:pPr marL="0" indent="0">
+              <a:buNone/>
+            </a:pPr>
+            <a:r>
+              <a:rPr lang="es-MX" dirty="0"/>
+              <a:t>Pros:</a:t>
+            </a:r>
+          </a:p>
+          <a:p>
+            <a:endParaRPr lang="es-MX" dirty="0"/>
+          </a:p>
+          <a:p>
+            <a:r>
+              <a:rPr lang="es-MX" dirty="0"/>
+              <a:t>Control sobre la instancia única.</a:t>
+            </a:r>
+          </a:p>
+          <a:p>
+            <a:r>
+              <a:rPr lang="es-MX" dirty="0"/>
+              <a:t>Acceso global y fácil a la instancia.</a:t>
+            </a:r>
+          </a:p>
+          <a:p>
+            <a:r>
+              <a:rPr lang="es-MX" dirty="0"/>
+              <a:t>Eficiencia al crear la instancia solo cuando sea necesaria.</a:t>
+            </a:r>
+          </a:p>
+          <a:p>
+            <a:endParaRPr lang="es-MX" dirty="0"/>
+          </a:p>
+          <a:p>
+            <a:pPr marL="0" indent="0">
+              <a:buNone/>
+            </a:pPr>
+            <a:r>
+              <a:rPr lang="es-MX" dirty="0"/>
+              <a:t>Contras:</a:t>
+            </a:r>
+          </a:p>
+          <a:p>
+            <a:endParaRPr lang="es-MX" dirty="0"/>
+          </a:p>
+          <a:p>
+            <a:r>
+              <a:rPr lang="es-MX" dirty="0"/>
+              <a:t>Puede introducir acoplamiento fuerte en el código.</a:t>
+            </a:r>
+          </a:p>
+          <a:p>
+            <a:r>
+              <a:rPr lang="es-MX" dirty="0"/>
+              <a:t>Dificulta las pruebas unitarias debido al acceso global.</a:t>
+            </a:r>
+          </a:p>
+          <a:p>
+            <a:r>
+              <a:rPr lang="es-MX" dirty="0"/>
+              <a:t>Puede causar problemas de concurrencia en aplicaciones </a:t>
+            </a:r>
+            <a:r>
+              <a:rPr lang="es-MX" dirty="0" err="1"/>
+              <a:t>multi-hilo</a:t>
+            </a:r>
+            <a:r>
+              <a:rPr lang="es-MX" dirty="0"/>
+              <a:t>.</a:t>
+            </a:r>
+            <a:endParaRPr lang="es-ES" dirty="0"/>
+          </a:p>
+        </p:txBody>
+      </p:sp>
+    </p:spTree>
+    <p:extLst>
+      <p:ext uri="{BB962C8B-B14F-4D97-AF65-F5344CB8AC3E}">
+        <p14:creationId xmlns:p14="http://schemas.microsoft.com/office/powerpoint/2010/main" val="258026721"/>
       </p:ext>
     </p:extLst>
   </p:cSld>

</xml_diff>

<commit_message>
implementación de singleton en C# y unity
</commit_message>
<xml_diff>
--- a/Taller Nicolas Hoyos  y Mariana Gomez.pptx
+++ b/Taller Nicolas Hoyos  y Mariana Gomez.pptx
@@ -8,6 +8,7 @@
     <p:sldId id="256" r:id="rId2"/>
     <p:sldId id="257" r:id="rId3"/>
     <p:sldId id="258" r:id="rId4"/>
+    <p:sldId id="259" r:id="rId5"/>
   </p:sldIdLst>
   <p:sldSz cx="12192000" cy="6858000"/>
   <p:notesSz cx="6858000" cy="9144000"/>
@@ -263,7 +264,7 @@
           <a:p>
             <a:fld id="{9CD7C0FA-D301-4C61-8805-33DE22883747}" type="datetimeFigureOut">
               <a:rPr lang="es-CO" smtClean="0"/>
-              <a:t>11/04/2024</a:t>
+              <a:t>12/04/2024</a:t>
             </a:fld>
             <a:endParaRPr lang="es-CO"/>
           </a:p>
@@ -463,7 +464,7 @@
           <a:p>
             <a:fld id="{9CD7C0FA-D301-4C61-8805-33DE22883747}" type="datetimeFigureOut">
               <a:rPr lang="es-CO" smtClean="0"/>
-              <a:t>11/04/2024</a:t>
+              <a:t>12/04/2024</a:t>
             </a:fld>
             <a:endParaRPr lang="es-CO"/>
           </a:p>
@@ -673,7 +674,7 @@
           <a:p>
             <a:fld id="{9CD7C0FA-D301-4C61-8805-33DE22883747}" type="datetimeFigureOut">
               <a:rPr lang="es-CO" smtClean="0"/>
-              <a:t>11/04/2024</a:t>
+              <a:t>12/04/2024</a:t>
             </a:fld>
             <a:endParaRPr lang="es-CO"/>
           </a:p>
@@ -873,7 +874,7 @@
           <a:p>
             <a:fld id="{9CD7C0FA-D301-4C61-8805-33DE22883747}" type="datetimeFigureOut">
               <a:rPr lang="es-CO" smtClean="0"/>
-              <a:t>11/04/2024</a:t>
+              <a:t>12/04/2024</a:t>
             </a:fld>
             <a:endParaRPr lang="es-CO"/>
           </a:p>
@@ -1149,7 +1150,7 @@
           <a:p>
             <a:fld id="{9CD7C0FA-D301-4C61-8805-33DE22883747}" type="datetimeFigureOut">
               <a:rPr lang="es-CO" smtClean="0"/>
-              <a:t>11/04/2024</a:t>
+              <a:t>12/04/2024</a:t>
             </a:fld>
             <a:endParaRPr lang="es-CO"/>
           </a:p>
@@ -1417,7 +1418,7 @@
           <a:p>
             <a:fld id="{9CD7C0FA-D301-4C61-8805-33DE22883747}" type="datetimeFigureOut">
               <a:rPr lang="es-CO" smtClean="0"/>
-              <a:t>11/04/2024</a:t>
+              <a:t>12/04/2024</a:t>
             </a:fld>
             <a:endParaRPr lang="es-CO"/>
           </a:p>
@@ -1832,7 +1833,7 @@
           <a:p>
             <a:fld id="{9CD7C0FA-D301-4C61-8805-33DE22883747}" type="datetimeFigureOut">
               <a:rPr lang="es-CO" smtClean="0"/>
-              <a:t>11/04/2024</a:t>
+              <a:t>12/04/2024</a:t>
             </a:fld>
             <a:endParaRPr lang="es-CO"/>
           </a:p>
@@ -1974,7 +1975,7 @@
           <a:p>
             <a:fld id="{9CD7C0FA-D301-4C61-8805-33DE22883747}" type="datetimeFigureOut">
               <a:rPr lang="es-CO" smtClean="0"/>
-              <a:t>11/04/2024</a:t>
+              <a:t>12/04/2024</a:t>
             </a:fld>
             <a:endParaRPr lang="es-CO"/>
           </a:p>
@@ -2087,7 +2088,7 @@
           <a:p>
             <a:fld id="{9CD7C0FA-D301-4C61-8805-33DE22883747}" type="datetimeFigureOut">
               <a:rPr lang="es-CO" smtClean="0"/>
-              <a:t>11/04/2024</a:t>
+              <a:t>12/04/2024</a:t>
             </a:fld>
             <a:endParaRPr lang="es-CO"/>
           </a:p>
@@ -2400,7 +2401,7 @@
           <a:p>
             <a:fld id="{9CD7C0FA-D301-4C61-8805-33DE22883747}" type="datetimeFigureOut">
               <a:rPr lang="es-CO" smtClean="0"/>
-              <a:t>11/04/2024</a:t>
+              <a:t>12/04/2024</a:t>
             </a:fld>
             <a:endParaRPr lang="es-CO"/>
           </a:p>
@@ -2689,7 +2690,7 @@
           <a:p>
             <a:fld id="{9CD7C0FA-D301-4C61-8805-33DE22883747}" type="datetimeFigureOut">
               <a:rPr lang="es-CO" smtClean="0"/>
-              <a:t>11/04/2024</a:t>
+              <a:t>12/04/2024</a:t>
             </a:fld>
             <a:endParaRPr lang="es-CO"/>
           </a:p>
@@ -2932,7 +2933,7 @@
           <a:p>
             <a:fld id="{9CD7C0FA-D301-4C61-8805-33DE22883747}" type="datetimeFigureOut">
               <a:rPr lang="es-CO" smtClean="0"/>
-              <a:t>11/04/2024</a:t>
+              <a:t>12/04/2024</a:t>
             </a:fld>
             <a:endParaRPr lang="es-CO"/>
           </a:p>
@@ -3697,6 +3698,119 @@
     <p:extLst>
       <p:ext uri="{BB962C8B-B14F-4D97-AF65-F5344CB8AC3E}">
         <p14:creationId xmlns:p14="http://schemas.microsoft.com/office/powerpoint/2010/main" val="258026721"/>
+      </p:ext>
+    </p:extLst>
+  </p:cSld>
+  <p:clrMapOvr>
+    <a:masterClrMapping/>
+  </p:clrMapOvr>
+</p:sld>
+</file>
+
+<file path=ppt/slides/slide4.xml><?xml version="1.0" encoding="utf-8"?>
+<p:sld xmlns:a="http://schemas.openxmlformats.org/drawingml/2006/main" xmlns:r="http://schemas.openxmlformats.org/officeDocument/2006/relationships" xmlns:p="http://schemas.openxmlformats.org/presentationml/2006/main">
+  <p:cSld>
+    <p:spTree>
+      <p:nvGrpSpPr>
+        <p:cNvPr id="1" name=""/>
+        <p:cNvGrpSpPr/>
+        <p:nvPr/>
+      </p:nvGrpSpPr>
+      <p:grpSpPr>
+        <a:xfrm>
+          <a:off x="0" y="0"/>
+          <a:ext cx="0" cy="0"/>
+          <a:chOff x="0" y="0"/>
+          <a:chExt cx="0" cy="0"/>
+        </a:xfrm>
+      </p:grpSpPr>
+      <p:sp>
+        <p:nvSpPr>
+          <p:cNvPr id="2" name="Título 1">
+            <a:extLst>
+              <a:ext uri="{FF2B5EF4-FFF2-40B4-BE49-F238E27FC236}">
+                <a16:creationId xmlns:a16="http://schemas.microsoft.com/office/drawing/2014/main" id="{9F4E8EB3-1FD5-9A22-447F-EBDA8135DEDB}"/>
+              </a:ext>
+            </a:extLst>
+          </p:cNvPr>
+          <p:cNvSpPr>
+            <a:spLocks noGrp="1"/>
+          </p:cNvSpPr>
+          <p:nvPr>
+            <p:ph type="title"/>
+          </p:nvPr>
+        </p:nvSpPr>
+        <p:spPr/>
+        <p:txBody>
+          <a:bodyPr/>
+          <a:lstStyle/>
+          <a:p>
+            <a:r>
+              <a:rPr lang="es-CO" dirty="0"/>
+              <a:t>Implementación en C# y Unity</a:t>
+            </a:r>
+            <a:endParaRPr lang="es-ES" dirty="0"/>
+          </a:p>
+        </p:txBody>
+      </p:sp>
+      <p:sp>
+        <p:nvSpPr>
+          <p:cNvPr id="3" name="Marcador de contenido 2">
+            <a:extLst>
+              <a:ext uri="{FF2B5EF4-FFF2-40B4-BE49-F238E27FC236}">
+                <a16:creationId xmlns:a16="http://schemas.microsoft.com/office/drawing/2014/main" id="{A67115E6-AA6E-EACE-5908-9C85F34F9C07}"/>
+              </a:ext>
+            </a:extLst>
+          </p:cNvPr>
+          <p:cNvSpPr>
+            <a:spLocks noGrp="1"/>
+          </p:cNvSpPr>
+          <p:nvPr>
+            <p:ph idx="1"/>
+          </p:nvPr>
+        </p:nvSpPr>
+        <p:spPr/>
+        <p:txBody>
+          <a:bodyPr/>
+          <a:lstStyle/>
+          <a:p>
+            <a:r>
+              <a:rPr lang="es-MX" dirty="0"/>
+              <a:t>En C#, implementar un </a:t>
+            </a:r>
+            <a:r>
+              <a:rPr lang="es-MX" dirty="0" err="1"/>
+              <a:t>singleton</a:t>
+            </a:r>
+            <a:r>
+              <a:rPr lang="es-MX" dirty="0"/>
+              <a:t> significa crear una clase que solo pueda tener una instancia, y luego permitir que otras partes del código accedan a esa instancia única cuando la necesiten.</a:t>
+            </a:r>
+          </a:p>
+          <a:p>
+            <a:endParaRPr lang="es-MX" dirty="0"/>
+          </a:p>
+          <a:p>
+            <a:r>
+              <a:rPr lang="es-MX" dirty="0"/>
+              <a:t>En Unity, que usa C# para programar juegos, puedes usar </a:t>
+            </a:r>
+            <a:r>
+              <a:rPr lang="es-MX" dirty="0" err="1"/>
+              <a:t>singletons</a:t>
+            </a:r>
+            <a:r>
+              <a:rPr lang="es-MX" dirty="0"/>
+              <a:t> para controlar aspectos clave del juego, como la gestión del progreso o la interfaz del usuario.</a:t>
+            </a:r>
+            <a:endParaRPr lang="es-ES" dirty="0"/>
+          </a:p>
+        </p:txBody>
+      </p:sp>
+    </p:spTree>
+    <p:extLst>
+      <p:ext uri="{BB962C8B-B14F-4D97-AF65-F5344CB8AC3E}">
+        <p14:creationId xmlns:p14="http://schemas.microsoft.com/office/powerpoint/2010/main" val="2102172699"/>
       </p:ext>
     </p:extLst>
   </p:cSld>

</xml_diff>

<commit_message>
agregada explicación de patrón y principio
</commit_message>
<xml_diff>
--- a/Taller Nicolas Hoyos  y Mariana Gomez.pptx
+++ b/Taller Nicolas Hoyos  y Mariana Gomez.pptx
@@ -9,6 +9,7 @@
     <p:sldId id="257" r:id="rId3"/>
     <p:sldId id="258" r:id="rId4"/>
     <p:sldId id="259" r:id="rId5"/>
+    <p:sldId id="260" r:id="rId6"/>
   </p:sldIdLst>
   <p:sldSz cx="12192000" cy="6858000"/>
   <p:notesSz cx="6858000" cy="9144000"/>
@@ -3811,6 +3812,377 @@
     <p:extLst>
       <p:ext uri="{BB962C8B-B14F-4D97-AF65-F5344CB8AC3E}">
         <p14:creationId xmlns:p14="http://schemas.microsoft.com/office/powerpoint/2010/main" val="2102172699"/>
+      </p:ext>
+    </p:extLst>
+  </p:cSld>
+  <p:clrMapOvr>
+    <a:masterClrMapping/>
+  </p:clrMapOvr>
+</p:sld>
+</file>
+
+<file path=ppt/slides/slide5.xml><?xml version="1.0" encoding="utf-8"?>
+<p:sld xmlns:a="http://schemas.openxmlformats.org/drawingml/2006/main" xmlns:r="http://schemas.openxmlformats.org/officeDocument/2006/relationships" xmlns:p="http://schemas.openxmlformats.org/presentationml/2006/main">
+  <p:cSld>
+    <p:spTree>
+      <p:nvGrpSpPr>
+        <p:cNvPr id="1" name=""/>
+        <p:cNvGrpSpPr/>
+        <p:nvPr/>
+      </p:nvGrpSpPr>
+      <p:grpSpPr>
+        <a:xfrm>
+          <a:off x="0" y="0"/>
+          <a:ext cx="0" cy="0"/>
+          <a:chOff x="0" y="0"/>
+          <a:chExt cx="0" cy="0"/>
+        </a:xfrm>
+      </p:grpSpPr>
+      <p:sp>
+        <p:nvSpPr>
+          <p:cNvPr id="2" name="Título 1">
+            <a:extLst>
+              <a:ext uri="{FF2B5EF4-FFF2-40B4-BE49-F238E27FC236}">
+                <a16:creationId xmlns:a16="http://schemas.microsoft.com/office/drawing/2014/main" id="{DBA034C8-5124-580F-76C7-19523DAF5B57}"/>
+              </a:ext>
+            </a:extLst>
+          </p:cNvPr>
+          <p:cNvSpPr>
+            <a:spLocks noGrp="1"/>
+          </p:cNvSpPr>
+          <p:nvPr>
+            <p:ph type="title"/>
+          </p:nvPr>
+        </p:nvSpPr>
+        <p:spPr/>
+        <p:txBody>
+          <a:bodyPr/>
+          <a:lstStyle/>
+          <a:p>
+            <a:r>
+              <a:rPr lang="es-CO" dirty="0"/>
+              <a:t>Patrón de Diseño (</a:t>
+            </a:r>
+            <a:r>
+              <a:rPr lang="es-CO" dirty="0" err="1"/>
+              <a:t>Strategy</a:t>
+            </a:r>
+            <a:r>
+              <a:rPr lang="es-CO" dirty="0"/>
+              <a:t>):</a:t>
+            </a:r>
+            <a:endParaRPr lang="es-ES" dirty="0"/>
+          </a:p>
+        </p:txBody>
+      </p:sp>
+      <p:sp>
+        <p:nvSpPr>
+          <p:cNvPr id="3" name="Marcador de contenido 2">
+            <a:extLst>
+              <a:ext uri="{FF2B5EF4-FFF2-40B4-BE49-F238E27FC236}">
+                <a16:creationId xmlns:a16="http://schemas.microsoft.com/office/drawing/2014/main" id="{D60EFCCB-B474-4218-DEF3-90C2D1385C8E}"/>
+              </a:ext>
+            </a:extLst>
+          </p:cNvPr>
+          <p:cNvSpPr>
+            <a:spLocks noGrp="1"/>
+          </p:cNvSpPr>
+          <p:nvPr>
+            <p:ph idx="1"/>
+          </p:nvPr>
+        </p:nvSpPr>
+        <p:spPr>
+          <a:xfrm>
+            <a:off x="838200" y="1825625"/>
+            <a:ext cx="10515600" cy="1222375"/>
+          </a:xfrm>
+        </p:spPr>
+        <p:txBody>
+          <a:bodyPr>
+            <a:normAutofit lnSpcReduction="10000"/>
+          </a:bodyPr>
+          <a:lstStyle/>
+          <a:p>
+            <a:r>
+              <a:rPr lang="es-MX" dirty="0"/>
+              <a:t>El patrón de diseño </a:t>
+            </a:r>
+            <a:r>
+              <a:rPr lang="es-MX" dirty="0" err="1"/>
+              <a:t>Strategy</a:t>
+            </a:r>
+            <a:r>
+              <a:rPr lang="es-MX" dirty="0"/>
+              <a:t> es un patrón de comportamiento que permite definir una familia de algoritmos, encapsular cada uno de ellos y hacerlos intercambiables.</a:t>
+            </a:r>
+            <a:endParaRPr lang="es-ES" dirty="0"/>
+          </a:p>
+        </p:txBody>
+      </p:sp>
+      <p:sp>
+        <p:nvSpPr>
+          <p:cNvPr id="4" name="Título 1">
+            <a:extLst>
+              <a:ext uri="{FF2B5EF4-FFF2-40B4-BE49-F238E27FC236}">
+                <a16:creationId xmlns:a16="http://schemas.microsoft.com/office/drawing/2014/main" id="{1589F89B-8383-7548-32AB-F2B740EF8EEF}"/>
+              </a:ext>
+            </a:extLst>
+          </p:cNvPr>
+          <p:cNvSpPr txBox="1">
+            <a:spLocks/>
+          </p:cNvSpPr>
+          <p:nvPr/>
+        </p:nvSpPr>
+        <p:spPr>
+          <a:xfrm>
+            <a:off x="838200" y="3048000"/>
+            <a:ext cx="10515600" cy="1325563"/>
+          </a:xfrm>
+          <a:prstGeom prst="rect">
+            <a:avLst/>
+          </a:prstGeom>
+        </p:spPr>
+        <p:txBody>
+          <a:bodyPr vert="horz" lIns="91440" tIns="45720" rIns="91440" bIns="45720" rtlCol="0" anchor="ctr">
+            <a:normAutofit/>
+          </a:bodyPr>
+          <a:lstStyle>
+            <a:lvl1pPr algn="l" defTabSz="914400" rtl="0" eaLnBrk="1" latinLnBrk="0" hangingPunct="1">
+              <a:lnSpc>
+                <a:spcPct val="90000"/>
+              </a:lnSpc>
+              <a:spcBef>
+                <a:spcPct val="0"/>
+              </a:spcBef>
+              <a:buNone/>
+              <a:defRPr sz="4400" kern="1200">
+                <a:solidFill>
+                  <a:schemeClr val="tx1"/>
+                </a:solidFill>
+                <a:latin typeface="+mj-lt"/>
+                <a:ea typeface="+mj-ea"/>
+                <a:cs typeface="+mj-cs"/>
+              </a:defRPr>
+            </a:lvl1pPr>
+          </a:lstStyle>
+          <a:p>
+            <a:r>
+              <a:rPr lang="es-CO" dirty="0"/>
+              <a:t>Principio de Responsabilidad Única (SRP):</a:t>
+            </a:r>
+            <a:endParaRPr lang="es-ES" dirty="0"/>
+          </a:p>
+        </p:txBody>
+      </p:sp>
+      <p:sp>
+        <p:nvSpPr>
+          <p:cNvPr id="5" name="Marcador de contenido 2">
+            <a:extLst>
+              <a:ext uri="{FF2B5EF4-FFF2-40B4-BE49-F238E27FC236}">
+                <a16:creationId xmlns:a16="http://schemas.microsoft.com/office/drawing/2014/main" id="{244C968B-D255-486E-741E-16D86927B054}"/>
+              </a:ext>
+            </a:extLst>
+          </p:cNvPr>
+          <p:cNvSpPr txBox="1">
+            <a:spLocks/>
+          </p:cNvSpPr>
+          <p:nvPr/>
+        </p:nvSpPr>
+        <p:spPr>
+          <a:xfrm>
+            <a:off x="838200" y="4508500"/>
+            <a:ext cx="10515600" cy="1222375"/>
+          </a:xfrm>
+          <a:prstGeom prst="rect">
+            <a:avLst/>
+          </a:prstGeom>
+        </p:spPr>
+        <p:txBody>
+          <a:bodyPr vert="horz" lIns="91440" tIns="45720" rIns="91440" bIns="45720" rtlCol="0">
+            <a:normAutofit/>
+          </a:bodyPr>
+          <a:lstStyle>
+            <a:lvl1pPr marL="228600" indent="-228600" algn="l" defTabSz="914400" rtl="0" eaLnBrk="1" latinLnBrk="0" hangingPunct="1">
+              <a:lnSpc>
+                <a:spcPct val="90000"/>
+              </a:lnSpc>
+              <a:spcBef>
+                <a:spcPts val="1000"/>
+              </a:spcBef>
+              <a:buFont typeface="Arial" panose="020B0604020202020204" pitchFamily="34" charset="0"/>
+              <a:buChar char="•"/>
+              <a:defRPr sz="2800" kern="1200">
+                <a:solidFill>
+                  <a:schemeClr val="tx1"/>
+                </a:solidFill>
+                <a:latin typeface="+mn-lt"/>
+                <a:ea typeface="+mn-ea"/>
+                <a:cs typeface="+mn-cs"/>
+              </a:defRPr>
+            </a:lvl1pPr>
+            <a:lvl2pPr marL="685800" indent="-228600" algn="l" defTabSz="914400" rtl="0" eaLnBrk="1" latinLnBrk="0" hangingPunct="1">
+              <a:lnSpc>
+                <a:spcPct val="90000"/>
+              </a:lnSpc>
+              <a:spcBef>
+                <a:spcPts val="500"/>
+              </a:spcBef>
+              <a:buFont typeface="Arial" panose="020B0604020202020204" pitchFamily="34" charset="0"/>
+              <a:buChar char="•"/>
+              <a:defRPr sz="2400" kern="1200">
+                <a:solidFill>
+                  <a:schemeClr val="tx1"/>
+                </a:solidFill>
+                <a:latin typeface="+mn-lt"/>
+                <a:ea typeface="+mn-ea"/>
+                <a:cs typeface="+mn-cs"/>
+              </a:defRPr>
+            </a:lvl2pPr>
+            <a:lvl3pPr marL="1143000" indent="-228600" algn="l" defTabSz="914400" rtl="0" eaLnBrk="1" latinLnBrk="0" hangingPunct="1">
+              <a:lnSpc>
+                <a:spcPct val="90000"/>
+              </a:lnSpc>
+              <a:spcBef>
+                <a:spcPts val="500"/>
+              </a:spcBef>
+              <a:buFont typeface="Arial" panose="020B0604020202020204" pitchFamily="34" charset="0"/>
+              <a:buChar char="•"/>
+              <a:defRPr sz="2000" kern="1200">
+                <a:solidFill>
+                  <a:schemeClr val="tx1"/>
+                </a:solidFill>
+                <a:latin typeface="+mn-lt"/>
+                <a:ea typeface="+mn-ea"/>
+                <a:cs typeface="+mn-cs"/>
+              </a:defRPr>
+            </a:lvl3pPr>
+            <a:lvl4pPr marL="1600200" indent="-228600" algn="l" defTabSz="914400" rtl="0" eaLnBrk="1" latinLnBrk="0" hangingPunct="1">
+              <a:lnSpc>
+                <a:spcPct val="90000"/>
+              </a:lnSpc>
+              <a:spcBef>
+                <a:spcPts val="500"/>
+              </a:spcBef>
+              <a:buFont typeface="Arial" panose="020B0604020202020204" pitchFamily="34" charset="0"/>
+              <a:buChar char="•"/>
+              <a:defRPr sz="1800" kern="1200">
+                <a:solidFill>
+                  <a:schemeClr val="tx1"/>
+                </a:solidFill>
+                <a:latin typeface="+mn-lt"/>
+                <a:ea typeface="+mn-ea"/>
+                <a:cs typeface="+mn-cs"/>
+              </a:defRPr>
+            </a:lvl4pPr>
+            <a:lvl5pPr marL="2057400" indent="-228600" algn="l" defTabSz="914400" rtl="0" eaLnBrk="1" latinLnBrk="0" hangingPunct="1">
+              <a:lnSpc>
+                <a:spcPct val="90000"/>
+              </a:lnSpc>
+              <a:spcBef>
+                <a:spcPts val="500"/>
+              </a:spcBef>
+              <a:buFont typeface="Arial" panose="020B0604020202020204" pitchFamily="34" charset="0"/>
+              <a:buChar char="•"/>
+              <a:defRPr sz="1800" kern="1200">
+                <a:solidFill>
+                  <a:schemeClr val="tx1"/>
+                </a:solidFill>
+                <a:latin typeface="+mn-lt"/>
+                <a:ea typeface="+mn-ea"/>
+                <a:cs typeface="+mn-cs"/>
+              </a:defRPr>
+            </a:lvl5pPr>
+            <a:lvl6pPr marL="2514600" indent="-228600" algn="l" defTabSz="914400" rtl="0" eaLnBrk="1" latinLnBrk="0" hangingPunct="1">
+              <a:lnSpc>
+                <a:spcPct val="90000"/>
+              </a:lnSpc>
+              <a:spcBef>
+                <a:spcPts val="500"/>
+              </a:spcBef>
+              <a:buFont typeface="Arial" panose="020B0604020202020204" pitchFamily="34" charset="0"/>
+              <a:buChar char="•"/>
+              <a:defRPr sz="1800" kern="1200">
+                <a:solidFill>
+                  <a:schemeClr val="tx1"/>
+                </a:solidFill>
+                <a:latin typeface="+mn-lt"/>
+                <a:ea typeface="+mn-ea"/>
+                <a:cs typeface="+mn-cs"/>
+              </a:defRPr>
+            </a:lvl6pPr>
+            <a:lvl7pPr marL="2971800" indent="-228600" algn="l" defTabSz="914400" rtl="0" eaLnBrk="1" latinLnBrk="0" hangingPunct="1">
+              <a:lnSpc>
+                <a:spcPct val="90000"/>
+              </a:lnSpc>
+              <a:spcBef>
+                <a:spcPts val="500"/>
+              </a:spcBef>
+              <a:buFont typeface="Arial" panose="020B0604020202020204" pitchFamily="34" charset="0"/>
+              <a:buChar char="•"/>
+              <a:defRPr sz="1800" kern="1200">
+                <a:solidFill>
+                  <a:schemeClr val="tx1"/>
+                </a:solidFill>
+                <a:latin typeface="+mn-lt"/>
+                <a:ea typeface="+mn-ea"/>
+                <a:cs typeface="+mn-cs"/>
+              </a:defRPr>
+            </a:lvl7pPr>
+            <a:lvl8pPr marL="3429000" indent="-228600" algn="l" defTabSz="914400" rtl="0" eaLnBrk="1" latinLnBrk="0" hangingPunct="1">
+              <a:lnSpc>
+                <a:spcPct val="90000"/>
+              </a:lnSpc>
+              <a:spcBef>
+                <a:spcPts val="500"/>
+              </a:spcBef>
+              <a:buFont typeface="Arial" panose="020B0604020202020204" pitchFamily="34" charset="0"/>
+              <a:buChar char="•"/>
+              <a:defRPr sz="1800" kern="1200">
+                <a:solidFill>
+                  <a:schemeClr val="tx1"/>
+                </a:solidFill>
+                <a:latin typeface="+mn-lt"/>
+                <a:ea typeface="+mn-ea"/>
+                <a:cs typeface="+mn-cs"/>
+              </a:defRPr>
+            </a:lvl8pPr>
+            <a:lvl9pPr marL="3886200" indent="-228600" algn="l" defTabSz="914400" rtl="0" eaLnBrk="1" latinLnBrk="0" hangingPunct="1">
+              <a:lnSpc>
+                <a:spcPct val="90000"/>
+              </a:lnSpc>
+              <a:spcBef>
+                <a:spcPts val="500"/>
+              </a:spcBef>
+              <a:buFont typeface="Arial" panose="020B0604020202020204" pitchFamily="34" charset="0"/>
+              <a:buChar char="•"/>
+              <a:defRPr sz="1800" kern="1200">
+                <a:solidFill>
+                  <a:schemeClr val="tx1"/>
+                </a:solidFill>
+                <a:latin typeface="+mn-lt"/>
+                <a:ea typeface="+mn-ea"/>
+                <a:cs typeface="+mn-cs"/>
+              </a:defRPr>
+            </a:lvl9pPr>
+          </a:lstStyle>
+          <a:p>
+            <a:r>
+              <a:rPr lang="es-MX" dirty="0"/>
+              <a:t>El principio de responsabilidad única establece que una clase debe tener solo una razón para cambia.</a:t>
+            </a:r>
+          </a:p>
+          <a:p>
+            <a:pPr marL="0" indent="0">
+              <a:buNone/>
+            </a:pPr>
+            <a:endParaRPr lang="es-ES" dirty="0"/>
+          </a:p>
+        </p:txBody>
+      </p:sp>
+    </p:spTree>
+    <p:extLst>
+      <p:ext uri="{BB962C8B-B14F-4D97-AF65-F5344CB8AC3E}">
+        <p14:creationId xmlns:p14="http://schemas.microsoft.com/office/powerpoint/2010/main" val="1289437389"/>
       </p:ext>
     </p:extLst>
   </p:cSld>

</xml_diff>

<commit_message>
diagrama de clases de patrón y principio
</commit_message>
<xml_diff>
--- a/Taller Nicolas Hoyos  y Mariana Gomez.pptx
+++ b/Taller Nicolas Hoyos  y Mariana Gomez.pptx
@@ -10,6 +10,7 @@
     <p:sldId id="258" r:id="rId4"/>
     <p:sldId id="259" r:id="rId5"/>
     <p:sldId id="260" r:id="rId6"/>
+    <p:sldId id="261" r:id="rId7"/>
   </p:sldIdLst>
   <p:sldSz cx="12192000" cy="6858000"/>
   <p:notesSz cx="6858000" cy="9144000"/>
@@ -4183,6 +4184,112 @@
     <p:extLst>
       <p:ext uri="{BB962C8B-B14F-4D97-AF65-F5344CB8AC3E}">
         <p14:creationId xmlns:p14="http://schemas.microsoft.com/office/powerpoint/2010/main" val="1289437389"/>
+      </p:ext>
+    </p:extLst>
+  </p:cSld>
+  <p:clrMapOvr>
+    <a:masterClrMapping/>
+  </p:clrMapOvr>
+</p:sld>
+</file>
+
+<file path=ppt/slides/slide6.xml><?xml version="1.0" encoding="utf-8"?>
+<p:sld xmlns:a="http://schemas.openxmlformats.org/drawingml/2006/main" xmlns:r="http://schemas.openxmlformats.org/officeDocument/2006/relationships" xmlns:p="http://schemas.openxmlformats.org/presentationml/2006/main">
+  <p:cSld>
+    <p:spTree>
+      <p:nvGrpSpPr>
+        <p:cNvPr id="1" name=""/>
+        <p:cNvGrpSpPr/>
+        <p:nvPr/>
+      </p:nvGrpSpPr>
+      <p:grpSpPr>
+        <a:xfrm>
+          <a:off x="0" y="0"/>
+          <a:ext cx="0" cy="0"/>
+          <a:chOff x="0" y="0"/>
+          <a:chExt cx="0" cy="0"/>
+        </a:xfrm>
+      </p:grpSpPr>
+      <p:sp>
+        <p:nvSpPr>
+          <p:cNvPr id="2" name="Título 1">
+            <a:extLst>
+              <a:ext uri="{FF2B5EF4-FFF2-40B4-BE49-F238E27FC236}">
+                <a16:creationId xmlns:a16="http://schemas.microsoft.com/office/drawing/2014/main" id="{9B2594E6-7212-20CD-338A-1C52F7F868FE}"/>
+              </a:ext>
+            </a:extLst>
+          </p:cNvPr>
+          <p:cNvSpPr>
+            <a:spLocks noGrp="1"/>
+          </p:cNvSpPr>
+          <p:nvPr>
+            <p:ph type="title"/>
+          </p:nvPr>
+        </p:nvSpPr>
+        <p:spPr/>
+        <p:txBody>
+          <a:bodyPr/>
+          <a:lstStyle/>
+          <a:p>
+            <a:r>
+              <a:rPr lang="es-CO" dirty="0"/>
+              <a:t>Diagrama de Clases</a:t>
+            </a:r>
+            <a:endParaRPr lang="es-ES" dirty="0"/>
+          </a:p>
+        </p:txBody>
+      </p:sp>
+      <p:pic>
+        <p:nvPicPr>
+          <p:cNvPr id="2050" name="Picture 2">
+            <a:extLst>
+              <a:ext uri="{FF2B5EF4-FFF2-40B4-BE49-F238E27FC236}">
+                <a16:creationId xmlns:a16="http://schemas.microsoft.com/office/drawing/2014/main" id="{19035E85-61AD-9780-43F3-011B1010337A}"/>
+              </a:ext>
+            </a:extLst>
+          </p:cNvPr>
+          <p:cNvPicPr>
+            <a:picLocks noChangeAspect="1" noChangeArrowheads="1"/>
+          </p:cNvPicPr>
+          <p:nvPr/>
+        </p:nvPicPr>
+        <p:blipFill>
+          <a:blip r:embed="rId2">
+            <a:extLst>
+              <a:ext uri="{28A0092B-C50C-407E-A947-70E740481C1C}">
+                <a14:useLocalDpi xmlns:a14="http://schemas.microsoft.com/office/drawing/2010/main" val="0"/>
+              </a:ext>
+            </a:extLst>
+          </a:blip>
+          <a:srcRect/>
+          <a:stretch>
+            <a:fillRect/>
+          </a:stretch>
+        </p:blipFill>
+        <p:spPr bwMode="auto">
+          <a:xfrm>
+            <a:off x="2043112" y="1533525"/>
+            <a:ext cx="8105775" cy="3790950"/>
+          </a:xfrm>
+          <a:prstGeom prst="rect">
+            <a:avLst/>
+          </a:prstGeom>
+          <a:noFill/>
+          <a:extLst>
+            <a:ext uri="{909E8E84-426E-40DD-AFC4-6F175D3DCCD1}">
+              <a14:hiddenFill xmlns:a14="http://schemas.microsoft.com/office/drawing/2010/main">
+                <a:solidFill>
+                  <a:srgbClr val="FFFFFF"/>
+                </a:solidFill>
+              </a14:hiddenFill>
+            </a:ext>
+          </a:extLst>
+        </p:spPr>
+      </p:pic>
+    </p:spTree>
+    <p:extLst>
+      <p:ext uri="{BB962C8B-B14F-4D97-AF65-F5344CB8AC3E}">
+        <p14:creationId xmlns:p14="http://schemas.microsoft.com/office/powerpoint/2010/main" val="1003276068"/>
       </p:ext>
     </p:extLst>
   </p:cSld>

</xml_diff>

<commit_message>
ciclo de vida de un script en unity
</commit_message>
<xml_diff>
--- a/Taller Nicolas Hoyos  y Mariana Gomez.pptx
+++ b/Taller Nicolas Hoyos  y Mariana Gomez.pptx
@@ -11,6 +11,7 @@
     <p:sldId id="259" r:id="rId5"/>
     <p:sldId id="260" r:id="rId6"/>
     <p:sldId id="261" r:id="rId7"/>
+    <p:sldId id="262" r:id="rId8"/>
   </p:sldIdLst>
   <p:sldSz cx="12192000" cy="6858000"/>
   <p:notesSz cx="6858000" cy="9144000"/>
@@ -4290,6 +4291,142 @@
     <p:extLst>
       <p:ext uri="{BB962C8B-B14F-4D97-AF65-F5344CB8AC3E}">
         <p14:creationId xmlns:p14="http://schemas.microsoft.com/office/powerpoint/2010/main" val="1003276068"/>
+      </p:ext>
+    </p:extLst>
+  </p:cSld>
+  <p:clrMapOvr>
+    <a:masterClrMapping/>
+  </p:clrMapOvr>
+</p:sld>
+</file>
+
+<file path=ppt/slides/slide7.xml><?xml version="1.0" encoding="utf-8"?>
+<p:sld xmlns:a="http://schemas.openxmlformats.org/drawingml/2006/main" xmlns:r="http://schemas.openxmlformats.org/officeDocument/2006/relationships" xmlns:p="http://schemas.openxmlformats.org/presentationml/2006/main">
+  <p:cSld>
+    <p:spTree>
+      <p:nvGrpSpPr>
+        <p:cNvPr id="1" name=""/>
+        <p:cNvGrpSpPr/>
+        <p:nvPr/>
+      </p:nvGrpSpPr>
+      <p:grpSpPr>
+        <a:xfrm>
+          <a:off x="0" y="0"/>
+          <a:ext cx="0" cy="0"/>
+          <a:chOff x="0" y="0"/>
+          <a:chExt cx="0" cy="0"/>
+        </a:xfrm>
+      </p:grpSpPr>
+      <p:sp>
+        <p:nvSpPr>
+          <p:cNvPr id="2" name="Título 1">
+            <a:extLst>
+              <a:ext uri="{FF2B5EF4-FFF2-40B4-BE49-F238E27FC236}">
+                <a16:creationId xmlns:a16="http://schemas.microsoft.com/office/drawing/2014/main" id="{0D118997-6248-35B3-DAA3-754C90DB2ACD}"/>
+              </a:ext>
+            </a:extLst>
+          </p:cNvPr>
+          <p:cNvSpPr>
+            <a:spLocks noGrp="1"/>
+          </p:cNvSpPr>
+          <p:nvPr>
+            <p:ph type="title"/>
+          </p:nvPr>
+        </p:nvSpPr>
+        <p:spPr/>
+        <p:txBody>
+          <a:bodyPr/>
+          <a:lstStyle/>
+          <a:p>
+            <a:r>
+              <a:rPr lang="es-CO" dirty="0"/>
+              <a:t>Ciclo de vida de un script en Unity</a:t>
+            </a:r>
+            <a:endParaRPr lang="es-ES" dirty="0"/>
+          </a:p>
+        </p:txBody>
+      </p:sp>
+      <p:sp>
+        <p:nvSpPr>
+          <p:cNvPr id="3" name="Marcador de contenido 2">
+            <a:extLst>
+              <a:ext uri="{FF2B5EF4-FFF2-40B4-BE49-F238E27FC236}">
+                <a16:creationId xmlns:a16="http://schemas.microsoft.com/office/drawing/2014/main" id="{DDC0EE1E-5641-3317-A4CB-A6D2965389BC}"/>
+              </a:ext>
+            </a:extLst>
+          </p:cNvPr>
+          <p:cNvSpPr>
+            <a:spLocks noGrp="1"/>
+          </p:cNvSpPr>
+          <p:nvPr>
+            <p:ph idx="1"/>
+          </p:nvPr>
+        </p:nvSpPr>
+        <p:spPr/>
+        <p:txBody>
+          <a:bodyPr/>
+          <a:lstStyle/>
+          <a:p>
+            <a:pPr marL="514350" indent="-514350">
+              <a:buFont typeface="+mj-lt"/>
+              <a:buAutoNum type="arabicPeriod"/>
+            </a:pPr>
+            <a:r>
+              <a:rPr lang="es-ES" dirty="0"/>
+              <a:t>Inicialización</a:t>
+            </a:r>
+          </a:p>
+          <a:p>
+            <a:pPr marL="514350" indent="-514350">
+              <a:buFont typeface="+mj-lt"/>
+              <a:buAutoNum type="arabicPeriod"/>
+            </a:pPr>
+            <a:r>
+              <a:rPr lang="es-ES" dirty="0"/>
+              <a:t>Activación</a:t>
+            </a:r>
+          </a:p>
+          <a:p>
+            <a:pPr marL="514350" indent="-514350">
+              <a:buFont typeface="+mj-lt"/>
+              <a:buAutoNum type="arabicPeriod"/>
+            </a:pPr>
+            <a:r>
+              <a:rPr lang="es-ES" dirty="0"/>
+              <a:t>Actualización por </a:t>
+            </a:r>
+            <a:r>
+              <a:rPr lang="es-ES" dirty="0" err="1"/>
+              <a:t>Frame</a:t>
+            </a:r>
+            <a:endParaRPr lang="es-ES" dirty="0"/>
+          </a:p>
+          <a:p>
+            <a:pPr marL="514350" indent="-514350">
+              <a:buFont typeface="+mj-lt"/>
+              <a:buAutoNum type="arabicPeriod"/>
+            </a:pPr>
+            <a:r>
+              <a:rPr lang="es-ES" dirty="0"/>
+              <a:t>Desactivación</a:t>
+            </a:r>
+          </a:p>
+          <a:p>
+            <a:pPr marL="514350" indent="-514350">
+              <a:buFont typeface="+mj-lt"/>
+              <a:buAutoNum type="arabicPeriod"/>
+            </a:pPr>
+            <a:r>
+              <a:rPr lang="es-ES" dirty="0"/>
+              <a:t>Finalización</a:t>
+            </a:r>
+          </a:p>
+        </p:txBody>
+      </p:sp>
+    </p:spTree>
+    <p:extLst>
+      <p:ext uri="{BB962C8B-B14F-4D97-AF65-F5344CB8AC3E}">
+        <p14:creationId xmlns:p14="http://schemas.microsoft.com/office/powerpoint/2010/main" val="3977671655"/>
       </p:ext>
     </p:extLst>
   </p:cSld>

</xml_diff>

<commit_message>
arreglos de la presentación
</commit_message>
<xml_diff>
--- a/Taller Nicolas Hoyos  y Mariana Gomez.pptx
+++ b/Taller Nicolas Hoyos  y Mariana Gomez.pptx
@@ -9138,6 +9138,18 @@
   <p:clrMapOvr>
     <a:masterClrMapping/>
   </p:clrMapOvr>
+  <mc:AlternateContent xmlns:mc="http://schemas.openxmlformats.org/markup-compatibility/2006">
+    <mc:Choice xmlns:p14="http://schemas.microsoft.com/office/powerpoint/2010/main" Requires="p14">
+      <p:transition spd="slow" p14:dur="2000">
+        <p14:ferris dir="l"/>
+      </p:transition>
+    </mc:Choice>
+    <mc:Fallback>
+      <p:transition spd="slow">
+        <p:fade/>
+      </p:transition>
+    </mc:Fallback>
+  </mc:AlternateContent>
 </p:sld>
 </file>
 
@@ -9553,6 +9565,18 @@
   <p:clrMapOvr>
     <a:masterClrMapping/>
   </p:clrMapOvr>
+  <mc:AlternateContent xmlns:mc="http://schemas.openxmlformats.org/markup-compatibility/2006">
+    <mc:Choice xmlns:p15="http://schemas.microsoft.com/office/powerpoint/2012/main" Requires="p15">
+      <p:transition xmlns:p14="http://schemas.microsoft.com/office/powerpoint/2010/main" spd="slow" p14:dur="2000">
+        <p15:prstTrans prst="drape"/>
+      </p:transition>
+    </mc:Choice>
+    <mc:Fallback>
+      <p:transition spd="slow">
+        <p:fade/>
+      </p:transition>
+    </mc:Fallback>
+  </mc:AlternateContent>
 </p:sld>
 </file>
 
@@ -10104,6 +10128,18 @@
   <p:clrMapOvr>
     <a:masterClrMapping/>
   </p:clrMapOvr>
+  <mc:AlternateContent xmlns:mc="http://schemas.openxmlformats.org/markup-compatibility/2006">
+    <mc:Choice xmlns:p15="http://schemas.microsoft.com/office/powerpoint/2012/main" Requires="p15">
+      <p:transition xmlns:p14="http://schemas.microsoft.com/office/powerpoint/2010/main" spd="slow" p14:dur="2000">
+        <p15:prstTrans prst="crush"/>
+      </p:transition>
+    </mc:Choice>
+    <mc:Fallback>
+      <p:transition spd="slow">
+        <p:fade/>
+      </p:transition>
+    </mc:Fallback>
+  </mc:AlternateContent>
 </p:sld>
 </file>
 
@@ -10519,6 +10555,18 @@
   <p:clrMapOvr>
     <a:masterClrMapping/>
   </p:clrMapOvr>
+  <mc:AlternateContent xmlns:mc="http://schemas.openxmlformats.org/markup-compatibility/2006">
+    <mc:Choice xmlns:p15="http://schemas.microsoft.com/office/powerpoint/2012/main" Requires="p15">
+      <p:transition xmlns:p14="http://schemas.microsoft.com/office/powerpoint/2010/main" spd="slow" p14:dur="3250">
+        <p15:prstTrans prst="origami"/>
+      </p:transition>
+    </mc:Choice>
+    <mc:Fallback>
+      <p:transition spd="slow">
+        <p:fade/>
+      </p:transition>
+    </mc:Fallback>
+  </mc:AlternateContent>
 </p:sld>
 </file>
 

</xml_diff>

<commit_message>
agregada diapositiva de fin
</commit_message>
<xml_diff>
--- a/Taller Nicolas Hoyos  y Mariana Gomez.pptx
+++ b/Taller Nicolas Hoyos  y Mariana Gomez.pptx
@@ -12,6 +12,7 @@
     <p:sldId id="260" r:id="rId6"/>
     <p:sldId id="261" r:id="rId7"/>
     <p:sldId id="262" r:id="rId8"/>
+    <p:sldId id="263" r:id="rId9"/>
   </p:sldIdLst>
   <p:sldSz cx="12192000" cy="6858000"/>
   <p:notesSz cx="6858000" cy="9144000"/>
@@ -10938,13 +10939,13 @@
   <p:clrMapOvr>
     <a:masterClrMapping/>
   </p:clrMapOvr>
-  <mc:AlternateContent xmlns:mc="http://schemas.openxmlformats.org/markup-compatibility/2006">
-    <mc:Choice xmlns:p14="http://schemas.microsoft.com/office/powerpoint/2010/main" Requires="p14">
+  <mc:AlternateContent xmlns:mc="http://schemas.openxmlformats.org/markup-compatibility/2006" xmlns:p14="http://schemas.microsoft.com/office/powerpoint/2010/main">
+    <mc:Choice Requires="p14">
       <p:transition spd="slow" p14:dur="2500">
         <p:checker/>
       </p:transition>
     </mc:Choice>
-    <mc:Fallback>
+    <mc:Fallback xmlns="">
       <p:transition spd="slow">
         <p:checker/>
       </p:transition>
@@ -11379,13 +11380,13 @@
   <p:clrMapOvr>
     <a:masterClrMapping/>
   </p:clrMapOvr>
-  <mc:AlternateContent xmlns:mc="http://schemas.openxmlformats.org/markup-compatibility/2006">
-    <mc:Choice xmlns:p15="http://schemas.microsoft.com/office/powerpoint/2012/main" Requires="p15">
+  <mc:AlternateContent xmlns:mc="http://schemas.openxmlformats.org/markup-compatibility/2006" xmlns:p15="http://schemas.microsoft.com/office/powerpoint/2012/main">
+    <mc:Choice Requires="p15">
       <p:transition xmlns:p14="http://schemas.microsoft.com/office/powerpoint/2010/main" spd="slow" p14:dur="2000">
         <p15:prstTrans prst="prestige"/>
       </p:transition>
     </mc:Choice>
-    <mc:Fallback>
+    <mc:Fallback xmlns="">
       <p:transition spd="slow">
         <p:fade/>
       </p:transition>
@@ -11692,18 +11693,704 @@
   <p:clrMapOvr>
     <a:masterClrMapping/>
   </p:clrMapOvr>
-  <mc:AlternateContent xmlns:mc="http://schemas.openxmlformats.org/markup-compatibility/2006">
-    <mc:Choice xmlns:p15="http://schemas.microsoft.com/office/powerpoint/2012/main" Requires="p15">
+  <mc:AlternateContent xmlns:mc="http://schemas.openxmlformats.org/markup-compatibility/2006" xmlns:p15="http://schemas.microsoft.com/office/powerpoint/2012/main">
+    <mc:Choice Requires="p15">
       <p:transition xmlns:p14="http://schemas.microsoft.com/office/powerpoint/2010/main" spd="slow" p14:dur="2000">
         <p15:prstTrans prst="fallOver"/>
       </p:transition>
     </mc:Choice>
-    <mc:Fallback>
+    <mc:Fallback xmlns="">
       <p:transition spd="slow">
         <p:fade/>
       </p:transition>
     </mc:Fallback>
   </mc:AlternateContent>
+</p:sld>
+</file>
+
+<file path=ppt/slides/slide8.xml><?xml version="1.0" encoding="utf-8"?>
+<p:sld xmlns:a="http://schemas.openxmlformats.org/drawingml/2006/main" xmlns:r="http://schemas.openxmlformats.org/officeDocument/2006/relationships" xmlns:p="http://schemas.openxmlformats.org/presentationml/2006/main">
+  <p:cSld>
+    <p:bg>
+      <p:bgPr>
+        <a:solidFill>
+          <a:schemeClr val="bg1"/>
+        </a:solidFill>
+        <a:effectLst/>
+      </p:bgPr>
+    </p:bg>
+    <p:spTree>
+      <p:nvGrpSpPr>
+        <p:cNvPr id="1" name=""/>
+        <p:cNvGrpSpPr/>
+        <p:nvPr/>
+      </p:nvGrpSpPr>
+      <p:grpSpPr>
+        <a:xfrm>
+          <a:off x="0" y="0"/>
+          <a:ext cx="0" cy="0"/>
+          <a:chOff x="0" y="0"/>
+          <a:chExt cx="0" cy="0"/>
+        </a:xfrm>
+      </p:grpSpPr>
+      <p:sp useBgFill="1">
+        <p:nvSpPr>
+          <p:cNvPr id="7" name="Rectangle 6">
+            <a:extLst>
+              <a:ext uri="{FF2B5EF4-FFF2-40B4-BE49-F238E27FC236}">
+                <a16:creationId xmlns:a16="http://schemas.microsoft.com/office/drawing/2014/main" id="{577D6B2E-37A3-429E-A37C-F30ED6487282}"/>
+              </a:ext>
+              <a:ext uri="{C183D7F6-B498-43B3-948B-1728B52AA6E4}">
+                <adec:decorative xmlns:adec="http://schemas.microsoft.com/office/drawing/2017/decorative" val="1"/>
+              </a:ext>
+            </a:extLst>
+          </p:cNvPr>
+          <p:cNvSpPr>
+            <a:spLocks noGrp="1" noRot="1" noChangeAspect="1" noMove="1" noResize="1" noEditPoints="1" noAdjustHandles="1" noChangeArrowheads="1" noChangeShapeType="1" noTextEdit="1"/>
+          </p:cNvSpPr>
+          <p:nvPr>
+            <p:extLst>
+              <p:ext uri="{386F3935-93C4-4BCD-93E2-E3B085C9AB24}">
+                <p16:designElem xmlns:p16="http://schemas.microsoft.com/office/powerpoint/2015/main" val="1"/>
+              </p:ext>
+            </p:extLst>
+          </p:nvPr>
+        </p:nvSpPr>
+        <p:spPr>
+          <a:xfrm>
+            <a:off x="0" y="0"/>
+            <a:ext cx="12192000" cy="6858000"/>
+          </a:xfrm>
+          <a:prstGeom prst="rect">
+            <a:avLst/>
+          </a:prstGeom>
+          <a:ln w="12700" cap="flat" cmpd="sng" algn="ctr">
+            <a:noFill/>
+            <a:prstDash val="solid"/>
+            <a:miter lim="800000"/>
+          </a:ln>
+          <a:effectLst/>
+          <a:extLst>
+            <a:ext uri="{91240B29-F687-4F45-9708-019B960494DF}">
+              <a14:hiddenLine xmlns:a14="http://schemas.microsoft.com/office/drawing/2010/main" w="12700" cap="flat" cmpd="sng" algn="ctr">
+                <a:solidFill>
+                  <a:schemeClr val="accent1">
+                    <a:shade val="50000"/>
+                  </a:schemeClr>
+                </a:solidFill>
+                <a:prstDash val="solid"/>
+                <a:miter lim="800000"/>
+              </a14:hiddenLine>
+            </a:ext>
+          </a:extLst>
+        </p:spPr>
+        <p:style>
+          <a:lnRef idx="2">
+            <a:schemeClr val="accent1">
+              <a:shade val="50000"/>
+            </a:schemeClr>
+          </a:lnRef>
+          <a:fillRef idx="1">
+            <a:schemeClr val="accent1"/>
+          </a:fillRef>
+          <a:effectRef idx="0">
+            <a:schemeClr val="accent1"/>
+          </a:effectRef>
+          <a:fontRef idx="minor">
+            <a:schemeClr val="lt1"/>
+          </a:fontRef>
+        </p:style>
+        <p:txBody>
+          <a:bodyPr rtlCol="0" anchor="ctr"/>
+          <a:lstStyle/>
+          <a:p>
+            <a:pPr algn="ctr"/>
+            <a:endParaRPr lang="en-US"/>
+          </a:p>
+        </p:txBody>
+      </p:sp>
+      <p:sp>
+        <p:nvSpPr>
+          <p:cNvPr id="9" name="Rectangle 8">
+            <a:extLst>
+              <a:ext uri="{FF2B5EF4-FFF2-40B4-BE49-F238E27FC236}">
+                <a16:creationId xmlns:a16="http://schemas.microsoft.com/office/drawing/2014/main" id="{5CEAD642-85CF-4750-8432-7C80C901F001}"/>
+              </a:ext>
+              <a:ext uri="{C183D7F6-B498-43B3-948B-1728B52AA6E4}">
+                <adec:decorative xmlns:adec="http://schemas.microsoft.com/office/drawing/2017/decorative" val="1"/>
+              </a:ext>
+            </a:extLst>
+          </p:cNvPr>
+          <p:cNvSpPr>
+            <a:spLocks noGrp="1" noRot="1" noChangeAspect="1" noMove="1" noResize="1" noEditPoints="1" noAdjustHandles="1" noChangeArrowheads="1" noChangeShapeType="1" noTextEdit="1"/>
+          </p:cNvSpPr>
+          <p:nvPr>
+            <p:extLst>
+              <p:ext uri="{386F3935-93C4-4BCD-93E2-E3B085C9AB24}">
+                <p16:designElem xmlns:p16="http://schemas.microsoft.com/office/powerpoint/2015/main" val="1"/>
+              </p:ext>
+            </p:extLst>
+          </p:nvPr>
+        </p:nvSpPr>
+        <p:spPr>
+          <a:xfrm rot="10800000">
+            <a:off x="-11723" y="-1"/>
+            <a:ext cx="12225953" cy="6868071"/>
+          </a:xfrm>
+          <a:prstGeom prst="rect">
+            <a:avLst/>
+          </a:prstGeom>
+          <a:gradFill>
+            <a:gsLst>
+              <a:gs pos="0">
+                <a:srgbClr val="000000"/>
+              </a:gs>
+              <a:gs pos="100000">
+                <a:schemeClr val="accent1">
+                  <a:lumMod val="75000"/>
+                </a:schemeClr>
+              </a:gs>
+            </a:gsLst>
+            <a:lin ang="4200000" scaled="0"/>
+          </a:gradFill>
+          <a:ln>
+            <a:noFill/>
+          </a:ln>
+        </p:spPr>
+        <p:style>
+          <a:lnRef idx="2">
+            <a:schemeClr val="accent1">
+              <a:shade val="50000"/>
+            </a:schemeClr>
+          </a:lnRef>
+          <a:fillRef idx="1">
+            <a:schemeClr val="accent1"/>
+          </a:fillRef>
+          <a:effectRef idx="0">
+            <a:schemeClr val="accent1"/>
+          </a:effectRef>
+          <a:fontRef idx="minor">
+            <a:schemeClr val="lt1"/>
+          </a:fontRef>
+        </p:style>
+        <p:txBody>
+          <a:bodyPr rtlCol="0" anchor="ctr"/>
+          <a:lstStyle/>
+          <a:p>
+            <a:pPr algn="ctr"/>
+            <a:endParaRPr lang="en-US"/>
+          </a:p>
+        </p:txBody>
+      </p:sp>
+      <p:sp>
+        <p:nvSpPr>
+          <p:cNvPr id="11" name="Rectangle 10">
+            <a:extLst>
+              <a:ext uri="{FF2B5EF4-FFF2-40B4-BE49-F238E27FC236}">
+                <a16:creationId xmlns:a16="http://schemas.microsoft.com/office/drawing/2014/main" id="{FA33EEAE-15D5-4119-8C1E-89D943F911EF}"/>
+              </a:ext>
+              <a:ext uri="{C183D7F6-B498-43B3-948B-1728B52AA6E4}">
+                <adec:decorative xmlns:adec="http://schemas.microsoft.com/office/drawing/2017/decorative" val="1"/>
+              </a:ext>
+            </a:extLst>
+          </p:cNvPr>
+          <p:cNvSpPr>
+            <a:spLocks noGrp="1" noRot="1" noChangeAspect="1" noMove="1" noResize="1" noEditPoints="1" noAdjustHandles="1" noChangeArrowheads="1" noChangeShapeType="1" noTextEdit="1"/>
+          </p:cNvSpPr>
+          <p:nvPr>
+            <p:extLst>
+              <p:ext uri="{386F3935-93C4-4BCD-93E2-E3B085C9AB24}">
+                <p16:designElem xmlns:p16="http://schemas.microsoft.com/office/powerpoint/2015/main" val="1"/>
+              </p:ext>
+            </p:extLst>
+          </p:nvPr>
+        </p:nvSpPr>
+        <p:spPr>
+          <a:xfrm rot="10800000" flipH="1">
+            <a:off x="441959" y="-3"/>
+            <a:ext cx="11772269" cy="6868074"/>
+          </a:xfrm>
+          <a:prstGeom prst="rect">
+            <a:avLst/>
+          </a:prstGeom>
+          <a:gradFill>
+            <a:gsLst>
+              <a:gs pos="21000">
+                <a:schemeClr val="accent1">
+                  <a:lumMod val="50000"/>
+                  <a:alpha val="83000"/>
+                </a:schemeClr>
+              </a:gs>
+              <a:gs pos="100000">
+                <a:schemeClr val="accent1">
+                  <a:alpha val="0"/>
+                </a:schemeClr>
+              </a:gs>
+            </a:gsLst>
+            <a:lin ang="8400000" scaled="0"/>
+          </a:gradFill>
+          <a:ln>
+            <a:noFill/>
+          </a:ln>
+        </p:spPr>
+        <p:style>
+          <a:lnRef idx="2">
+            <a:schemeClr val="accent1">
+              <a:shade val="50000"/>
+            </a:schemeClr>
+          </a:lnRef>
+          <a:fillRef idx="1">
+            <a:schemeClr val="accent1"/>
+          </a:fillRef>
+          <a:effectRef idx="0">
+            <a:schemeClr val="accent1"/>
+          </a:effectRef>
+          <a:fontRef idx="minor">
+            <a:schemeClr val="lt1"/>
+          </a:fontRef>
+        </p:style>
+        <p:txBody>
+          <a:bodyPr rtlCol="0" anchor="ctr"/>
+          <a:lstStyle/>
+          <a:p>
+            <a:pPr algn="ctr"/>
+            <a:endParaRPr lang="en-US"/>
+          </a:p>
+        </p:txBody>
+      </p:sp>
+      <p:sp>
+        <p:nvSpPr>
+          <p:cNvPr id="13" name="Rectangle 12">
+            <a:extLst>
+              <a:ext uri="{FF2B5EF4-FFF2-40B4-BE49-F238E27FC236}">
+                <a16:creationId xmlns:a16="http://schemas.microsoft.com/office/drawing/2014/main" id="{730D8B3B-9B80-4025-B934-26DC7D7CD231}"/>
+              </a:ext>
+              <a:ext uri="{C183D7F6-B498-43B3-948B-1728B52AA6E4}">
+                <adec:decorative xmlns:adec="http://schemas.microsoft.com/office/drawing/2017/decorative" val="1"/>
+              </a:ext>
+            </a:extLst>
+          </p:cNvPr>
+          <p:cNvSpPr>
+            <a:spLocks noGrp="1" noRot="1" noChangeAspect="1" noMove="1" noResize="1" noEditPoints="1" noAdjustHandles="1" noChangeArrowheads="1" noChangeShapeType="1" noTextEdit="1"/>
+          </p:cNvSpPr>
+          <p:nvPr>
+            <p:extLst>
+              <p:ext uri="{386F3935-93C4-4BCD-93E2-E3B085C9AB24}">
+                <p16:designElem xmlns:p16="http://schemas.microsoft.com/office/powerpoint/2015/main" val="1"/>
+              </p:ext>
+            </p:extLst>
+          </p:nvPr>
+        </p:nvSpPr>
+        <p:spPr>
+          <a:xfrm rot="10800000">
+            <a:off x="-15200" y="0"/>
+            <a:ext cx="3623374" cy="6868072"/>
+          </a:xfrm>
+          <a:prstGeom prst="rect">
+            <a:avLst/>
+          </a:prstGeom>
+          <a:gradFill>
+            <a:gsLst>
+              <a:gs pos="0">
+                <a:schemeClr val="accent1">
+                  <a:lumMod val="75000"/>
+                  <a:alpha val="0"/>
+                </a:schemeClr>
+              </a:gs>
+              <a:gs pos="99000">
+                <a:srgbClr val="000000">
+                  <a:alpha val="41000"/>
+                </a:srgbClr>
+              </a:gs>
+            </a:gsLst>
+            <a:lin ang="13200000" scaled="0"/>
+          </a:gradFill>
+          <a:ln>
+            <a:noFill/>
+          </a:ln>
+        </p:spPr>
+        <p:style>
+          <a:lnRef idx="2">
+            <a:schemeClr val="accent1">
+              <a:shade val="50000"/>
+            </a:schemeClr>
+          </a:lnRef>
+          <a:fillRef idx="1">
+            <a:schemeClr val="accent1"/>
+          </a:fillRef>
+          <a:effectRef idx="0">
+            <a:schemeClr val="accent1"/>
+          </a:effectRef>
+          <a:fontRef idx="minor">
+            <a:schemeClr val="lt1"/>
+          </a:fontRef>
+        </p:style>
+        <p:txBody>
+          <a:bodyPr rtlCol="0" anchor="ctr"/>
+          <a:lstStyle/>
+          <a:p>
+            <a:pPr algn="ctr"/>
+            <a:endParaRPr lang="en-US"/>
+          </a:p>
+        </p:txBody>
+      </p:sp>
+      <p:sp>
+        <p:nvSpPr>
+          <p:cNvPr id="15" name="Rectangle 14">
+            <a:extLst>
+              <a:ext uri="{FF2B5EF4-FFF2-40B4-BE49-F238E27FC236}">
+                <a16:creationId xmlns:a16="http://schemas.microsoft.com/office/drawing/2014/main" id="{1064D5D5-227B-4F66-9AEA-46F570E793BD}"/>
+              </a:ext>
+              <a:ext uri="{C183D7F6-B498-43B3-948B-1728B52AA6E4}">
+                <adec:decorative xmlns:adec="http://schemas.microsoft.com/office/drawing/2017/decorative" val="1"/>
+              </a:ext>
+            </a:extLst>
+          </p:cNvPr>
+          <p:cNvSpPr>
+            <a:spLocks noGrp="1" noRot="1" noChangeAspect="1" noMove="1" noResize="1" noEditPoints="1" noAdjustHandles="1" noChangeArrowheads="1" noChangeShapeType="1" noTextEdit="1"/>
+          </p:cNvSpPr>
+          <p:nvPr>
+            <p:extLst>
+              <p:ext uri="{386F3935-93C4-4BCD-93E2-E3B085C9AB24}">
+                <p16:designElem xmlns:p16="http://schemas.microsoft.com/office/powerpoint/2015/main" val="1"/>
+              </p:ext>
+            </p:extLst>
+          </p:nvPr>
+        </p:nvSpPr>
+        <p:spPr>
+          <a:xfrm flipH="1">
+            <a:off x="-15875" y="-3"/>
+            <a:ext cx="12233581" cy="6868076"/>
+          </a:xfrm>
+          <a:prstGeom prst="rect">
+            <a:avLst/>
+          </a:prstGeom>
+          <a:gradFill>
+            <a:gsLst>
+              <a:gs pos="3000">
+                <a:schemeClr val="accent1">
+                  <a:lumMod val="75000"/>
+                  <a:alpha val="0"/>
+                </a:schemeClr>
+              </a:gs>
+              <a:gs pos="100000">
+                <a:srgbClr val="000000">
+                  <a:alpha val="73000"/>
+                </a:srgbClr>
+              </a:gs>
+            </a:gsLst>
+            <a:lin ang="17400000" scaled="0"/>
+          </a:gradFill>
+          <a:ln>
+            <a:noFill/>
+          </a:ln>
+        </p:spPr>
+        <p:style>
+          <a:lnRef idx="2">
+            <a:schemeClr val="accent1">
+              <a:shade val="50000"/>
+            </a:schemeClr>
+          </a:lnRef>
+          <a:fillRef idx="1">
+            <a:schemeClr val="accent1"/>
+          </a:fillRef>
+          <a:effectRef idx="0">
+            <a:schemeClr val="accent1"/>
+          </a:effectRef>
+          <a:fontRef idx="minor">
+            <a:schemeClr val="lt1"/>
+          </a:fontRef>
+        </p:style>
+        <p:txBody>
+          <a:bodyPr rtlCol="0" anchor="ctr"/>
+          <a:lstStyle/>
+          <a:p>
+            <a:pPr algn="ctr"/>
+            <a:endParaRPr lang="en-US"/>
+          </a:p>
+        </p:txBody>
+      </p:sp>
+      <p:sp>
+        <p:nvSpPr>
+          <p:cNvPr id="17" name="Rectangle 16">
+            <a:extLst>
+              <a:ext uri="{FF2B5EF4-FFF2-40B4-BE49-F238E27FC236}">
+                <a16:creationId xmlns:a16="http://schemas.microsoft.com/office/drawing/2014/main" id="{646B67A4-D328-4747-A82B-65E84FA46368}"/>
+              </a:ext>
+              <a:ext uri="{C183D7F6-B498-43B3-948B-1728B52AA6E4}">
+                <adec:decorative xmlns:adec="http://schemas.microsoft.com/office/drawing/2017/decorative" val="1"/>
+              </a:ext>
+            </a:extLst>
+          </p:cNvPr>
+          <p:cNvSpPr>
+            <a:spLocks noGrp="1" noRot="1" noChangeAspect="1" noMove="1" noResize="1" noEditPoints="1" noAdjustHandles="1" noChangeArrowheads="1" noChangeShapeType="1" noTextEdit="1"/>
+          </p:cNvSpPr>
+          <p:nvPr>
+            <p:extLst>
+              <p:ext uri="{386F3935-93C4-4BCD-93E2-E3B085C9AB24}">
+                <p16:designElem xmlns:p16="http://schemas.microsoft.com/office/powerpoint/2015/main" val="1"/>
+              </p:ext>
+            </p:extLst>
+          </p:nvPr>
+        </p:nvSpPr>
+        <p:spPr>
+          <a:xfrm rot="5400000" flipH="1">
+            <a:off x="4484334" y="-861824"/>
+            <a:ext cx="6861931" cy="8597859"/>
+          </a:xfrm>
+          <a:prstGeom prst="rect">
+            <a:avLst/>
+          </a:prstGeom>
+          <a:gradFill>
+            <a:gsLst>
+              <a:gs pos="3000">
+                <a:schemeClr val="accent1">
+                  <a:lumMod val="75000"/>
+                  <a:alpha val="0"/>
+                </a:schemeClr>
+              </a:gs>
+              <a:gs pos="100000">
+                <a:srgbClr val="000000">
+                  <a:alpha val="27000"/>
+                </a:srgbClr>
+              </a:gs>
+            </a:gsLst>
+            <a:lin ang="13800000" scaled="0"/>
+          </a:gradFill>
+          <a:ln>
+            <a:noFill/>
+          </a:ln>
+        </p:spPr>
+        <p:style>
+          <a:lnRef idx="2">
+            <a:schemeClr val="accent1">
+              <a:shade val="50000"/>
+            </a:schemeClr>
+          </a:lnRef>
+          <a:fillRef idx="1">
+            <a:schemeClr val="accent1"/>
+          </a:fillRef>
+          <a:effectRef idx="0">
+            <a:schemeClr val="accent1"/>
+          </a:effectRef>
+          <a:fontRef idx="minor">
+            <a:schemeClr val="lt1"/>
+          </a:fontRef>
+        </p:style>
+        <p:txBody>
+          <a:bodyPr rtlCol="0" anchor="ctr"/>
+          <a:lstStyle/>
+          <a:p>
+            <a:pPr algn="ctr"/>
+            <a:endParaRPr lang="en-US"/>
+          </a:p>
+        </p:txBody>
+      </p:sp>
+      <p:sp>
+        <p:nvSpPr>
+          <p:cNvPr id="19" name="Oval 18">
+            <a:extLst>
+              <a:ext uri="{FF2B5EF4-FFF2-40B4-BE49-F238E27FC236}">
+                <a16:creationId xmlns:a16="http://schemas.microsoft.com/office/drawing/2014/main" id="{B5A1B09C-1565-46F8-B70F-621C5EB48A09}"/>
+              </a:ext>
+              <a:ext uri="{C183D7F6-B498-43B3-948B-1728B52AA6E4}">
+                <adec:decorative xmlns:adec="http://schemas.microsoft.com/office/drawing/2017/decorative" val="1"/>
+              </a:ext>
+            </a:extLst>
+          </p:cNvPr>
+          <p:cNvSpPr>
+            <a:spLocks noGrp="1" noRot="1" noChangeAspect="1" noMove="1" noResize="1" noEditPoints="1" noAdjustHandles="1" noChangeArrowheads="1" noChangeShapeType="1" noTextEdit="1"/>
+          </p:cNvSpPr>
+          <p:nvPr>
+            <p:extLst>
+              <p:ext uri="{386F3935-93C4-4BCD-93E2-E3B085C9AB24}">
+                <p16:designElem xmlns:p16="http://schemas.microsoft.com/office/powerpoint/2015/main" val="1"/>
+              </p:ext>
+            </p:extLst>
+          </p:nvPr>
+        </p:nvSpPr>
+        <p:spPr>
+          <a:xfrm rot="5993193">
+            <a:off x="1186972" y="1089049"/>
+            <a:ext cx="4967533" cy="4988390"/>
+          </a:xfrm>
+          <a:prstGeom prst="ellipse">
+            <a:avLst/>
+          </a:prstGeom>
+          <a:gradFill>
+            <a:gsLst>
+              <a:gs pos="0">
+                <a:schemeClr val="accent1">
+                  <a:alpha val="26000"/>
+                </a:schemeClr>
+              </a:gs>
+              <a:gs pos="85000">
+                <a:schemeClr val="accent1">
+                  <a:lumMod val="60000"/>
+                  <a:lumOff val="40000"/>
+                  <a:alpha val="0"/>
+                </a:schemeClr>
+              </a:gs>
+            </a:gsLst>
+            <a:lin ang="14400000" scaled="0"/>
+          </a:gradFill>
+          <a:ln>
+            <a:noFill/>
+          </a:ln>
+        </p:spPr>
+        <p:style>
+          <a:lnRef idx="2">
+            <a:schemeClr val="accent1">
+              <a:shade val="50000"/>
+            </a:schemeClr>
+          </a:lnRef>
+          <a:fillRef idx="1">
+            <a:schemeClr val="accent1"/>
+          </a:fillRef>
+          <a:effectRef idx="0">
+            <a:schemeClr val="accent1"/>
+          </a:effectRef>
+          <a:fontRef idx="minor">
+            <a:schemeClr val="lt1"/>
+          </a:fontRef>
+        </p:style>
+        <p:txBody>
+          <a:bodyPr rtlCol="0" anchor="ctr"/>
+          <a:lstStyle/>
+          <a:p>
+            <a:pPr algn="ctr"/>
+            <a:endParaRPr lang="en-US" dirty="0"/>
+          </a:p>
+        </p:txBody>
+      </p:sp>
+      <p:sp>
+        <p:nvSpPr>
+          <p:cNvPr id="2" name="Título 1">
+            <a:extLst>
+              <a:ext uri="{FF2B5EF4-FFF2-40B4-BE49-F238E27FC236}">
+                <a16:creationId xmlns:a16="http://schemas.microsoft.com/office/drawing/2014/main" id="{CC2C06BC-6C89-C3F2-E3E5-D94859493BF0}"/>
+              </a:ext>
+            </a:extLst>
+          </p:cNvPr>
+          <p:cNvSpPr>
+            <a:spLocks noGrp="1"/>
+          </p:cNvSpPr>
+          <p:nvPr>
+            <p:ph type="title"/>
+          </p:nvPr>
+        </p:nvSpPr>
+        <p:spPr>
+          <a:xfrm>
+            <a:off x="4162567" y="818984"/>
+            <a:ext cx="6714699" cy="3178689"/>
+          </a:xfrm>
+        </p:spPr>
+        <p:txBody>
+          <a:bodyPr vert="horz" lIns="91440" tIns="45720" rIns="91440" bIns="45720" rtlCol="0" anchor="b">
+            <a:normAutofit/>
+          </a:bodyPr>
+          <a:lstStyle/>
+          <a:p>
+            <a:r>
+              <a:rPr lang="en-US" sz="4800" kern="1200">
+                <a:solidFill>
+                  <a:srgbClr val="FFFFFF"/>
+                </a:solidFill>
+                <a:latin typeface="+mj-lt"/>
+                <a:ea typeface="+mj-ea"/>
+                <a:cs typeface="+mj-cs"/>
+              </a:rPr>
+              <a:t>FIN</a:t>
+            </a:r>
+          </a:p>
+        </p:txBody>
+      </p:sp>
+      <p:sp>
+        <p:nvSpPr>
+          <p:cNvPr id="21" name="Rectangle 20">
+            <a:extLst>
+              <a:ext uri="{FF2B5EF4-FFF2-40B4-BE49-F238E27FC236}">
+                <a16:creationId xmlns:a16="http://schemas.microsoft.com/office/drawing/2014/main" id="{8C516CC8-80AC-446C-A56E-9F54B7210402}"/>
+              </a:ext>
+              <a:ext uri="{C183D7F6-B498-43B3-948B-1728B52AA6E4}">
+                <adec:decorative xmlns:adec="http://schemas.microsoft.com/office/drawing/2017/decorative" val="1"/>
+              </a:ext>
+            </a:extLst>
+          </p:cNvPr>
+          <p:cNvSpPr>
+            <a:spLocks noGrp="1" noRot="1" noChangeAspect="1" noMove="1" noResize="1" noEditPoints="1" noAdjustHandles="1" noChangeArrowheads="1" noChangeShapeType="1" noTextEdit="1"/>
+          </p:cNvSpPr>
+          <p:nvPr>
+            <p:extLst>
+              <p:ext uri="{386F3935-93C4-4BCD-93E2-E3B085C9AB24}">
+                <p16:designElem xmlns:p16="http://schemas.microsoft.com/office/powerpoint/2015/main" val="1"/>
+              </p:ext>
+            </p:extLst>
+          </p:nvPr>
+        </p:nvSpPr>
+        <p:spPr>
+          <a:xfrm flipH="1">
+            <a:off x="-3" y="4490110"/>
+            <a:ext cx="12217710" cy="2377962"/>
+          </a:xfrm>
+          <a:prstGeom prst="rect">
+            <a:avLst/>
+          </a:prstGeom>
+          <a:gradFill>
+            <a:gsLst>
+              <a:gs pos="0">
+                <a:schemeClr val="accent1">
+                  <a:lumMod val="75000"/>
+                  <a:alpha val="50000"/>
+                </a:schemeClr>
+              </a:gs>
+              <a:gs pos="99000">
+                <a:srgbClr val="000000">
+                  <a:alpha val="34000"/>
+                </a:srgbClr>
+              </a:gs>
+            </a:gsLst>
+            <a:lin ang="13200000" scaled="0"/>
+          </a:gradFill>
+          <a:ln>
+            <a:noFill/>
+          </a:ln>
+        </p:spPr>
+        <p:style>
+          <a:lnRef idx="2">
+            <a:schemeClr val="accent1">
+              <a:shade val="50000"/>
+            </a:schemeClr>
+          </a:lnRef>
+          <a:fillRef idx="1">
+            <a:schemeClr val="accent1"/>
+          </a:fillRef>
+          <a:effectRef idx="0">
+            <a:schemeClr val="accent1"/>
+          </a:effectRef>
+          <a:fontRef idx="minor">
+            <a:schemeClr val="lt1"/>
+          </a:fontRef>
+        </p:style>
+        <p:txBody>
+          <a:bodyPr rtlCol="0" anchor="ctr"/>
+          <a:lstStyle/>
+          <a:p>
+            <a:pPr algn="ctr"/>
+            <a:endParaRPr lang="en-US"/>
+          </a:p>
+        </p:txBody>
+      </p:sp>
+    </p:spTree>
+    <p:extLst>
+      <p:ext uri="{BB962C8B-B14F-4D97-AF65-F5344CB8AC3E}">
+        <p14:creationId xmlns:p14="http://schemas.microsoft.com/office/powerpoint/2010/main" val="2157452865"/>
+      </p:ext>
+    </p:extLst>
+  </p:cSld>
+  <p:clrMapOvr>
+    <a:masterClrMapping/>
+  </p:clrMapOvr>
 </p:sld>
 </file>
 

</xml_diff>

<commit_message>
agregué imagen en ciclo de vida de un script
</commit_message>
<xml_diff>
--- a/Taller Nicolas Hoyos  y Mariana Gomez.pptx
+++ b/Taller Nicolas Hoyos  y Mariana Gomez.pptx
@@ -11683,6 +11683,53 @@
           </a:prstGeom>
         </p:spPr>
       </p:pic>
+      <p:pic>
+        <p:nvPicPr>
+          <p:cNvPr id="1026" name="Picture 2" descr="El Ciclo de Vida del Software | Proceso Básico en Metodologías">
+            <a:extLst>
+              <a:ext uri="{FF2B5EF4-FFF2-40B4-BE49-F238E27FC236}">
+                <a16:creationId xmlns:a16="http://schemas.microsoft.com/office/drawing/2014/main" id="{D3634FBF-33F4-941B-F591-4E3553F9D244}"/>
+              </a:ext>
+            </a:extLst>
+          </p:cNvPr>
+          <p:cNvPicPr>
+            <a:picLocks noChangeAspect="1" noChangeArrowheads="1"/>
+          </p:cNvPicPr>
+          <p:nvPr/>
+        </p:nvPicPr>
+        <p:blipFill>
+          <a:blip r:embed="rId4">
+            <a:extLst>
+              <a:ext uri="{28A0092B-C50C-407E-A947-70E740481C1C}">
+                <a14:useLocalDpi xmlns:a14="http://schemas.microsoft.com/office/drawing/2010/main" val="0"/>
+              </a:ext>
+            </a:extLst>
+          </a:blip>
+          <a:srcRect/>
+          <a:stretch>
+            <a:fillRect/>
+          </a:stretch>
+        </p:blipFill>
+        <p:spPr bwMode="auto">
+          <a:xfrm>
+            <a:off x="1578518" y="195064"/>
+            <a:ext cx="4983023" cy="2491512"/>
+          </a:xfrm>
+          <a:prstGeom prst="rect">
+            <a:avLst/>
+          </a:prstGeom>
+          <a:noFill/>
+          <a:extLst>
+            <a:ext uri="{909E8E84-426E-40DD-AFC4-6F175D3DCCD1}">
+              <a14:hiddenFill xmlns:a14="http://schemas.microsoft.com/office/drawing/2010/main">
+                <a:solidFill>
+                  <a:srgbClr val="FFFFFF"/>
+                </a:solidFill>
+              </a14:hiddenFill>
+            </a:ext>
+          </a:extLst>
+        </p:spPr>
+      </p:pic>
     </p:spTree>
     <p:extLst>
       <p:ext uri="{BB962C8B-B14F-4D97-AF65-F5344CB8AC3E}">
@@ -12391,13 +12438,13 @@
   <p:clrMapOvr>
     <a:masterClrMapping/>
   </p:clrMapOvr>
-  <mc:AlternateContent xmlns:mc="http://schemas.openxmlformats.org/markup-compatibility/2006">
-    <mc:Choice xmlns:p15="http://schemas.microsoft.com/office/powerpoint/2012/main" Requires="p15">
+  <mc:AlternateContent xmlns:mc="http://schemas.openxmlformats.org/markup-compatibility/2006" xmlns:p15="http://schemas.microsoft.com/office/powerpoint/2012/main">
+    <mc:Choice Requires="p15">
       <p:transition xmlns:p14="http://schemas.microsoft.com/office/powerpoint/2010/main" spd="slow" p14:dur="6000">
         <p15:prstTrans prst="curtains"/>
       </p:transition>
     </mc:Choice>
-    <mc:Fallback>
+    <mc:Fallback xmlns="">
       <p:transition spd="slow">
         <p:fade/>
       </p:transition>

</xml_diff>

<commit_message>
imagen para pros y contras
</commit_message>
<xml_diff>
--- a/Taller Nicolas Hoyos  y Mariana Gomez.pptx
+++ b/Taller Nicolas Hoyos  y Mariana Gomez.pptx
@@ -10119,6 +10119,53 @@
           </a:p>
         </p:txBody>
       </p:sp>
+      <p:pic>
+        <p:nvPicPr>
+          <p:cNvPr id="1026" name="Picture 2" descr="Pros y contras - Iconos gratis de social">
+            <a:extLst>
+              <a:ext uri="{FF2B5EF4-FFF2-40B4-BE49-F238E27FC236}">
+                <a16:creationId xmlns:a16="http://schemas.microsoft.com/office/drawing/2014/main" id="{4410FE5B-89A2-015D-3ECD-38675291EC94}"/>
+              </a:ext>
+            </a:extLst>
+          </p:cNvPr>
+          <p:cNvPicPr>
+            <a:picLocks noChangeAspect="1" noChangeArrowheads="1"/>
+          </p:cNvPicPr>
+          <p:nvPr/>
+        </p:nvPicPr>
+        <p:blipFill>
+          <a:blip r:embed="rId2">
+            <a:extLst>
+              <a:ext uri="{28A0092B-C50C-407E-A947-70E740481C1C}">
+                <a14:useLocalDpi xmlns:a14="http://schemas.microsoft.com/office/drawing/2010/main" val="0"/>
+              </a:ext>
+            </a:extLst>
+          </a:blip>
+          <a:srcRect/>
+          <a:stretch>
+            <a:fillRect/>
+          </a:stretch>
+        </p:blipFill>
+        <p:spPr bwMode="auto">
+          <a:xfrm>
+            <a:off x="8444945" y="2451173"/>
+            <a:ext cx="3417406" cy="3417406"/>
+          </a:xfrm>
+          <a:prstGeom prst="rect">
+            <a:avLst/>
+          </a:prstGeom>
+          <a:noFill/>
+          <a:extLst>
+            <a:ext uri="{909E8E84-426E-40DD-AFC4-6F175D3DCCD1}">
+              <a14:hiddenFill xmlns:a14="http://schemas.microsoft.com/office/drawing/2010/main">
+                <a:solidFill>
+                  <a:srgbClr val="FFFFFF"/>
+                </a:solidFill>
+              </a14:hiddenFill>
+            </a:ext>
+          </a:extLst>
+        </p:spPr>
+      </p:pic>
     </p:spTree>
     <p:extLst>
       <p:ext uri="{BB962C8B-B14F-4D97-AF65-F5344CB8AC3E}">

</xml_diff>

<commit_message>
Funciones faltantes y diapositivas
</commit_message>
<xml_diff>
--- a/Taller Nicolas Hoyos  y Mariana Gomez.pptx
+++ b/Taller Nicolas Hoyos  y Mariana Gomez.pptx
@@ -5,7 +5,7 @@
     <p:sldMasterId id="2147483648" r:id="rId1"/>
   </p:sldMasterIdLst>
   <p:notesMasterIdLst>
-    <p:notesMasterId r:id="rId15"/>
+    <p:notesMasterId r:id="rId20"/>
   </p:notesMasterIdLst>
   <p:sldIdLst>
     <p:sldId id="256" r:id="rId2"/>
@@ -21,6 +21,11 @@
     <p:sldId id="261" r:id="rId12"/>
     <p:sldId id="262" r:id="rId13"/>
     <p:sldId id="263" r:id="rId14"/>
+    <p:sldId id="269" r:id="rId15"/>
+    <p:sldId id="271" r:id="rId16"/>
+    <p:sldId id="270" r:id="rId17"/>
+    <p:sldId id="273" r:id="rId18"/>
+    <p:sldId id="272" r:id="rId19"/>
   </p:sldIdLst>
   <p:sldSz cx="12192000" cy="6858000"/>
   <p:notesSz cx="6858000" cy="9144000"/>
@@ -125,6 +130,18 @@
     </p:ext>
   </p:extLst>
 </p:presentation>
+</file>
+
+<file path=ppt/commentAuthors.xml><?xml version="1.0" encoding="utf-8"?>
+<p:cmAuthorLst xmlns:a="http://schemas.openxmlformats.org/drawingml/2006/main" xmlns:r="http://schemas.openxmlformats.org/officeDocument/2006/relationships" xmlns:p="http://schemas.openxmlformats.org/presentationml/2006/main">
+  <p:cmAuthor id="1" name="Julián Gómez" initials="JG" lastIdx="1" clrIdx="0">
+    <p:extLst>
+      <p:ext uri="{19B8F6BF-5375-455C-9EA6-DF929625EA0E}">
+        <p15:presenceInfo xmlns:p15="http://schemas.microsoft.com/office/powerpoint/2012/main" userId="094f093288a156ba" providerId="Windows Live"/>
+      </p:ext>
+    </p:extLst>
+  </p:cmAuthor>
+</p:cmAuthorLst>
 </file>
 
 <file path=ppt/diagrams/colors1.xml><?xml version="1.0" encoding="utf-8"?>
@@ -24178,6 +24195,2373 @@
 </p:sld>
 </file>
 
+<file path=ppt/slides/slide14.xml><?xml version="1.0" encoding="utf-8"?>
+<p:sld xmlns:a="http://schemas.openxmlformats.org/drawingml/2006/main" xmlns:r="http://schemas.openxmlformats.org/officeDocument/2006/relationships" xmlns:p="http://schemas.openxmlformats.org/presentationml/2006/main">
+  <p:cSld>
+    <p:bg>
+      <p:bgPr>
+        <a:solidFill>
+          <a:schemeClr val="bg1"/>
+        </a:solidFill>
+        <a:effectLst/>
+      </p:bgPr>
+    </p:bg>
+    <p:spTree>
+      <p:nvGrpSpPr>
+        <p:cNvPr id="1" name=""/>
+        <p:cNvGrpSpPr/>
+        <p:nvPr/>
+      </p:nvGrpSpPr>
+      <p:grpSpPr>
+        <a:xfrm>
+          <a:off x="0" y="0"/>
+          <a:ext cx="0" cy="0"/>
+          <a:chOff x="0" y="0"/>
+          <a:chExt cx="0" cy="0"/>
+        </a:xfrm>
+      </p:grpSpPr>
+      <p:sp useBgFill="1">
+        <p:nvSpPr>
+          <p:cNvPr id="2055" name="Rectangle 2054">
+            <a:extLst>
+              <a:ext uri="{FF2B5EF4-FFF2-40B4-BE49-F238E27FC236}">
+                <a16:creationId xmlns:a16="http://schemas.microsoft.com/office/drawing/2014/main" id="{A8384FB5-9ADC-4DDC-881B-597D56F5B15D}"/>
+              </a:ext>
+              <a:ext uri="{C183D7F6-B498-43B3-948B-1728B52AA6E4}">
+                <adec:decorative xmlns:adec="http://schemas.microsoft.com/office/drawing/2017/decorative" val="1"/>
+              </a:ext>
+            </a:extLst>
+          </p:cNvPr>
+          <p:cNvSpPr>
+            <a:spLocks noGrp="1" noRot="1" noChangeAspect="1" noMove="1" noResize="1" noEditPoints="1" noAdjustHandles="1" noChangeArrowheads="1" noChangeShapeType="1" noTextEdit="1"/>
+          </p:cNvSpPr>
+          <p:nvPr>
+            <p:extLst>
+              <p:ext uri="{386F3935-93C4-4BCD-93E2-E3B085C9AB24}">
+                <p16:designElem xmlns:p16="http://schemas.microsoft.com/office/powerpoint/2015/main" val="1"/>
+              </p:ext>
+            </p:extLst>
+          </p:nvPr>
+        </p:nvSpPr>
+        <p:spPr>
+          <a:xfrm>
+            <a:off x="0" y="0"/>
+            <a:ext cx="12192000" cy="6858000"/>
+          </a:xfrm>
+          <a:prstGeom prst="rect">
+            <a:avLst/>
+          </a:prstGeom>
+          <a:ln w="12700" cap="flat" cmpd="sng" algn="ctr">
+            <a:noFill/>
+            <a:prstDash val="solid"/>
+            <a:miter lim="800000"/>
+          </a:ln>
+          <a:effectLst/>
+          <a:extLst>
+            <a:ext uri="{91240B29-F687-4F45-9708-019B960494DF}">
+              <a14:hiddenLine xmlns:a14="http://schemas.microsoft.com/office/drawing/2010/main" w="12700" cap="flat" cmpd="sng" algn="ctr">
+                <a:solidFill>
+                  <a:schemeClr val="accent1">
+                    <a:shade val="50000"/>
+                  </a:schemeClr>
+                </a:solidFill>
+                <a:prstDash val="solid"/>
+                <a:miter lim="800000"/>
+              </a14:hiddenLine>
+            </a:ext>
+          </a:extLst>
+        </p:spPr>
+        <p:style>
+          <a:lnRef idx="2">
+            <a:schemeClr val="accent1">
+              <a:shade val="50000"/>
+            </a:schemeClr>
+          </a:lnRef>
+          <a:fillRef idx="1">
+            <a:schemeClr val="accent1"/>
+          </a:fillRef>
+          <a:effectRef idx="0">
+            <a:schemeClr val="accent1"/>
+          </a:effectRef>
+          <a:fontRef idx="minor">
+            <a:schemeClr val="lt1"/>
+          </a:fontRef>
+        </p:style>
+        <p:txBody>
+          <a:bodyPr rtlCol="0" anchor="ctr"/>
+          <a:lstStyle/>
+          <a:p>
+            <a:pPr algn="ctr"/>
+            <a:endParaRPr lang="en-US"/>
+          </a:p>
+        </p:txBody>
+      </p:sp>
+      <p:sp>
+        <p:nvSpPr>
+          <p:cNvPr id="2057" name="Rectangle 2056">
+            <a:extLst>
+              <a:ext uri="{FF2B5EF4-FFF2-40B4-BE49-F238E27FC236}">
+                <a16:creationId xmlns:a16="http://schemas.microsoft.com/office/drawing/2014/main" id="{1199E1B1-A8C0-4FE8-A5A8-1CB41D69F857}"/>
+              </a:ext>
+              <a:ext uri="{C183D7F6-B498-43B3-948B-1728B52AA6E4}">
+                <adec:decorative xmlns:adec="http://schemas.microsoft.com/office/drawing/2017/decorative" val="1"/>
+              </a:ext>
+            </a:extLst>
+          </p:cNvPr>
+          <p:cNvSpPr>
+            <a:spLocks noGrp="1" noRot="1" noChangeAspect="1" noMove="1" noResize="1" noEditPoints="1" noAdjustHandles="1" noChangeArrowheads="1" noChangeShapeType="1" noTextEdit="1"/>
+          </p:cNvSpPr>
+          <p:nvPr>
+            <p:extLst>
+              <p:ext uri="{386F3935-93C4-4BCD-93E2-E3B085C9AB24}">
+                <p16:designElem xmlns:p16="http://schemas.microsoft.com/office/powerpoint/2015/main" val="1"/>
+              </p:ext>
+            </p:extLst>
+          </p:nvPr>
+        </p:nvSpPr>
+        <p:spPr>
+          <a:xfrm rot="10800000" flipH="1">
+            <a:off x="2" y="0"/>
+            <a:ext cx="12191998" cy="1575955"/>
+          </a:xfrm>
+          <a:prstGeom prst="rect">
+            <a:avLst/>
+          </a:prstGeom>
+          <a:gradFill>
+            <a:gsLst>
+              <a:gs pos="0">
+                <a:srgbClr val="000000">
+                  <a:alpha val="96000"/>
+                </a:srgbClr>
+              </a:gs>
+              <a:gs pos="100000">
+                <a:schemeClr val="accent1">
+                  <a:lumMod val="75000"/>
+                </a:schemeClr>
+              </a:gs>
+            </a:gsLst>
+            <a:lin ang="6000000" scaled="0"/>
+          </a:gradFill>
+          <a:ln>
+            <a:noFill/>
+          </a:ln>
+        </p:spPr>
+        <p:style>
+          <a:lnRef idx="2">
+            <a:schemeClr val="accent1">
+              <a:shade val="50000"/>
+            </a:schemeClr>
+          </a:lnRef>
+          <a:fillRef idx="1">
+            <a:schemeClr val="accent1"/>
+          </a:fillRef>
+          <a:effectRef idx="0">
+            <a:schemeClr val="accent1"/>
+          </a:effectRef>
+          <a:fontRef idx="minor">
+            <a:schemeClr val="lt1"/>
+          </a:fontRef>
+        </p:style>
+        <p:txBody>
+          <a:bodyPr rtlCol="0" anchor="ctr"/>
+          <a:lstStyle/>
+          <a:p>
+            <a:pPr algn="ctr"/>
+            <a:endParaRPr lang="en-US"/>
+          </a:p>
+        </p:txBody>
+      </p:sp>
+      <p:sp>
+        <p:nvSpPr>
+          <p:cNvPr id="2059" name="Rectangle 2058">
+            <a:extLst>
+              <a:ext uri="{FF2B5EF4-FFF2-40B4-BE49-F238E27FC236}">
+                <a16:creationId xmlns:a16="http://schemas.microsoft.com/office/drawing/2014/main" id="{84A8DE83-DE75-4B41-9DB4-A7EC0B0DEC0B}"/>
+              </a:ext>
+              <a:ext uri="{C183D7F6-B498-43B3-948B-1728B52AA6E4}">
+                <adec:decorative xmlns:adec="http://schemas.microsoft.com/office/drawing/2017/decorative" val="1"/>
+              </a:ext>
+            </a:extLst>
+          </p:cNvPr>
+          <p:cNvSpPr>
+            <a:spLocks noGrp="1" noRot="1" noChangeAspect="1" noMove="1" noResize="1" noEditPoints="1" noAdjustHandles="1" noChangeArrowheads="1" noChangeShapeType="1" noTextEdit="1"/>
+          </p:cNvSpPr>
+          <p:nvPr>
+            <p:extLst>
+              <p:ext uri="{386F3935-93C4-4BCD-93E2-E3B085C9AB24}">
+                <p16:designElem xmlns:p16="http://schemas.microsoft.com/office/powerpoint/2015/main" val="1"/>
+              </p:ext>
+            </p:extLst>
+          </p:nvPr>
+        </p:nvSpPr>
+        <p:spPr>
+          <a:xfrm>
+            <a:off x="0" y="0"/>
+            <a:ext cx="8128856" cy="1575461"/>
+          </a:xfrm>
+          <a:prstGeom prst="rect">
+            <a:avLst/>
+          </a:prstGeom>
+          <a:gradFill>
+            <a:gsLst>
+              <a:gs pos="0">
+                <a:schemeClr val="accent1">
+                  <a:alpha val="41000"/>
+                </a:schemeClr>
+              </a:gs>
+              <a:gs pos="74000">
+                <a:schemeClr val="accent1">
+                  <a:lumMod val="60000"/>
+                  <a:lumOff val="40000"/>
+                  <a:alpha val="0"/>
+                </a:schemeClr>
+              </a:gs>
+            </a:gsLst>
+            <a:lin ang="8400000" scaled="0"/>
+          </a:gradFill>
+          <a:ln>
+            <a:noFill/>
+          </a:ln>
+        </p:spPr>
+        <p:style>
+          <a:lnRef idx="2">
+            <a:schemeClr val="accent1">
+              <a:shade val="50000"/>
+            </a:schemeClr>
+          </a:lnRef>
+          <a:fillRef idx="1">
+            <a:schemeClr val="accent1"/>
+          </a:fillRef>
+          <a:effectRef idx="0">
+            <a:schemeClr val="accent1"/>
+          </a:effectRef>
+          <a:fontRef idx="minor">
+            <a:schemeClr val="lt1"/>
+          </a:fontRef>
+        </p:style>
+        <p:txBody>
+          <a:bodyPr rtlCol="0" anchor="ctr"/>
+          <a:lstStyle/>
+          <a:p>
+            <a:pPr algn="ctr"/>
+            <a:endParaRPr lang="en-US"/>
+          </a:p>
+        </p:txBody>
+      </p:sp>
+      <p:sp>
+        <p:nvSpPr>
+          <p:cNvPr id="2061" name="Rectangle 2060">
+            <a:extLst>
+              <a:ext uri="{FF2B5EF4-FFF2-40B4-BE49-F238E27FC236}">
+                <a16:creationId xmlns:a16="http://schemas.microsoft.com/office/drawing/2014/main" id="{A7009A0A-BEF5-4EAC-AF15-E4F9F002E239}"/>
+              </a:ext>
+              <a:ext uri="{C183D7F6-B498-43B3-948B-1728B52AA6E4}">
+                <adec:decorative xmlns:adec="http://schemas.microsoft.com/office/drawing/2017/decorative" val="1"/>
+              </a:ext>
+            </a:extLst>
+          </p:cNvPr>
+          <p:cNvSpPr>
+            <a:spLocks noGrp="1" noRot="1" noChangeAspect="1" noMove="1" noResize="1" noEditPoints="1" noAdjustHandles="1" noChangeArrowheads="1" noChangeShapeType="1" noTextEdit="1"/>
+          </p:cNvSpPr>
+          <p:nvPr>
+            <p:extLst>
+              <p:ext uri="{386F3935-93C4-4BCD-93E2-E3B085C9AB24}">
+                <p16:designElem xmlns:p16="http://schemas.microsoft.com/office/powerpoint/2015/main" val="1"/>
+              </p:ext>
+            </p:extLst>
+          </p:nvPr>
+        </p:nvSpPr>
+        <p:spPr>
+          <a:xfrm flipH="1">
+            <a:off x="-3" y="-1"/>
+            <a:ext cx="12192002" cy="1574311"/>
+          </a:xfrm>
+          <a:prstGeom prst="rect">
+            <a:avLst/>
+          </a:prstGeom>
+          <a:gradFill>
+            <a:gsLst>
+              <a:gs pos="0">
+                <a:srgbClr val="000000">
+                  <a:alpha val="63000"/>
+                </a:srgbClr>
+              </a:gs>
+              <a:gs pos="78000">
+                <a:schemeClr val="accent1">
+                  <a:alpha val="15000"/>
+                </a:schemeClr>
+              </a:gs>
+            </a:gsLst>
+            <a:lin ang="15600000" scaled="0"/>
+          </a:gradFill>
+          <a:ln>
+            <a:noFill/>
+          </a:ln>
+        </p:spPr>
+        <p:style>
+          <a:lnRef idx="2">
+            <a:schemeClr val="accent1">
+              <a:shade val="50000"/>
+            </a:schemeClr>
+          </a:lnRef>
+          <a:fillRef idx="1">
+            <a:schemeClr val="accent1"/>
+          </a:fillRef>
+          <a:effectRef idx="0">
+            <a:schemeClr val="accent1"/>
+          </a:effectRef>
+          <a:fontRef idx="minor">
+            <a:schemeClr val="lt1"/>
+          </a:fontRef>
+        </p:style>
+        <p:txBody>
+          <a:bodyPr rtlCol="0" anchor="ctr"/>
+          <a:lstStyle/>
+          <a:p>
+            <a:pPr algn="ctr"/>
+            <a:endParaRPr lang="en-US"/>
+          </a:p>
+        </p:txBody>
+      </p:sp>
+      <p:sp>
+        <p:nvSpPr>
+          <p:cNvPr id="2" name="Título 1">
+            <a:extLst>
+              <a:ext uri="{FF2B5EF4-FFF2-40B4-BE49-F238E27FC236}">
+                <a16:creationId xmlns:a16="http://schemas.microsoft.com/office/drawing/2014/main" id="{9B2594E6-7212-20CD-338A-1C52F7F868FE}"/>
+              </a:ext>
+            </a:extLst>
+          </p:cNvPr>
+          <p:cNvSpPr>
+            <a:spLocks noGrp="1"/>
+          </p:cNvSpPr>
+          <p:nvPr>
+            <p:ph type="title"/>
+          </p:nvPr>
+        </p:nvSpPr>
+        <p:spPr>
+          <a:xfrm>
+            <a:off x="699713" y="248038"/>
+            <a:ext cx="7063721" cy="1159200"/>
+          </a:xfrm>
+        </p:spPr>
+        <p:txBody>
+          <a:bodyPr vert="horz" lIns="91440" tIns="45720" rIns="91440" bIns="45720" rtlCol="0" anchor="ctr">
+            <a:normAutofit/>
+          </a:bodyPr>
+          <a:lstStyle/>
+          <a:p>
+            <a:r>
+              <a:rPr lang="en-US" sz="4000" kern="1200" dirty="0">
+                <a:solidFill>
+                  <a:srgbClr val="FFFFFF"/>
+                </a:solidFill>
+                <a:latin typeface="+mj-lt"/>
+                <a:ea typeface="+mj-ea"/>
+                <a:cs typeface="+mj-cs"/>
+              </a:rPr>
+              <a:t>30 </a:t>
+            </a:r>
+            <a:r>
+              <a:rPr lang="en-US" sz="4000" kern="1200" dirty="0" err="1">
+                <a:solidFill>
+                  <a:srgbClr val="FFFFFF"/>
+                </a:solidFill>
+                <a:latin typeface="+mj-lt"/>
+                <a:ea typeface="+mj-ea"/>
+                <a:cs typeface="+mj-cs"/>
+              </a:rPr>
+              <a:t>Funciones</a:t>
+            </a:r>
+            <a:endParaRPr lang="en-US" sz="4000" kern="1200" dirty="0">
+              <a:solidFill>
+                <a:srgbClr val="FFFFFF"/>
+              </a:solidFill>
+              <a:latin typeface="+mj-lt"/>
+              <a:ea typeface="+mj-ea"/>
+              <a:cs typeface="+mj-cs"/>
+            </a:endParaRPr>
+          </a:p>
+        </p:txBody>
+      </p:sp>
+      <p:pic>
+        <p:nvPicPr>
+          <p:cNvPr id="6" name="Imagen 5">
+            <a:extLst>
+              <a:ext uri="{FF2B5EF4-FFF2-40B4-BE49-F238E27FC236}">
+                <a16:creationId xmlns:a16="http://schemas.microsoft.com/office/drawing/2014/main" id="{04AC664B-AE5B-4DCD-A6E1-B7AB5360D8E7}"/>
+              </a:ext>
+            </a:extLst>
+          </p:cNvPr>
+          <p:cNvPicPr>
+            <a:picLocks noChangeAspect="1"/>
+          </p:cNvPicPr>
+          <p:nvPr/>
+        </p:nvPicPr>
+        <p:blipFill>
+          <a:blip r:embed="rId2"/>
+          <a:stretch>
+            <a:fillRect/>
+          </a:stretch>
+        </p:blipFill>
+        <p:spPr>
+          <a:xfrm>
+            <a:off x="1439997" y="1655276"/>
+            <a:ext cx="3951153" cy="4960415"/>
+          </a:xfrm>
+          <a:prstGeom prst="rect">
+            <a:avLst/>
+          </a:prstGeom>
+        </p:spPr>
+      </p:pic>
+      <p:pic>
+        <p:nvPicPr>
+          <p:cNvPr id="8" name="Imagen 7">
+            <a:extLst>
+              <a:ext uri="{FF2B5EF4-FFF2-40B4-BE49-F238E27FC236}">
+                <a16:creationId xmlns:a16="http://schemas.microsoft.com/office/drawing/2014/main" id="{ABBF4DF0-A35D-4ABC-9127-23EE095854E1}"/>
+              </a:ext>
+            </a:extLst>
+          </p:cNvPr>
+          <p:cNvPicPr>
+            <a:picLocks noChangeAspect="1"/>
+          </p:cNvPicPr>
+          <p:nvPr/>
+        </p:nvPicPr>
+        <p:blipFill>
+          <a:blip r:embed="rId3"/>
+          <a:stretch>
+            <a:fillRect/>
+          </a:stretch>
+        </p:blipFill>
+        <p:spPr>
+          <a:xfrm>
+            <a:off x="7282655" y="1649548"/>
+            <a:ext cx="3164228" cy="4954686"/>
+          </a:xfrm>
+          <a:prstGeom prst="rect">
+            <a:avLst/>
+          </a:prstGeom>
+        </p:spPr>
+      </p:pic>
+    </p:spTree>
+    <p:extLst>
+      <p:ext uri="{BB962C8B-B14F-4D97-AF65-F5344CB8AC3E}">
+        <p14:creationId xmlns:p14="http://schemas.microsoft.com/office/powerpoint/2010/main" val="568518960"/>
+      </p:ext>
+    </p:extLst>
+  </p:cSld>
+  <p:clrMapOvr>
+    <a:masterClrMapping/>
+  </p:clrMapOvr>
+  <mc:AlternateContent xmlns:mc="http://schemas.openxmlformats.org/markup-compatibility/2006">
+    <mc:Choice xmlns:p15="http://schemas.microsoft.com/office/powerpoint/2012/main" Requires="p15">
+      <p:transition xmlns:p14="http://schemas.microsoft.com/office/powerpoint/2010/main" spd="slow" p14:dur="2000">
+        <p15:prstTrans prst="prestige"/>
+      </p:transition>
+    </mc:Choice>
+    <mc:Fallback>
+      <p:transition spd="slow">
+        <p:fade/>
+      </p:transition>
+    </mc:Fallback>
+  </mc:AlternateContent>
+</p:sld>
+</file>
+
+<file path=ppt/slides/slide15.xml><?xml version="1.0" encoding="utf-8"?>
+<p:sld xmlns:a="http://schemas.openxmlformats.org/drawingml/2006/main" xmlns:r="http://schemas.openxmlformats.org/officeDocument/2006/relationships" xmlns:p="http://schemas.openxmlformats.org/presentationml/2006/main">
+  <p:cSld>
+    <p:bg>
+      <p:bgPr>
+        <a:solidFill>
+          <a:schemeClr val="bg1"/>
+        </a:solidFill>
+        <a:effectLst/>
+      </p:bgPr>
+    </p:bg>
+    <p:spTree>
+      <p:nvGrpSpPr>
+        <p:cNvPr id="1" name=""/>
+        <p:cNvGrpSpPr/>
+        <p:nvPr/>
+      </p:nvGrpSpPr>
+      <p:grpSpPr>
+        <a:xfrm>
+          <a:off x="0" y="0"/>
+          <a:ext cx="0" cy="0"/>
+          <a:chOff x="0" y="0"/>
+          <a:chExt cx="0" cy="0"/>
+        </a:xfrm>
+      </p:grpSpPr>
+      <p:sp useBgFill="1">
+        <p:nvSpPr>
+          <p:cNvPr id="2055" name="Rectangle 2054">
+            <a:extLst>
+              <a:ext uri="{FF2B5EF4-FFF2-40B4-BE49-F238E27FC236}">
+                <a16:creationId xmlns:a16="http://schemas.microsoft.com/office/drawing/2014/main" id="{A8384FB5-9ADC-4DDC-881B-597D56F5B15D}"/>
+              </a:ext>
+              <a:ext uri="{C183D7F6-B498-43B3-948B-1728B52AA6E4}">
+                <adec:decorative xmlns:adec="http://schemas.microsoft.com/office/drawing/2017/decorative" val="1"/>
+              </a:ext>
+            </a:extLst>
+          </p:cNvPr>
+          <p:cNvSpPr>
+            <a:spLocks noGrp="1" noRot="1" noChangeAspect="1" noMove="1" noResize="1" noEditPoints="1" noAdjustHandles="1" noChangeArrowheads="1" noChangeShapeType="1" noTextEdit="1"/>
+          </p:cNvSpPr>
+          <p:nvPr>
+            <p:extLst>
+              <p:ext uri="{386F3935-93C4-4BCD-93E2-E3B085C9AB24}">
+                <p16:designElem xmlns:p16="http://schemas.microsoft.com/office/powerpoint/2015/main" val="1"/>
+              </p:ext>
+            </p:extLst>
+          </p:nvPr>
+        </p:nvSpPr>
+        <p:spPr>
+          <a:xfrm>
+            <a:off x="0" y="0"/>
+            <a:ext cx="12192000" cy="6858000"/>
+          </a:xfrm>
+          <a:prstGeom prst="rect">
+            <a:avLst/>
+          </a:prstGeom>
+          <a:ln w="12700" cap="flat" cmpd="sng" algn="ctr">
+            <a:noFill/>
+            <a:prstDash val="solid"/>
+            <a:miter lim="800000"/>
+          </a:ln>
+          <a:effectLst/>
+          <a:extLst>
+            <a:ext uri="{91240B29-F687-4F45-9708-019B960494DF}">
+              <a14:hiddenLine xmlns:a14="http://schemas.microsoft.com/office/drawing/2010/main" w="12700" cap="flat" cmpd="sng" algn="ctr">
+                <a:solidFill>
+                  <a:schemeClr val="accent1">
+                    <a:shade val="50000"/>
+                  </a:schemeClr>
+                </a:solidFill>
+                <a:prstDash val="solid"/>
+                <a:miter lim="800000"/>
+              </a14:hiddenLine>
+            </a:ext>
+          </a:extLst>
+        </p:spPr>
+        <p:style>
+          <a:lnRef idx="2">
+            <a:schemeClr val="accent1">
+              <a:shade val="50000"/>
+            </a:schemeClr>
+          </a:lnRef>
+          <a:fillRef idx="1">
+            <a:schemeClr val="accent1"/>
+          </a:fillRef>
+          <a:effectRef idx="0">
+            <a:schemeClr val="accent1"/>
+          </a:effectRef>
+          <a:fontRef idx="minor">
+            <a:schemeClr val="lt1"/>
+          </a:fontRef>
+        </p:style>
+        <p:txBody>
+          <a:bodyPr rtlCol="0" anchor="ctr"/>
+          <a:lstStyle/>
+          <a:p>
+            <a:pPr algn="ctr"/>
+            <a:endParaRPr lang="en-US"/>
+          </a:p>
+        </p:txBody>
+      </p:sp>
+      <p:sp>
+        <p:nvSpPr>
+          <p:cNvPr id="2057" name="Rectangle 2056">
+            <a:extLst>
+              <a:ext uri="{FF2B5EF4-FFF2-40B4-BE49-F238E27FC236}">
+                <a16:creationId xmlns:a16="http://schemas.microsoft.com/office/drawing/2014/main" id="{1199E1B1-A8C0-4FE8-A5A8-1CB41D69F857}"/>
+              </a:ext>
+              <a:ext uri="{C183D7F6-B498-43B3-948B-1728B52AA6E4}">
+                <adec:decorative xmlns:adec="http://schemas.microsoft.com/office/drawing/2017/decorative" val="1"/>
+              </a:ext>
+            </a:extLst>
+          </p:cNvPr>
+          <p:cNvSpPr>
+            <a:spLocks noGrp="1" noRot="1" noChangeAspect="1" noMove="1" noResize="1" noEditPoints="1" noAdjustHandles="1" noChangeArrowheads="1" noChangeShapeType="1" noTextEdit="1"/>
+          </p:cNvSpPr>
+          <p:nvPr>
+            <p:extLst>
+              <p:ext uri="{386F3935-93C4-4BCD-93E2-E3B085C9AB24}">
+                <p16:designElem xmlns:p16="http://schemas.microsoft.com/office/powerpoint/2015/main" val="1"/>
+              </p:ext>
+            </p:extLst>
+          </p:nvPr>
+        </p:nvSpPr>
+        <p:spPr>
+          <a:xfrm rot="10800000" flipH="1">
+            <a:off x="2" y="0"/>
+            <a:ext cx="12191998" cy="1575955"/>
+          </a:xfrm>
+          <a:prstGeom prst="rect">
+            <a:avLst/>
+          </a:prstGeom>
+          <a:gradFill>
+            <a:gsLst>
+              <a:gs pos="0">
+                <a:srgbClr val="000000">
+                  <a:alpha val="96000"/>
+                </a:srgbClr>
+              </a:gs>
+              <a:gs pos="100000">
+                <a:schemeClr val="accent1">
+                  <a:lumMod val="75000"/>
+                </a:schemeClr>
+              </a:gs>
+            </a:gsLst>
+            <a:lin ang="6000000" scaled="0"/>
+          </a:gradFill>
+          <a:ln>
+            <a:noFill/>
+          </a:ln>
+        </p:spPr>
+        <p:style>
+          <a:lnRef idx="2">
+            <a:schemeClr val="accent1">
+              <a:shade val="50000"/>
+            </a:schemeClr>
+          </a:lnRef>
+          <a:fillRef idx="1">
+            <a:schemeClr val="accent1"/>
+          </a:fillRef>
+          <a:effectRef idx="0">
+            <a:schemeClr val="accent1"/>
+          </a:effectRef>
+          <a:fontRef idx="minor">
+            <a:schemeClr val="lt1"/>
+          </a:fontRef>
+        </p:style>
+        <p:txBody>
+          <a:bodyPr rtlCol="0" anchor="ctr"/>
+          <a:lstStyle/>
+          <a:p>
+            <a:pPr algn="ctr"/>
+            <a:endParaRPr lang="en-US"/>
+          </a:p>
+        </p:txBody>
+      </p:sp>
+      <p:sp>
+        <p:nvSpPr>
+          <p:cNvPr id="2059" name="Rectangle 2058">
+            <a:extLst>
+              <a:ext uri="{FF2B5EF4-FFF2-40B4-BE49-F238E27FC236}">
+                <a16:creationId xmlns:a16="http://schemas.microsoft.com/office/drawing/2014/main" id="{84A8DE83-DE75-4B41-9DB4-A7EC0B0DEC0B}"/>
+              </a:ext>
+              <a:ext uri="{C183D7F6-B498-43B3-948B-1728B52AA6E4}">
+                <adec:decorative xmlns:adec="http://schemas.microsoft.com/office/drawing/2017/decorative" val="1"/>
+              </a:ext>
+            </a:extLst>
+          </p:cNvPr>
+          <p:cNvSpPr>
+            <a:spLocks noGrp="1" noRot="1" noChangeAspect="1" noMove="1" noResize="1" noEditPoints="1" noAdjustHandles="1" noChangeArrowheads="1" noChangeShapeType="1" noTextEdit="1"/>
+          </p:cNvSpPr>
+          <p:nvPr>
+            <p:extLst>
+              <p:ext uri="{386F3935-93C4-4BCD-93E2-E3B085C9AB24}">
+                <p16:designElem xmlns:p16="http://schemas.microsoft.com/office/powerpoint/2015/main" val="1"/>
+              </p:ext>
+            </p:extLst>
+          </p:nvPr>
+        </p:nvSpPr>
+        <p:spPr>
+          <a:xfrm>
+            <a:off x="0" y="0"/>
+            <a:ext cx="8128856" cy="1575461"/>
+          </a:xfrm>
+          <a:prstGeom prst="rect">
+            <a:avLst/>
+          </a:prstGeom>
+          <a:gradFill>
+            <a:gsLst>
+              <a:gs pos="0">
+                <a:schemeClr val="accent1">
+                  <a:alpha val="41000"/>
+                </a:schemeClr>
+              </a:gs>
+              <a:gs pos="74000">
+                <a:schemeClr val="accent1">
+                  <a:lumMod val="60000"/>
+                  <a:lumOff val="40000"/>
+                  <a:alpha val="0"/>
+                </a:schemeClr>
+              </a:gs>
+            </a:gsLst>
+            <a:lin ang="8400000" scaled="0"/>
+          </a:gradFill>
+          <a:ln>
+            <a:noFill/>
+          </a:ln>
+        </p:spPr>
+        <p:style>
+          <a:lnRef idx="2">
+            <a:schemeClr val="accent1">
+              <a:shade val="50000"/>
+            </a:schemeClr>
+          </a:lnRef>
+          <a:fillRef idx="1">
+            <a:schemeClr val="accent1"/>
+          </a:fillRef>
+          <a:effectRef idx="0">
+            <a:schemeClr val="accent1"/>
+          </a:effectRef>
+          <a:fontRef idx="minor">
+            <a:schemeClr val="lt1"/>
+          </a:fontRef>
+        </p:style>
+        <p:txBody>
+          <a:bodyPr rtlCol="0" anchor="ctr"/>
+          <a:lstStyle/>
+          <a:p>
+            <a:pPr algn="ctr"/>
+            <a:endParaRPr lang="en-US"/>
+          </a:p>
+        </p:txBody>
+      </p:sp>
+      <p:sp>
+        <p:nvSpPr>
+          <p:cNvPr id="2061" name="Rectangle 2060">
+            <a:extLst>
+              <a:ext uri="{FF2B5EF4-FFF2-40B4-BE49-F238E27FC236}">
+                <a16:creationId xmlns:a16="http://schemas.microsoft.com/office/drawing/2014/main" id="{A7009A0A-BEF5-4EAC-AF15-E4F9F002E239}"/>
+              </a:ext>
+              <a:ext uri="{C183D7F6-B498-43B3-948B-1728B52AA6E4}">
+                <adec:decorative xmlns:adec="http://schemas.microsoft.com/office/drawing/2017/decorative" val="1"/>
+              </a:ext>
+            </a:extLst>
+          </p:cNvPr>
+          <p:cNvSpPr>
+            <a:spLocks noGrp="1" noRot="1" noChangeAspect="1" noMove="1" noResize="1" noEditPoints="1" noAdjustHandles="1" noChangeArrowheads="1" noChangeShapeType="1" noTextEdit="1"/>
+          </p:cNvSpPr>
+          <p:nvPr>
+            <p:extLst>
+              <p:ext uri="{386F3935-93C4-4BCD-93E2-E3B085C9AB24}">
+                <p16:designElem xmlns:p16="http://schemas.microsoft.com/office/powerpoint/2015/main" val="1"/>
+              </p:ext>
+            </p:extLst>
+          </p:nvPr>
+        </p:nvSpPr>
+        <p:spPr>
+          <a:xfrm flipH="1">
+            <a:off x="-3" y="-1"/>
+            <a:ext cx="12192002" cy="1574311"/>
+          </a:xfrm>
+          <a:prstGeom prst="rect">
+            <a:avLst/>
+          </a:prstGeom>
+          <a:gradFill>
+            <a:gsLst>
+              <a:gs pos="0">
+                <a:srgbClr val="000000">
+                  <a:alpha val="63000"/>
+                </a:srgbClr>
+              </a:gs>
+              <a:gs pos="78000">
+                <a:schemeClr val="accent1">
+                  <a:alpha val="15000"/>
+                </a:schemeClr>
+              </a:gs>
+            </a:gsLst>
+            <a:lin ang="15600000" scaled="0"/>
+          </a:gradFill>
+          <a:ln>
+            <a:noFill/>
+          </a:ln>
+        </p:spPr>
+        <p:style>
+          <a:lnRef idx="2">
+            <a:schemeClr val="accent1">
+              <a:shade val="50000"/>
+            </a:schemeClr>
+          </a:lnRef>
+          <a:fillRef idx="1">
+            <a:schemeClr val="accent1"/>
+          </a:fillRef>
+          <a:effectRef idx="0">
+            <a:schemeClr val="accent1"/>
+          </a:effectRef>
+          <a:fontRef idx="minor">
+            <a:schemeClr val="lt1"/>
+          </a:fontRef>
+        </p:style>
+        <p:txBody>
+          <a:bodyPr rtlCol="0" anchor="ctr"/>
+          <a:lstStyle/>
+          <a:p>
+            <a:pPr algn="ctr"/>
+            <a:endParaRPr lang="en-US"/>
+          </a:p>
+        </p:txBody>
+      </p:sp>
+      <p:sp>
+        <p:nvSpPr>
+          <p:cNvPr id="2" name="Título 1">
+            <a:extLst>
+              <a:ext uri="{FF2B5EF4-FFF2-40B4-BE49-F238E27FC236}">
+                <a16:creationId xmlns:a16="http://schemas.microsoft.com/office/drawing/2014/main" id="{9B2594E6-7212-20CD-338A-1C52F7F868FE}"/>
+              </a:ext>
+            </a:extLst>
+          </p:cNvPr>
+          <p:cNvSpPr>
+            <a:spLocks noGrp="1"/>
+          </p:cNvSpPr>
+          <p:nvPr>
+            <p:ph type="title"/>
+          </p:nvPr>
+        </p:nvSpPr>
+        <p:spPr>
+          <a:xfrm>
+            <a:off x="699713" y="248038"/>
+            <a:ext cx="7063721" cy="1159200"/>
+          </a:xfrm>
+        </p:spPr>
+        <p:txBody>
+          <a:bodyPr vert="horz" lIns="91440" tIns="45720" rIns="91440" bIns="45720" rtlCol="0" anchor="ctr">
+            <a:normAutofit/>
+          </a:bodyPr>
+          <a:lstStyle/>
+          <a:p>
+            <a:r>
+              <a:rPr lang="en-US" sz="4000" kern="1200" dirty="0">
+                <a:solidFill>
+                  <a:srgbClr val="FFFFFF"/>
+                </a:solidFill>
+                <a:latin typeface="+mj-lt"/>
+                <a:ea typeface="+mj-ea"/>
+                <a:cs typeface="+mj-cs"/>
+              </a:rPr>
+              <a:t>30 </a:t>
+            </a:r>
+            <a:r>
+              <a:rPr lang="en-US" sz="4000" kern="1200" dirty="0" err="1">
+                <a:solidFill>
+                  <a:srgbClr val="FFFFFF"/>
+                </a:solidFill>
+                <a:latin typeface="+mj-lt"/>
+                <a:ea typeface="+mj-ea"/>
+                <a:cs typeface="+mj-cs"/>
+              </a:rPr>
+              <a:t>Funciones</a:t>
+            </a:r>
+            <a:endParaRPr lang="en-US" sz="4000" kern="1200" dirty="0">
+              <a:solidFill>
+                <a:srgbClr val="FFFFFF"/>
+              </a:solidFill>
+              <a:latin typeface="+mj-lt"/>
+              <a:ea typeface="+mj-ea"/>
+              <a:cs typeface="+mj-cs"/>
+            </a:endParaRPr>
+          </a:p>
+        </p:txBody>
+      </p:sp>
+      <p:pic>
+        <p:nvPicPr>
+          <p:cNvPr id="4" name="Imagen 3">
+            <a:extLst>
+              <a:ext uri="{FF2B5EF4-FFF2-40B4-BE49-F238E27FC236}">
+                <a16:creationId xmlns:a16="http://schemas.microsoft.com/office/drawing/2014/main" id="{7938CF51-4CAA-417F-B673-7A9CAB0334D2}"/>
+              </a:ext>
+            </a:extLst>
+          </p:cNvPr>
+          <p:cNvPicPr>
+            <a:picLocks noChangeAspect="1"/>
+          </p:cNvPicPr>
+          <p:nvPr/>
+        </p:nvPicPr>
+        <p:blipFill>
+          <a:blip r:embed="rId2"/>
+          <a:stretch>
+            <a:fillRect/>
+          </a:stretch>
+        </p:blipFill>
+        <p:spPr>
+          <a:xfrm>
+            <a:off x="536819" y="2102951"/>
+            <a:ext cx="6100687" cy="3802624"/>
+          </a:xfrm>
+          <a:prstGeom prst="rect">
+            <a:avLst/>
+          </a:prstGeom>
+        </p:spPr>
+      </p:pic>
+      <p:pic>
+        <p:nvPicPr>
+          <p:cNvPr id="6" name="Imagen 5">
+            <a:extLst>
+              <a:ext uri="{FF2B5EF4-FFF2-40B4-BE49-F238E27FC236}">
+                <a16:creationId xmlns:a16="http://schemas.microsoft.com/office/drawing/2014/main" id="{186119C2-038F-4410-B27B-309D9CE03CBF}"/>
+              </a:ext>
+            </a:extLst>
+          </p:cNvPr>
+          <p:cNvPicPr>
+            <a:picLocks noChangeAspect="1"/>
+          </p:cNvPicPr>
+          <p:nvPr/>
+        </p:nvPicPr>
+        <p:blipFill>
+          <a:blip r:embed="rId3"/>
+          <a:stretch>
+            <a:fillRect/>
+          </a:stretch>
+        </p:blipFill>
+        <p:spPr>
+          <a:xfrm>
+            <a:off x="7409741" y="1655276"/>
+            <a:ext cx="3833752" cy="4854248"/>
+          </a:xfrm>
+          <a:prstGeom prst="rect">
+            <a:avLst/>
+          </a:prstGeom>
+        </p:spPr>
+      </p:pic>
+    </p:spTree>
+    <p:extLst>
+      <p:ext uri="{BB962C8B-B14F-4D97-AF65-F5344CB8AC3E}">
+        <p14:creationId xmlns:p14="http://schemas.microsoft.com/office/powerpoint/2010/main" val="1551564737"/>
+      </p:ext>
+    </p:extLst>
+  </p:cSld>
+  <p:clrMapOvr>
+    <a:masterClrMapping/>
+  </p:clrMapOvr>
+  <mc:AlternateContent xmlns:mc="http://schemas.openxmlformats.org/markup-compatibility/2006">
+    <mc:Choice xmlns:p15="http://schemas.microsoft.com/office/powerpoint/2012/main" Requires="p15">
+      <p:transition xmlns:p14="http://schemas.microsoft.com/office/powerpoint/2010/main" spd="slow" p14:dur="2000">
+        <p15:prstTrans prst="prestige"/>
+      </p:transition>
+    </mc:Choice>
+    <mc:Fallback>
+      <p:transition spd="slow">
+        <p:fade/>
+      </p:transition>
+    </mc:Fallback>
+  </mc:AlternateContent>
+</p:sld>
+</file>
+
+<file path=ppt/slides/slide16.xml><?xml version="1.0" encoding="utf-8"?>
+<p:sld xmlns:a="http://schemas.openxmlformats.org/drawingml/2006/main" xmlns:r="http://schemas.openxmlformats.org/officeDocument/2006/relationships" xmlns:p="http://schemas.openxmlformats.org/presentationml/2006/main">
+  <p:cSld>
+    <p:bg>
+      <p:bgPr>
+        <a:solidFill>
+          <a:schemeClr val="bg1"/>
+        </a:solidFill>
+        <a:effectLst/>
+      </p:bgPr>
+    </p:bg>
+    <p:spTree>
+      <p:nvGrpSpPr>
+        <p:cNvPr id="1" name=""/>
+        <p:cNvGrpSpPr/>
+        <p:nvPr/>
+      </p:nvGrpSpPr>
+      <p:grpSpPr>
+        <a:xfrm>
+          <a:off x="0" y="0"/>
+          <a:ext cx="0" cy="0"/>
+          <a:chOff x="0" y="0"/>
+          <a:chExt cx="0" cy="0"/>
+        </a:xfrm>
+      </p:grpSpPr>
+      <p:sp useBgFill="1">
+        <p:nvSpPr>
+          <p:cNvPr id="2055" name="Rectangle 2054">
+            <a:extLst>
+              <a:ext uri="{FF2B5EF4-FFF2-40B4-BE49-F238E27FC236}">
+                <a16:creationId xmlns:a16="http://schemas.microsoft.com/office/drawing/2014/main" id="{A8384FB5-9ADC-4DDC-881B-597D56F5B15D}"/>
+              </a:ext>
+              <a:ext uri="{C183D7F6-B498-43B3-948B-1728B52AA6E4}">
+                <adec:decorative xmlns:adec="http://schemas.microsoft.com/office/drawing/2017/decorative" val="1"/>
+              </a:ext>
+            </a:extLst>
+          </p:cNvPr>
+          <p:cNvSpPr>
+            <a:spLocks noGrp="1" noRot="1" noChangeAspect="1" noMove="1" noResize="1" noEditPoints="1" noAdjustHandles="1" noChangeArrowheads="1" noChangeShapeType="1" noTextEdit="1"/>
+          </p:cNvSpPr>
+          <p:nvPr>
+            <p:extLst>
+              <p:ext uri="{386F3935-93C4-4BCD-93E2-E3B085C9AB24}">
+                <p16:designElem xmlns:p16="http://schemas.microsoft.com/office/powerpoint/2015/main" val="1"/>
+              </p:ext>
+            </p:extLst>
+          </p:nvPr>
+        </p:nvSpPr>
+        <p:spPr>
+          <a:xfrm>
+            <a:off x="0" y="0"/>
+            <a:ext cx="12192000" cy="6858000"/>
+          </a:xfrm>
+          <a:prstGeom prst="rect">
+            <a:avLst/>
+          </a:prstGeom>
+          <a:ln w="12700" cap="flat" cmpd="sng" algn="ctr">
+            <a:noFill/>
+            <a:prstDash val="solid"/>
+            <a:miter lim="800000"/>
+          </a:ln>
+          <a:effectLst/>
+          <a:extLst>
+            <a:ext uri="{91240B29-F687-4F45-9708-019B960494DF}">
+              <a14:hiddenLine xmlns:a14="http://schemas.microsoft.com/office/drawing/2010/main" w="12700" cap="flat" cmpd="sng" algn="ctr">
+                <a:solidFill>
+                  <a:schemeClr val="accent1">
+                    <a:shade val="50000"/>
+                  </a:schemeClr>
+                </a:solidFill>
+                <a:prstDash val="solid"/>
+                <a:miter lim="800000"/>
+              </a14:hiddenLine>
+            </a:ext>
+          </a:extLst>
+        </p:spPr>
+        <p:style>
+          <a:lnRef idx="2">
+            <a:schemeClr val="accent1">
+              <a:shade val="50000"/>
+            </a:schemeClr>
+          </a:lnRef>
+          <a:fillRef idx="1">
+            <a:schemeClr val="accent1"/>
+          </a:fillRef>
+          <a:effectRef idx="0">
+            <a:schemeClr val="accent1"/>
+          </a:effectRef>
+          <a:fontRef idx="minor">
+            <a:schemeClr val="lt1"/>
+          </a:fontRef>
+        </p:style>
+        <p:txBody>
+          <a:bodyPr rtlCol="0" anchor="ctr"/>
+          <a:lstStyle/>
+          <a:p>
+            <a:pPr algn="ctr"/>
+            <a:endParaRPr lang="en-US"/>
+          </a:p>
+        </p:txBody>
+      </p:sp>
+      <p:sp>
+        <p:nvSpPr>
+          <p:cNvPr id="2057" name="Rectangle 2056">
+            <a:extLst>
+              <a:ext uri="{FF2B5EF4-FFF2-40B4-BE49-F238E27FC236}">
+                <a16:creationId xmlns:a16="http://schemas.microsoft.com/office/drawing/2014/main" id="{1199E1B1-A8C0-4FE8-A5A8-1CB41D69F857}"/>
+              </a:ext>
+              <a:ext uri="{C183D7F6-B498-43B3-948B-1728B52AA6E4}">
+                <adec:decorative xmlns:adec="http://schemas.microsoft.com/office/drawing/2017/decorative" val="1"/>
+              </a:ext>
+            </a:extLst>
+          </p:cNvPr>
+          <p:cNvSpPr>
+            <a:spLocks noGrp="1" noRot="1" noChangeAspect="1" noMove="1" noResize="1" noEditPoints="1" noAdjustHandles="1" noChangeArrowheads="1" noChangeShapeType="1" noTextEdit="1"/>
+          </p:cNvSpPr>
+          <p:nvPr>
+            <p:extLst>
+              <p:ext uri="{386F3935-93C4-4BCD-93E2-E3B085C9AB24}">
+                <p16:designElem xmlns:p16="http://schemas.microsoft.com/office/powerpoint/2015/main" val="1"/>
+              </p:ext>
+            </p:extLst>
+          </p:nvPr>
+        </p:nvSpPr>
+        <p:spPr>
+          <a:xfrm rot="10800000" flipH="1">
+            <a:off x="2" y="0"/>
+            <a:ext cx="12191998" cy="1575955"/>
+          </a:xfrm>
+          <a:prstGeom prst="rect">
+            <a:avLst/>
+          </a:prstGeom>
+          <a:gradFill>
+            <a:gsLst>
+              <a:gs pos="0">
+                <a:srgbClr val="000000">
+                  <a:alpha val="96000"/>
+                </a:srgbClr>
+              </a:gs>
+              <a:gs pos="100000">
+                <a:schemeClr val="accent1">
+                  <a:lumMod val="75000"/>
+                </a:schemeClr>
+              </a:gs>
+            </a:gsLst>
+            <a:lin ang="6000000" scaled="0"/>
+          </a:gradFill>
+          <a:ln>
+            <a:noFill/>
+          </a:ln>
+        </p:spPr>
+        <p:style>
+          <a:lnRef idx="2">
+            <a:schemeClr val="accent1">
+              <a:shade val="50000"/>
+            </a:schemeClr>
+          </a:lnRef>
+          <a:fillRef idx="1">
+            <a:schemeClr val="accent1"/>
+          </a:fillRef>
+          <a:effectRef idx="0">
+            <a:schemeClr val="accent1"/>
+          </a:effectRef>
+          <a:fontRef idx="minor">
+            <a:schemeClr val="lt1"/>
+          </a:fontRef>
+        </p:style>
+        <p:txBody>
+          <a:bodyPr rtlCol="0" anchor="ctr"/>
+          <a:lstStyle/>
+          <a:p>
+            <a:pPr algn="ctr"/>
+            <a:endParaRPr lang="en-US"/>
+          </a:p>
+        </p:txBody>
+      </p:sp>
+      <p:sp>
+        <p:nvSpPr>
+          <p:cNvPr id="2059" name="Rectangle 2058">
+            <a:extLst>
+              <a:ext uri="{FF2B5EF4-FFF2-40B4-BE49-F238E27FC236}">
+                <a16:creationId xmlns:a16="http://schemas.microsoft.com/office/drawing/2014/main" id="{84A8DE83-DE75-4B41-9DB4-A7EC0B0DEC0B}"/>
+              </a:ext>
+              <a:ext uri="{C183D7F6-B498-43B3-948B-1728B52AA6E4}">
+                <adec:decorative xmlns:adec="http://schemas.microsoft.com/office/drawing/2017/decorative" val="1"/>
+              </a:ext>
+            </a:extLst>
+          </p:cNvPr>
+          <p:cNvSpPr>
+            <a:spLocks noGrp="1" noRot="1" noChangeAspect="1" noMove="1" noResize="1" noEditPoints="1" noAdjustHandles="1" noChangeArrowheads="1" noChangeShapeType="1" noTextEdit="1"/>
+          </p:cNvSpPr>
+          <p:nvPr>
+            <p:extLst>
+              <p:ext uri="{386F3935-93C4-4BCD-93E2-E3B085C9AB24}">
+                <p16:designElem xmlns:p16="http://schemas.microsoft.com/office/powerpoint/2015/main" val="1"/>
+              </p:ext>
+            </p:extLst>
+          </p:nvPr>
+        </p:nvSpPr>
+        <p:spPr>
+          <a:xfrm>
+            <a:off x="0" y="0"/>
+            <a:ext cx="8128856" cy="1575461"/>
+          </a:xfrm>
+          <a:prstGeom prst="rect">
+            <a:avLst/>
+          </a:prstGeom>
+          <a:gradFill>
+            <a:gsLst>
+              <a:gs pos="0">
+                <a:schemeClr val="accent1">
+                  <a:alpha val="41000"/>
+                </a:schemeClr>
+              </a:gs>
+              <a:gs pos="74000">
+                <a:schemeClr val="accent1">
+                  <a:lumMod val="60000"/>
+                  <a:lumOff val="40000"/>
+                  <a:alpha val="0"/>
+                </a:schemeClr>
+              </a:gs>
+            </a:gsLst>
+            <a:lin ang="8400000" scaled="0"/>
+          </a:gradFill>
+          <a:ln>
+            <a:noFill/>
+          </a:ln>
+        </p:spPr>
+        <p:style>
+          <a:lnRef idx="2">
+            <a:schemeClr val="accent1">
+              <a:shade val="50000"/>
+            </a:schemeClr>
+          </a:lnRef>
+          <a:fillRef idx="1">
+            <a:schemeClr val="accent1"/>
+          </a:fillRef>
+          <a:effectRef idx="0">
+            <a:schemeClr val="accent1"/>
+          </a:effectRef>
+          <a:fontRef idx="minor">
+            <a:schemeClr val="lt1"/>
+          </a:fontRef>
+        </p:style>
+        <p:txBody>
+          <a:bodyPr rtlCol="0" anchor="ctr"/>
+          <a:lstStyle/>
+          <a:p>
+            <a:pPr algn="ctr"/>
+            <a:endParaRPr lang="en-US"/>
+          </a:p>
+        </p:txBody>
+      </p:sp>
+      <p:sp>
+        <p:nvSpPr>
+          <p:cNvPr id="2061" name="Rectangle 2060">
+            <a:extLst>
+              <a:ext uri="{FF2B5EF4-FFF2-40B4-BE49-F238E27FC236}">
+                <a16:creationId xmlns:a16="http://schemas.microsoft.com/office/drawing/2014/main" id="{A7009A0A-BEF5-4EAC-AF15-E4F9F002E239}"/>
+              </a:ext>
+              <a:ext uri="{C183D7F6-B498-43B3-948B-1728B52AA6E4}">
+                <adec:decorative xmlns:adec="http://schemas.microsoft.com/office/drawing/2017/decorative" val="1"/>
+              </a:ext>
+            </a:extLst>
+          </p:cNvPr>
+          <p:cNvSpPr>
+            <a:spLocks noGrp="1" noRot="1" noChangeAspect="1" noMove="1" noResize="1" noEditPoints="1" noAdjustHandles="1" noChangeArrowheads="1" noChangeShapeType="1" noTextEdit="1"/>
+          </p:cNvSpPr>
+          <p:nvPr>
+            <p:extLst>
+              <p:ext uri="{386F3935-93C4-4BCD-93E2-E3B085C9AB24}">
+                <p16:designElem xmlns:p16="http://schemas.microsoft.com/office/powerpoint/2015/main" val="1"/>
+              </p:ext>
+            </p:extLst>
+          </p:nvPr>
+        </p:nvSpPr>
+        <p:spPr>
+          <a:xfrm flipH="1">
+            <a:off x="-3" y="-1"/>
+            <a:ext cx="12192002" cy="1574311"/>
+          </a:xfrm>
+          <a:prstGeom prst="rect">
+            <a:avLst/>
+          </a:prstGeom>
+          <a:gradFill>
+            <a:gsLst>
+              <a:gs pos="0">
+                <a:srgbClr val="000000">
+                  <a:alpha val="63000"/>
+                </a:srgbClr>
+              </a:gs>
+              <a:gs pos="78000">
+                <a:schemeClr val="accent1">
+                  <a:alpha val="15000"/>
+                </a:schemeClr>
+              </a:gs>
+            </a:gsLst>
+            <a:lin ang="15600000" scaled="0"/>
+          </a:gradFill>
+          <a:ln>
+            <a:noFill/>
+          </a:ln>
+        </p:spPr>
+        <p:style>
+          <a:lnRef idx="2">
+            <a:schemeClr val="accent1">
+              <a:shade val="50000"/>
+            </a:schemeClr>
+          </a:lnRef>
+          <a:fillRef idx="1">
+            <a:schemeClr val="accent1"/>
+          </a:fillRef>
+          <a:effectRef idx="0">
+            <a:schemeClr val="accent1"/>
+          </a:effectRef>
+          <a:fontRef idx="minor">
+            <a:schemeClr val="lt1"/>
+          </a:fontRef>
+        </p:style>
+        <p:txBody>
+          <a:bodyPr rtlCol="0" anchor="ctr"/>
+          <a:lstStyle/>
+          <a:p>
+            <a:pPr algn="ctr"/>
+            <a:endParaRPr lang="en-US"/>
+          </a:p>
+        </p:txBody>
+      </p:sp>
+      <p:sp>
+        <p:nvSpPr>
+          <p:cNvPr id="2" name="Título 1">
+            <a:extLst>
+              <a:ext uri="{FF2B5EF4-FFF2-40B4-BE49-F238E27FC236}">
+                <a16:creationId xmlns:a16="http://schemas.microsoft.com/office/drawing/2014/main" id="{9B2594E6-7212-20CD-338A-1C52F7F868FE}"/>
+              </a:ext>
+            </a:extLst>
+          </p:cNvPr>
+          <p:cNvSpPr>
+            <a:spLocks noGrp="1"/>
+          </p:cNvSpPr>
+          <p:nvPr>
+            <p:ph type="title"/>
+          </p:nvPr>
+        </p:nvSpPr>
+        <p:spPr>
+          <a:xfrm>
+            <a:off x="699713" y="248038"/>
+            <a:ext cx="7063721" cy="1159200"/>
+          </a:xfrm>
+        </p:spPr>
+        <p:txBody>
+          <a:bodyPr vert="horz" lIns="91440" tIns="45720" rIns="91440" bIns="45720" rtlCol="0" anchor="ctr">
+            <a:normAutofit/>
+          </a:bodyPr>
+          <a:lstStyle/>
+          <a:p>
+            <a:r>
+              <a:rPr lang="en-US" sz="4000" kern="1200" dirty="0">
+                <a:solidFill>
+                  <a:srgbClr val="FFFFFF"/>
+                </a:solidFill>
+                <a:latin typeface="+mj-lt"/>
+                <a:ea typeface="+mj-ea"/>
+                <a:cs typeface="+mj-cs"/>
+              </a:rPr>
+              <a:t>30 </a:t>
+            </a:r>
+            <a:r>
+              <a:rPr lang="en-US" sz="4000" kern="1200" dirty="0" err="1">
+                <a:solidFill>
+                  <a:srgbClr val="FFFFFF"/>
+                </a:solidFill>
+                <a:latin typeface="+mj-lt"/>
+                <a:ea typeface="+mj-ea"/>
+                <a:cs typeface="+mj-cs"/>
+              </a:rPr>
+              <a:t>Funciones</a:t>
+            </a:r>
+            <a:endParaRPr lang="en-US" sz="4000" kern="1200" dirty="0">
+              <a:solidFill>
+                <a:srgbClr val="FFFFFF"/>
+              </a:solidFill>
+              <a:latin typeface="+mj-lt"/>
+              <a:ea typeface="+mj-ea"/>
+              <a:cs typeface="+mj-cs"/>
+            </a:endParaRPr>
+          </a:p>
+        </p:txBody>
+      </p:sp>
+      <p:pic>
+        <p:nvPicPr>
+          <p:cNvPr id="4" name="Imagen 3">
+            <a:extLst>
+              <a:ext uri="{FF2B5EF4-FFF2-40B4-BE49-F238E27FC236}">
+                <a16:creationId xmlns:a16="http://schemas.microsoft.com/office/drawing/2014/main" id="{1625EE67-1F39-407A-BA27-3EC8CB5C65F9}"/>
+              </a:ext>
+            </a:extLst>
+          </p:cNvPr>
+          <p:cNvPicPr>
+            <a:picLocks noChangeAspect="1"/>
+          </p:cNvPicPr>
+          <p:nvPr/>
+        </p:nvPicPr>
+        <p:blipFill>
+          <a:blip r:embed="rId2"/>
+          <a:stretch>
+            <a:fillRect/>
+          </a:stretch>
+        </p:blipFill>
+        <p:spPr>
+          <a:xfrm>
+            <a:off x="1903655" y="1822348"/>
+            <a:ext cx="4092295" cy="4884843"/>
+          </a:xfrm>
+          <a:prstGeom prst="rect">
+            <a:avLst/>
+          </a:prstGeom>
+        </p:spPr>
+      </p:pic>
+      <p:pic>
+        <p:nvPicPr>
+          <p:cNvPr id="6" name="Imagen 5">
+            <a:extLst>
+              <a:ext uri="{FF2B5EF4-FFF2-40B4-BE49-F238E27FC236}">
+                <a16:creationId xmlns:a16="http://schemas.microsoft.com/office/drawing/2014/main" id="{3F0D0245-30F5-46D4-8AE9-A28D20EFAF60}"/>
+              </a:ext>
+            </a:extLst>
+          </p:cNvPr>
+          <p:cNvPicPr>
+            <a:picLocks noChangeAspect="1"/>
+          </p:cNvPicPr>
+          <p:nvPr/>
+        </p:nvPicPr>
+        <p:blipFill>
+          <a:blip r:embed="rId3"/>
+          <a:stretch>
+            <a:fillRect/>
+          </a:stretch>
+        </p:blipFill>
+        <p:spPr>
+          <a:xfrm>
+            <a:off x="7763434" y="1822347"/>
+            <a:ext cx="3220775" cy="4884843"/>
+          </a:xfrm>
+          <a:prstGeom prst="rect">
+            <a:avLst/>
+          </a:prstGeom>
+        </p:spPr>
+      </p:pic>
+    </p:spTree>
+    <p:extLst>
+      <p:ext uri="{BB962C8B-B14F-4D97-AF65-F5344CB8AC3E}">
+        <p14:creationId xmlns:p14="http://schemas.microsoft.com/office/powerpoint/2010/main" val="2962351529"/>
+      </p:ext>
+    </p:extLst>
+  </p:cSld>
+  <p:clrMapOvr>
+    <a:masterClrMapping/>
+  </p:clrMapOvr>
+  <mc:AlternateContent xmlns:mc="http://schemas.openxmlformats.org/markup-compatibility/2006">
+    <mc:Choice xmlns:p15="http://schemas.microsoft.com/office/powerpoint/2012/main" Requires="p15">
+      <p:transition xmlns:p14="http://schemas.microsoft.com/office/powerpoint/2010/main" spd="slow" p14:dur="2000">
+        <p15:prstTrans prst="prestige"/>
+      </p:transition>
+    </mc:Choice>
+    <mc:Fallback>
+      <p:transition spd="slow">
+        <p:fade/>
+      </p:transition>
+    </mc:Fallback>
+  </mc:AlternateContent>
+</p:sld>
+</file>
+
+<file path=ppt/slides/slide17.xml><?xml version="1.0" encoding="utf-8"?>
+<p:sld xmlns:a="http://schemas.openxmlformats.org/drawingml/2006/main" xmlns:r="http://schemas.openxmlformats.org/officeDocument/2006/relationships" xmlns:p="http://schemas.openxmlformats.org/presentationml/2006/main">
+  <p:cSld>
+    <p:bg>
+      <p:bgPr>
+        <a:solidFill>
+          <a:schemeClr val="bg1"/>
+        </a:solidFill>
+        <a:effectLst/>
+      </p:bgPr>
+    </p:bg>
+    <p:spTree>
+      <p:nvGrpSpPr>
+        <p:cNvPr id="1" name=""/>
+        <p:cNvGrpSpPr/>
+        <p:nvPr/>
+      </p:nvGrpSpPr>
+      <p:grpSpPr>
+        <a:xfrm>
+          <a:off x="0" y="0"/>
+          <a:ext cx="0" cy="0"/>
+          <a:chOff x="0" y="0"/>
+          <a:chExt cx="0" cy="0"/>
+        </a:xfrm>
+      </p:grpSpPr>
+      <p:sp useBgFill="1">
+        <p:nvSpPr>
+          <p:cNvPr id="2055" name="Rectangle 2054">
+            <a:extLst>
+              <a:ext uri="{FF2B5EF4-FFF2-40B4-BE49-F238E27FC236}">
+                <a16:creationId xmlns:a16="http://schemas.microsoft.com/office/drawing/2014/main" id="{A8384FB5-9ADC-4DDC-881B-597D56F5B15D}"/>
+              </a:ext>
+              <a:ext uri="{C183D7F6-B498-43B3-948B-1728B52AA6E4}">
+                <adec:decorative xmlns:adec="http://schemas.microsoft.com/office/drawing/2017/decorative" val="1"/>
+              </a:ext>
+            </a:extLst>
+          </p:cNvPr>
+          <p:cNvSpPr>
+            <a:spLocks noGrp="1" noRot="1" noChangeAspect="1" noMove="1" noResize="1" noEditPoints="1" noAdjustHandles="1" noChangeArrowheads="1" noChangeShapeType="1" noTextEdit="1"/>
+          </p:cNvSpPr>
+          <p:nvPr>
+            <p:extLst>
+              <p:ext uri="{386F3935-93C4-4BCD-93E2-E3B085C9AB24}">
+                <p16:designElem xmlns:p16="http://schemas.microsoft.com/office/powerpoint/2015/main" val="1"/>
+              </p:ext>
+            </p:extLst>
+          </p:nvPr>
+        </p:nvSpPr>
+        <p:spPr>
+          <a:xfrm>
+            <a:off x="0" y="0"/>
+            <a:ext cx="12192000" cy="6858000"/>
+          </a:xfrm>
+          <a:prstGeom prst="rect">
+            <a:avLst/>
+          </a:prstGeom>
+          <a:ln w="12700" cap="flat" cmpd="sng" algn="ctr">
+            <a:noFill/>
+            <a:prstDash val="solid"/>
+            <a:miter lim="800000"/>
+          </a:ln>
+          <a:effectLst/>
+          <a:extLst>
+            <a:ext uri="{91240B29-F687-4F45-9708-019B960494DF}">
+              <a14:hiddenLine xmlns:a14="http://schemas.microsoft.com/office/drawing/2010/main" w="12700" cap="flat" cmpd="sng" algn="ctr">
+                <a:solidFill>
+                  <a:schemeClr val="accent1">
+                    <a:shade val="50000"/>
+                  </a:schemeClr>
+                </a:solidFill>
+                <a:prstDash val="solid"/>
+                <a:miter lim="800000"/>
+              </a14:hiddenLine>
+            </a:ext>
+          </a:extLst>
+        </p:spPr>
+        <p:style>
+          <a:lnRef idx="2">
+            <a:schemeClr val="accent1">
+              <a:shade val="50000"/>
+            </a:schemeClr>
+          </a:lnRef>
+          <a:fillRef idx="1">
+            <a:schemeClr val="accent1"/>
+          </a:fillRef>
+          <a:effectRef idx="0">
+            <a:schemeClr val="accent1"/>
+          </a:effectRef>
+          <a:fontRef idx="minor">
+            <a:schemeClr val="lt1"/>
+          </a:fontRef>
+        </p:style>
+        <p:txBody>
+          <a:bodyPr rtlCol="0" anchor="ctr"/>
+          <a:lstStyle/>
+          <a:p>
+            <a:pPr algn="ctr"/>
+            <a:endParaRPr lang="en-US"/>
+          </a:p>
+        </p:txBody>
+      </p:sp>
+      <p:sp>
+        <p:nvSpPr>
+          <p:cNvPr id="2057" name="Rectangle 2056">
+            <a:extLst>
+              <a:ext uri="{FF2B5EF4-FFF2-40B4-BE49-F238E27FC236}">
+                <a16:creationId xmlns:a16="http://schemas.microsoft.com/office/drawing/2014/main" id="{1199E1B1-A8C0-4FE8-A5A8-1CB41D69F857}"/>
+              </a:ext>
+              <a:ext uri="{C183D7F6-B498-43B3-948B-1728B52AA6E4}">
+                <adec:decorative xmlns:adec="http://schemas.microsoft.com/office/drawing/2017/decorative" val="1"/>
+              </a:ext>
+            </a:extLst>
+          </p:cNvPr>
+          <p:cNvSpPr>
+            <a:spLocks noGrp="1" noRot="1" noChangeAspect="1" noMove="1" noResize="1" noEditPoints="1" noAdjustHandles="1" noChangeArrowheads="1" noChangeShapeType="1" noTextEdit="1"/>
+          </p:cNvSpPr>
+          <p:nvPr>
+            <p:extLst>
+              <p:ext uri="{386F3935-93C4-4BCD-93E2-E3B085C9AB24}">
+                <p16:designElem xmlns:p16="http://schemas.microsoft.com/office/powerpoint/2015/main" val="1"/>
+              </p:ext>
+            </p:extLst>
+          </p:nvPr>
+        </p:nvSpPr>
+        <p:spPr>
+          <a:xfrm rot="10800000" flipH="1">
+            <a:off x="2" y="0"/>
+            <a:ext cx="12191998" cy="1575955"/>
+          </a:xfrm>
+          <a:prstGeom prst="rect">
+            <a:avLst/>
+          </a:prstGeom>
+          <a:gradFill>
+            <a:gsLst>
+              <a:gs pos="0">
+                <a:srgbClr val="000000">
+                  <a:alpha val="96000"/>
+                </a:srgbClr>
+              </a:gs>
+              <a:gs pos="100000">
+                <a:schemeClr val="accent1">
+                  <a:lumMod val="75000"/>
+                </a:schemeClr>
+              </a:gs>
+            </a:gsLst>
+            <a:lin ang="6000000" scaled="0"/>
+          </a:gradFill>
+          <a:ln>
+            <a:noFill/>
+          </a:ln>
+        </p:spPr>
+        <p:style>
+          <a:lnRef idx="2">
+            <a:schemeClr val="accent1">
+              <a:shade val="50000"/>
+            </a:schemeClr>
+          </a:lnRef>
+          <a:fillRef idx="1">
+            <a:schemeClr val="accent1"/>
+          </a:fillRef>
+          <a:effectRef idx="0">
+            <a:schemeClr val="accent1"/>
+          </a:effectRef>
+          <a:fontRef idx="minor">
+            <a:schemeClr val="lt1"/>
+          </a:fontRef>
+        </p:style>
+        <p:txBody>
+          <a:bodyPr rtlCol="0" anchor="ctr"/>
+          <a:lstStyle/>
+          <a:p>
+            <a:pPr algn="ctr"/>
+            <a:endParaRPr lang="en-US"/>
+          </a:p>
+        </p:txBody>
+      </p:sp>
+      <p:sp>
+        <p:nvSpPr>
+          <p:cNvPr id="2059" name="Rectangle 2058">
+            <a:extLst>
+              <a:ext uri="{FF2B5EF4-FFF2-40B4-BE49-F238E27FC236}">
+                <a16:creationId xmlns:a16="http://schemas.microsoft.com/office/drawing/2014/main" id="{84A8DE83-DE75-4B41-9DB4-A7EC0B0DEC0B}"/>
+              </a:ext>
+              <a:ext uri="{C183D7F6-B498-43B3-948B-1728B52AA6E4}">
+                <adec:decorative xmlns:adec="http://schemas.microsoft.com/office/drawing/2017/decorative" val="1"/>
+              </a:ext>
+            </a:extLst>
+          </p:cNvPr>
+          <p:cNvSpPr>
+            <a:spLocks noGrp="1" noRot="1" noChangeAspect="1" noMove="1" noResize="1" noEditPoints="1" noAdjustHandles="1" noChangeArrowheads="1" noChangeShapeType="1" noTextEdit="1"/>
+          </p:cNvSpPr>
+          <p:nvPr>
+            <p:extLst>
+              <p:ext uri="{386F3935-93C4-4BCD-93E2-E3B085C9AB24}">
+                <p16:designElem xmlns:p16="http://schemas.microsoft.com/office/powerpoint/2015/main" val="1"/>
+              </p:ext>
+            </p:extLst>
+          </p:nvPr>
+        </p:nvSpPr>
+        <p:spPr>
+          <a:xfrm>
+            <a:off x="0" y="0"/>
+            <a:ext cx="8128856" cy="1575461"/>
+          </a:xfrm>
+          <a:prstGeom prst="rect">
+            <a:avLst/>
+          </a:prstGeom>
+          <a:gradFill>
+            <a:gsLst>
+              <a:gs pos="0">
+                <a:schemeClr val="accent1">
+                  <a:alpha val="41000"/>
+                </a:schemeClr>
+              </a:gs>
+              <a:gs pos="74000">
+                <a:schemeClr val="accent1">
+                  <a:lumMod val="60000"/>
+                  <a:lumOff val="40000"/>
+                  <a:alpha val="0"/>
+                </a:schemeClr>
+              </a:gs>
+            </a:gsLst>
+            <a:lin ang="8400000" scaled="0"/>
+          </a:gradFill>
+          <a:ln>
+            <a:noFill/>
+          </a:ln>
+        </p:spPr>
+        <p:style>
+          <a:lnRef idx="2">
+            <a:schemeClr val="accent1">
+              <a:shade val="50000"/>
+            </a:schemeClr>
+          </a:lnRef>
+          <a:fillRef idx="1">
+            <a:schemeClr val="accent1"/>
+          </a:fillRef>
+          <a:effectRef idx="0">
+            <a:schemeClr val="accent1"/>
+          </a:effectRef>
+          <a:fontRef idx="minor">
+            <a:schemeClr val="lt1"/>
+          </a:fontRef>
+        </p:style>
+        <p:txBody>
+          <a:bodyPr rtlCol="0" anchor="ctr"/>
+          <a:lstStyle/>
+          <a:p>
+            <a:pPr algn="ctr"/>
+            <a:endParaRPr lang="en-US"/>
+          </a:p>
+        </p:txBody>
+      </p:sp>
+      <p:sp>
+        <p:nvSpPr>
+          <p:cNvPr id="2061" name="Rectangle 2060">
+            <a:extLst>
+              <a:ext uri="{FF2B5EF4-FFF2-40B4-BE49-F238E27FC236}">
+                <a16:creationId xmlns:a16="http://schemas.microsoft.com/office/drawing/2014/main" id="{A7009A0A-BEF5-4EAC-AF15-E4F9F002E239}"/>
+              </a:ext>
+              <a:ext uri="{C183D7F6-B498-43B3-948B-1728B52AA6E4}">
+                <adec:decorative xmlns:adec="http://schemas.microsoft.com/office/drawing/2017/decorative" val="1"/>
+              </a:ext>
+            </a:extLst>
+          </p:cNvPr>
+          <p:cNvSpPr>
+            <a:spLocks noGrp="1" noRot="1" noChangeAspect="1" noMove="1" noResize="1" noEditPoints="1" noAdjustHandles="1" noChangeArrowheads="1" noChangeShapeType="1" noTextEdit="1"/>
+          </p:cNvSpPr>
+          <p:nvPr>
+            <p:extLst>
+              <p:ext uri="{386F3935-93C4-4BCD-93E2-E3B085C9AB24}">
+                <p16:designElem xmlns:p16="http://schemas.microsoft.com/office/powerpoint/2015/main" val="1"/>
+              </p:ext>
+            </p:extLst>
+          </p:nvPr>
+        </p:nvSpPr>
+        <p:spPr>
+          <a:xfrm flipH="1">
+            <a:off x="-3" y="-1"/>
+            <a:ext cx="12192002" cy="1574311"/>
+          </a:xfrm>
+          <a:prstGeom prst="rect">
+            <a:avLst/>
+          </a:prstGeom>
+          <a:gradFill>
+            <a:gsLst>
+              <a:gs pos="0">
+                <a:srgbClr val="000000">
+                  <a:alpha val="63000"/>
+                </a:srgbClr>
+              </a:gs>
+              <a:gs pos="78000">
+                <a:schemeClr val="accent1">
+                  <a:alpha val="15000"/>
+                </a:schemeClr>
+              </a:gs>
+            </a:gsLst>
+            <a:lin ang="15600000" scaled="0"/>
+          </a:gradFill>
+          <a:ln>
+            <a:noFill/>
+          </a:ln>
+        </p:spPr>
+        <p:style>
+          <a:lnRef idx="2">
+            <a:schemeClr val="accent1">
+              <a:shade val="50000"/>
+            </a:schemeClr>
+          </a:lnRef>
+          <a:fillRef idx="1">
+            <a:schemeClr val="accent1"/>
+          </a:fillRef>
+          <a:effectRef idx="0">
+            <a:schemeClr val="accent1"/>
+          </a:effectRef>
+          <a:fontRef idx="minor">
+            <a:schemeClr val="lt1"/>
+          </a:fontRef>
+        </p:style>
+        <p:txBody>
+          <a:bodyPr rtlCol="0" anchor="ctr"/>
+          <a:lstStyle/>
+          <a:p>
+            <a:pPr algn="ctr"/>
+            <a:endParaRPr lang="en-US"/>
+          </a:p>
+        </p:txBody>
+      </p:sp>
+      <p:sp>
+        <p:nvSpPr>
+          <p:cNvPr id="2" name="Título 1">
+            <a:extLst>
+              <a:ext uri="{FF2B5EF4-FFF2-40B4-BE49-F238E27FC236}">
+                <a16:creationId xmlns:a16="http://schemas.microsoft.com/office/drawing/2014/main" id="{9B2594E6-7212-20CD-338A-1C52F7F868FE}"/>
+              </a:ext>
+            </a:extLst>
+          </p:cNvPr>
+          <p:cNvSpPr>
+            <a:spLocks noGrp="1"/>
+          </p:cNvSpPr>
+          <p:nvPr>
+            <p:ph type="title"/>
+          </p:nvPr>
+        </p:nvSpPr>
+        <p:spPr>
+          <a:xfrm>
+            <a:off x="699713" y="248038"/>
+            <a:ext cx="7063721" cy="1159200"/>
+          </a:xfrm>
+        </p:spPr>
+        <p:txBody>
+          <a:bodyPr vert="horz" lIns="91440" tIns="45720" rIns="91440" bIns="45720" rtlCol="0" anchor="ctr">
+            <a:normAutofit/>
+          </a:bodyPr>
+          <a:lstStyle/>
+          <a:p>
+            <a:r>
+              <a:rPr lang="en-US" sz="4000" kern="1200" dirty="0">
+                <a:solidFill>
+                  <a:srgbClr val="FFFFFF"/>
+                </a:solidFill>
+                <a:latin typeface="+mj-lt"/>
+                <a:ea typeface="+mj-ea"/>
+                <a:cs typeface="+mj-cs"/>
+              </a:rPr>
+              <a:t>30 </a:t>
+            </a:r>
+            <a:r>
+              <a:rPr lang="en-US" sz="4000" kern="1200" dirty="0" err="1">
+                <a:solidFill>
+                  <a:srgbClr val="FFFFFF"/>
+                </a:solidFill>
+                <a:latin typeface="+mj-lt"/>
+                <a:ea typeface="+mj-ea"/>
+                <a:cs typeface="+mj-cs"/>
+              </a:rPr>
+              <a:t>Funciones</a:t>
+            </a:r>
+            <a:endParaRPr lang="en-US" sz="4000" kern="1200" dirty="0">
+              <a:solidFill>
+                <a:srgbClr val="FFFFFF"/>
+              </a:solidFill>
+              <a:latin typeface="+mj-lt"/>
+              <a:ea typeface="+mj-ea"/>
+              <a:cs typeface="+mj-cs"/>
+            </a:endParaRPr>
+          </a:p>
+        </p:txBody>
+      </p:sp>
+      <p:pic>
+        <p:nvPicPr>
+          <p:cNvPr id="4" name="Imagen 3">
+            <a:extLst>
+              <a:ext uri="{FF2B5EF4-FFF2-40B4-BE49-F238E27FC236}">
+                <a16:creationId xmlns:a16="http://schemas.microsoft.com/office/drawing/2014/main" id="{3895399A-99E8-4232-8CC2-6BEC7D725807}"/>
+              </a:ext>
+            </a:extLst>
+          </p:cNvPr>
+          <p:cNvPicPr>
+            <a:picLocks noChangeAspect="1"/>
+          </p:cNvPicPr>
+          <p:nvPr/>
+        </p:nvPicPr>
+        <p:blipFill>
+          <a:blip r:embed="rId2"/>
+          <a:stretch>
+            <a:fillRect/>
+          </a:stretch>
+        </p:blipFill>
+        <p:spPr>
+          <a:xfrm>
+            <a:off x="1958241" y="1851807"/>
+            <a:ext cx="3148387" cy="4758155"/>
+          </a:xfrm>
+          <a:prstGeom prst="rect">
+            <a:avLst/>
+          </a:prstGeom>
+        </p:spPr>
+      </p:pic>
+      <p:pic>
+        <p:nvPicPr>
+          <p:cNvPr id="8" name="Imagen 7">
+            <a:extLst>
+              <a:ext uri="{FF2B5EF4-FFF2-40B4-BE49-F238E27FC236}">
+                <a16:creationId xmlns:a16="http://schemas.microsoft.com/office/drawing/2014/main" id="{F12550F6-6128-44D5-9517-CF5CB78B9C0B}"/>
+              </a:ext>
+            </a:extLst>
+          </p:cNvPr>
+          <p:cNvPicPr>
+            <a:picLocks noChangeAspect="1"/>
+          </p:cNvPicPr>
+          <p:nvPr/>
+        </p:nvPicPr>
+        <p:blipFill rotWithShape="1">
+          <a:blip r:embed="rId3"/>
+          <a:srcRect b="29000"/>
+          <a:stretch/>
+        </p:blipFill>
+        <p:spPr>
+          <a:xfrm>
+            <a:off x="7763434" y="1712483"/>
+            <a:ext cx="3291983" cy="5006193"/>
+          </a:xfrm>
+          <a:prstGeom prst="rect">
+            <a:avLst/>
+          </a:prstGeom>
+        </p:spPr>
+      </p:pic>
+    </p:spTree>
+    <p:extLst>
+      <p:ext uri="{BB962C8B-B14F-4D97-AF65-F5344CB8AC3E}">
+        <p14:creationId xmlns:p14="http://schemas.microsoft.com/office/powerpoint/2010/main" val="4131603183"/>
+      </p:ext>
+    </p:extLst>
+  </p:cSld>
+  <p:clrMapOvr>
+    <a:masterClrMapping/>
+  </p:clrMapOvr>
+  <mc:AlternateContent xmlns:mc="http://schemas.openxmlformats.org/markup-compatibility/2006">
+    <mc:Choice xmlns:p15="http://schemas.microsoft.com/office/powerpoint/2012/main" Requires="p15">
+      <p:transition xmlns:p14="http://schemas.microsoft.com/office/powerpoint/2010/main" spd="slow" p14:dur="2000">
+        <p15:prstTrans prst="prestige"/>
+      </p:transition>
+    </mc:Choice>
+    <mc:Fallback>
+      <p:transition spd="slow">
+        <p:fade/>
+      </p:transition>
+    </mc:Fallback>
+  </mc:AlternateContent>
+</p:sld>
+</file>
+
+<file path=ppt/slides/slide18.xml><?xml version="1.0" encoding="utf-8"?>
+<p:sld xmlns:a="http://schemas.openxmlformats.org/drawingml/2006/main" xmlns:r="http://schemas.openxmlformats.org/officeDocument/2006/relationships" xmlns:p="http://schemas.openxmlformats.org/presentationml/2006/main">
+  <p:cSld>
+    <p:bg>
+      <p:bgPr>
+        <a:solidFill>
+          <a:schemeClr val="bg1"/>
+        </a:solidFill>
+        <a:effectLst/>
+      </p:bgPr>
+    </p:bg>
+    <p:spTree>
+      <p:nvGrpSpPr>
+        <p:cNvPr id="1" name=""/>
+        <p:cNvGrpSpPr/>
+        <p:nvPr/>
+      </p:nvGrpSpPr>
+      <p:grpSpPr>
+        <a:xfrm>
+          <a:off x="0" y="0"/>
+          <a:ext cx="0" cy="0"/>
+          <a:chOff x="0" y="0"/>
+          <a:chExt cx="0" cy="0"/>
+        </a:xfrm>
+      </p:grpSpPr>
+      <p:sp useBgFill="1">
+        <p:nvSpPr>
+          <p:cNvPr id="2055" name="Rectangle 2054">
+            <a:extLst>
+              <a:ext uri="{FF2B5EF4-FFF2-40B4-BE49-F238E27FC236}">
+                <a16:creationId xmlns:a16="http://schemas.microsoft.com/office/drawing/2014/main" id="{A8384FB5-9ADC-4DDC-881B-597D56F5B15D}"/>
+              </a:ext>
+              <a:ext uri="{C183D7F6-B498-43B3-948B-1728B52AA6E4}">
+                <adec:decorative xmlns:adec="http://schemas.microsoft.com/office/drawing/2017/decorative" val="1"/>
+              </a:ext>
+            </a:extLst>
+          </p:cNvPr>
+          <p:cNvSpPr>
+            <a:spLocks noGrp="1" noRot="1" noChangeAspect="1" noMove="1" noResize="1" noEditPoints="1" noAdjustHandles="1" noChangeArrowheads="1" noChangeShapeType="1" noTextEdit="1"/>
+          </p:cNvSpPr>
+          <p:nvPr>
+            <p:extLst>
+              <p:ext uri="{386F3935-93C4-4BCD-93E2-E3B085C9AB24}">
+                <p16:designElem xmlns:p16="http://schemas.microsoft.com/office/powerpoint/2015/main" val="1"/>
+              </p:ext>
+            </p:extLst>
+          </p:nvPr>
+        </p:nvSpPr>
+        <p:spPr>
+          <a:xfrm>
+            <a:off x="0" y="0"/>
+            <a:ext cx="12192000" cy="6858000"/>
+          </a:xfrm>
+          <a:prstGeom prst="rect">
+            <a:avLst/>
+          </a:prstGeom>
+          <a:ln w="12700" cap="flat" cmpd="sng" algn="ctr">
+            <a:noFill/>
+            <a:prstDash val="solid"/>
+            <a:miter lim="800000"/>
+          </a:ln>
+          <a:effectLst/>
+          <a:extLst>
+            <a:ext uri="{91240B29-F687-4F45-9708-019B960494DF}">
+              <a14:hiddenLine xmlns:a14="http://schemas.microsoft.com/office/drawing/2010/main" w="12700" cap="flat" cmpd="sng" algn="ctr">
+                <a:solidFill>
+                  <a:schemeClr val="accent1">
+                    <a:shade val="50000"/>
+                  </a:schemeClr>
+                </a:solidFill>
+                <a:prstDash val="solid"/>
+                <a:miter lim="800000"/>
+              </a14:hiddenLine>
+            </a:ext>
+          </a:extLst>
+        </p:spPr>
+        <p:style>
+          <a:lnRef idx="2">
+            <a:schemeClr val="accent1">
+              <a:shade val="50000"/>
+            </a:schemeClr>
+          </a:lnRef>
+          <a:fillRef idx="1">
+            <a:schemeClr val="accent1"/>
+          </a:fillRef>
+          <a:effectRef idx="0">
+            <a:schemeClr val="accent1"/>
+          </a:effectRef>
+          <a:fontRef idx="minor">
+            <a:schemeClr val="lt1"/>
+          </a:fontRef>
+        </p:style>
+        <p:txBody>
+          <a:bodyPr rtlCol="0" anchor="ctr"/>
+          <a:lstStyle/>
+          <a:p>
+            <a:pPr algn="ctr"/>
+            <a:endParaRPr lang="en-US"/>
+          </a:p>
+        </p:txBody>
+      </p:sp>
+      <p:sp>
+        <p:nvSpPr>
+          <p:cNvPr id="2057" name="Rectangle 2056">
+            <a:extLst>
+              <a:ext uri="{FF2B5EF4-FFF2-40B4-BE49-F238E27FC236}">
+                <a16:creationId xmlns:a16="http://schemas.microsoft.com/office/drawing/2014/main" id="{1199E1B1-A8C0-4FE8-A5A8-1CB41D69F857}"/>
+              </a:ext>
+              <a:ext uri="{C183D7F6-B498-43B3-948B-1728B52AA6E4}">
+                <adec:decorative xmlns:adec="http://schemas.microsoft.com/office/drawing/2017/decorative" val="1"/>
+              </a:ext>
+            </a:extLst>
+          </p:cNvPr>
+          <p:cNvSpPr>
+            <a:spLocks noGrp="1" noRot="1" noChangeAspect="1" noMove="1" noResize="1" noEditPoints="1" noAdjustHandles="1" noChangeArrowheads="1" noChangeShapeType="1" noTextEdit="1"/>
+          </p:cNvSpPr>
+          <p:nvPr>
+            <p:extLst>
+              <p:ext uri="{386F3935-93C4-4BCD-93E2-E3B085C9AB24}">
+                <p16:designElem xmlns:p16="http://schemas.microsoft.com/office/powerpoint/2015/main" val="1"/>
+              </p:ext>
+            </p:extLst>
+          </p:nvPr>
+        </p:nvSpPr>
+        <p:spPr>
+          <a:xfrm rot="10800000" flipH="1">
+            <a:off x="2" y="0"/>
+            <a:ext cx="12191998" cy="1575955"/>
+          </a:xfrm>
+          <a:prstGeom prst="rect">
+            <a:avLst/>
+          </a:prstGeom>
+          <a:gradFill>
+            <a:gsLst>
+              <a:gs pos="0">
+                <a:srgbClr val="000000">
+                  <a:alpha val="96000"/>
+                </a:srgbClr>
+              </a:gs>
+              <a:gs pos="100000">
+                <a:schemeClr val="accent1">
+                  <a:lumMod val="75000"/>
+                </a:schemeClr>
+              </a:gs>
+            </a:gsLst>
+            <a:lin ang="6000000" scaled="0"/>
+          </a:gradFill>
+          <a:ln>
+            <a:noFill/>
+          </a:ln>
+        </p:spPr>
+        <p:style>
+          <a:lnRef idx="2">
+            <a:schemeClr val="accent1">
+              <a:shade val="50000"/>
+            </a:schemeClr>
+          </a:lnRef>
+          <a:fillRef idx="1">
+            <a:schemeClr val="accent1"/>
+          </a:fillRef>
+          <a:effectRef idx="0">
+            <a:schemeClr val="accent1"/>
+          </a:effectRef>
+          <a:fontRef idx="minor">
+            <a:schemeClr val="lt1"/>
+          </a:fontRef>
+        </p:style>
+        <p:txBody>
+          <a:bodyPr rtlCol="0" anchor="ctr"/>
+          <a:lstStyle/>
+          <a:p>
+            <a:pPr algn="ctr"/>
+            <a:endParaRPr lang="en-US"/>
+          </a:p>
+        </p:txBody>
+      </p:sp>
+      <p:sp>
+        <p:nvSpPr>
+          <p:cNvPr id="2059" name="Rectangle 2058">
+            <a:extLst>
+              <a:ext uri="{FF2B5EF4-FFF2-40B4-BE49-F238E27FC236}">
+                <a16:creationId xmlns:a16="http://schemas.microsoft.com/office/drawing/2014/main" id="{84A8DE83-DE75-4B41-9DB4-A7EC0B0DEC0B}"/>
+              </a:ext>
+              <a:ext uri="{C183D7F6-B498-43B3-948B-1728B52AA6E4}">
+                <adec:decorative xmlns:adec="http://schemas.microsoft.com/office/drawing/2017/decorative" val="1"/>
+              </a:ext>
+            </a:extLst>
+          </p:cNvPr>
+          <p:cNvSpPr>
+            <a:spLocks noGrp="1" noRot="1" noChangeAspect="1" noMove="1" noResize="1" noEditPoints="1" noAdjustHandles="1" noChangeArrowheads="1" noChangeShapeType="1" noTextEdit="1"/>
+          </p:cNvSpPr>
+          <p:nvPr>
+            <p:extLst>
+              <p:ext uri="{386F3935-93C4-4BCD-93E2-E3B085C9AB24}">
+                <p16:designElem xmlns:p16="http://schemas.microsoft.com/office/powerpoint/2015/main" val="1"/>
+              </p:ext>
+            </p:extLst>
+          </p:nvPr>
+        </p:nvSpPr>
+        <p:spPr>
+          <a:xfrm>
+            <a:off x="0" y="0"/>
+            <a:ext cx="8128856" cy="1575461"/>
+          </a:xfrm>
+          <a:prstGeom prst="rect">
+            <a:avLst/>
+          </a:prstGeom>
+          <a:gradFill>
+            <a:gsLst>
+              <a:gs pos="0">
+                <a:schemeClr val="accent1">
+                  <a:alpha val="41000"/>
+                </a:schemeClr>
+              </a:gs>
+              <a:gs pos="74000">
+                <a:schemeClr val="accent1">
+                  <a:lumMod val="60000"/>
+                  <a:lumOff val="40000"/>
+                  <a:alpha val="0"/>
+                </a:schemeClr>
+              </a:gs>
+            </a:gsLst>
+            <a:lin ang="8400000" scaled="0"/>
+          </a:gradFill>
+          <a:ln>
+            <a:noFill/>
+          </a:ln>
+        </p:spPr>
+        <p:style>
+          <a:lnRef idx="2">
+            <a:schemeClr val="accent1">
+              <a:shade val="50000"/>
+            </a:schemeClr>
+          </a:lnRef>
+          <a:fillRef idx="1">
+            <a:schemeClr val="accent1"/>
+          </a:fillRef>
+          <a:effectRef idx="0">
+            <a:schemeClr val="accent1"/>
+          </a:effectRef>
+          <a:fontRef idx="minor">
+            <a:schemeClr val="lt1"/>
+          </a:fontRef>
+        </p:style>
+        <p:txBody>
+          <a:bodyPr rtlCol="0" anchor="ctr"/>
+          <a:lstStyle/>
+          <a:p>
+            <a:pPr algn="ctr"/>
+            <a:endParaRPr lang="en-US"/>
+          </a:p>
+        </p:txBody>
+      </p:sp>
+      <p:sp>
+        <p:nvSpPr>
+          <p:cNvPr id="2061" name="Rectangle 2060">
+            <a:extLst>
+              <a:ext uri="{FF2B5EF4-FFF2-40B4-BE49-F238E27FC236}">
+                <a16:creationId xmlns:a16="http://schemas.microsoft.com/office/drawing/2014/main" id="{A7009A0A-BEF5-4EAC-AF15-E4F9F002E239}"/>
+              </a:ext>
+              <a:ext uri="{C183D7F6-B498-43B3-948B-1728B52AA6E4}">
+                <adec:decorative xmlns:adec="http://schemas.microsoft.com/office/drawing/2017/decorative" val="1"/>
+              </a:ext>
+            </a:extLst>
+          </p:cNvPr>
+          <p:cNvSpPr>
+            <a:spLocks noGrp="1" noRot="1" noChangeAspect="1" noMove="1" noResize="1" noEditPoints="1" noAdjustHandles="1" noChangeArrowheads="1" noChangeShapeType="1" noTextEdit="1"/>
+          </p:cNvSpPr>
+          <p:nvPr>
+            <p:extLst>
+              <p:ext uri="{386F3935-93C4-4BCD-93E2-E3B085C9AB24}">
+                <p16:designElem xmlns:p16="http://schemas.microsoft.com/office/powerpoint/2015/main" val="1"/>
+              </p:ext>
+            </p:extLst>
+          </p:nvPr>
+        </p:nvSpPr>
+        <p:spPr>
+          <a:xfrm flipH="1">
+            <a:off x="-3" y="-1"/>
+            <a:ext cx="12192002" cy="1574311"/>
+          </a:xfrm>
+          <a:prstGeom prst="rect">
+            <a:avLst/>
+          </a:prstGeom>
+          <a:gradFill>
+            <a:gsLst>
+              <a:gs pos="0">
+                <a:srgbClr val="000000">
+                  <a:alpha val="63000"/>
+                </a:srgbClr>
+              </a:gs>
+              <a:gs pos="78000">
+                <a:schemeClr val="accent1">
+                  <a:alpha val="15000"/>
+                </a:schemeClr>
+              </a:gs>
+            </a:gsLst>
+            <a:lin ang="15600000" scaled="0"/>
+          </a:gradFill>
+          <a:ln>
+            <a:noFill/>
+          </a:ln>
+        </p:spPr>
+        <p:style>
+          <a:lnRef idx="2">
+            <a:schemeClr val="accent1">
+              <a:shade val="50000"/>
+            </a:schemeClr>
+          </a:lnRef>
+          <a:fillRef idx="1">
+            <a:schemeClr val="accent1"/>
+          </a:fillRef>
+          <a:effectRef idx="0">
+            <a:schemeClr val="accent1"/>
+          </a:effectRef>
+          <a:fontRef idx="minor">
+            <a:schemeClr val="lt1"/>
+          </a:fontRef>
+        </p:style>
+        <p:txBody>
+          <a:bodyPr rtlCol="0" anchor="ctr"/>
+          <a:lstStyle/>
+          <a:p>
+            <a:pPr algn="ctr"/>
+            <a:endParaRPr lang="en-US"/>
+          </a:p>
+        </p:txBody>
+      </p:sp>
+      <p:sp>
+        <p:nvSpPr>
+          <p:cNvPr id="2" name="Título 1">
+            <a:extLst>
+              <a:ext uri="{FF2B5EF4-FFF2-40B4-BE49-F238E27FC236}">
+                <a16:creationId xmlns:a16="http://schemas.microsoft.com/office/drawing/2014/main" id="{9B2594E6-7212-20CD-338A-1C52F7F868FE}"/>
+              </a:ext>
+            </a:extLst>
+          </p:cNvPr>
+          <p:cNvSpPr>
+            <a:spLocks noGrp="1"/>
+          </p:cNvSpPr>
+          <p:nvPr>
+            <p:ph type="title"/>
+          </p:nvPr>
+        </p:nvSpPr>
+        <p:spPr>
+          <a:xfrm>
+            <a:off x="699713" y="248038"/>
+            <a:ext cx="7063721" cy="1159200"/>
+          </a:xfrm>
+        </p:spPr>
+        <p:txBody>
+          <a:bodyPr vert="horz" lIns="91440" tIns="45720" rIns="91440" bIns="45720" rtlCol="0" anchor="ctr">
+            <a:normAutofit/>
+          </a:bodyPr>
+          <a:lstStyle/>
+          <a:p>
+            <a:r>
+              <a:rPr lang="en-US" sz="4000" kern="1200" dirty="0">
+                <a:solidFill>
+                  <a:srgbClr val="FFFFFF"/>
+                </a:solidFill>
+                <a:latin typeface="+mj-lt"/>
+                <a:ea typeface="+mj-ea"/>
+                <a:cs typeface="+mj-cs"/>
+              </a:rPr>
+              <a:t>30 </a:t>
+            </a:r>
+            <a:r>
+              <a:rPr lang="en-US" sz="4000" kern="1200" dirty="0" err="1">
+                <a:solidFill>
+                  <a:srgbClr val="FFFFFF"/>
+                </a:solidFill>
+                <a:latin typeface="+mj-lt"/>
+                <a:ea typeface="+mj-ea"/>
+                <a:cs typeface="+mj-cs"/>
+              </a:rPr>
+              <a:t>Funciones</a:t>
+            </a:r>
+            <a:endParaRPr lang="en-US" sz="4000" kern="1200" dirty="0">
+              <a:solidFill>
+                <a:srgbClr val="FFFFFF"/>
+              </a:solidFill>
+              <a:latin typeface="+mj-lt"/>
+              <a:ea typeface="+mj-ea"/>
+              <a:cs typeface="+mj-cs"/>
+            </a:endParaRPr>
+          </a:p>
+        </p:txBody>
+      </p:sp>
+      <p:pic>
+        <p:nvPicPr>
+          <p:cNvPr id="4" name="Imagen 3">
+            <a:extLst>
+              <a:ext uri="{FF2B5EF4-FFF2-40B4-BE49-F238E27FC236}">
+                <a16:creationId xmlns:a16="http://schemas.microsoft.com/office/drawing/2014/main" id="{0C66F312-7927-4BD1-9055-F9883D36BD95}"/>
+              </a:ext>
+            </a:extLst>
+          </p:cNvPr>
+          <p:cNvPicPr>
+            <a:picLocks noChangeAspect="1"/>
+          </p:cNvPicPr>
+          <p:nvPr/>
+        </p:nvPicPr>
+        <p:blipFill rotWithShape="1">
+          <a:blip r:embed="rId2"/>
+          <a:srcRect b="58519"/>
+          <a:stretch/>
+        </p:blipFill>
+        <p:spPr>
+          <a:xfrm>
+            <a:off x="465248" y="2030113"/>
+            <a:ext cx="5848251" cy="3888906"/>
+          </a:xfrm>
+          <a:prstGeom prst="rect">
+            <a:avLst/>
+          </a:prstGeom>
+        </p:spPr>
+      </p:pic>
+      <p:pic>
+        <p:nvPicPr>
+          <p:cNvPr id="6" name="Imagen 5">
+            <a:extLst>
+              <a:ext uri="{FF2B5EF4-FFF2-40B4-BE49-F238E27FC236}">
+                <a16:creationId xmlns:a16="http://schemas.microsoft.com/office/drawing/2014/main" id="{FAB4AFE7-842B-4AC7-8552-277CB09C43A8}"/>
+              </a:ext>
+            </a:extLst>
+          </p:cNvPr>
+          <p:cNvPicPr>
+            <a:picLocks noChangeAspect="1"/>
+          </p:cNvPicPr>
+          <p:nvPr/>
+        </p:nvPicPr>
+        <p:blipFill rotWithShape="1">
+          <a:blip r:embed="rId2"/>
+          <a:srcRect t="40714"/>
+          <a:stretch/>
+        </p:blipFill>
+        <p:spPr>
+          <a:xfrm>
+            <a:off x="6778747" y="1822348"/>
+            <a:ext cx="5039627" cy="4789569"/>
+          </a:xfrm>
+          <a:prstGeom prst="rect">
+            <a:avLst/>
+          </a:prstGeom>
+        </p:spPr>
+      </p:pic>
+    </p:spTree>
+    <p:extLst>
+      <p:ext uri="{BB962C8B-B14F-4D97-AF65-F5344CB8AC3E}">
+        <p14:creationId xmlns:p14="http://schemas.microsoft.com/office/powerpoint/2010/main" val="1460868720"/>
+      </p:ext>
+    </p:extLst>
+  </p:cSld>
+  <p:clrMapOvr>
+    <a:masterClrMapping/>
+  </p:clrMapOvr>
+  <mc:AlternateContent xmlns:mc="http://schemas.openxmlformats.org/markup-compatibility/2006">
+    <mc:Choice xmlns:p15="http://schemas.microsoft.com/office/powerpoint/2012/main" Requires="p15">
+      <p:transition xmlns:p14="http://schemas.microsoft.com/office/powerpoint/2010/main" spd="slow" p14:dur="2000">
+        <p15:prstTrans prst="prestige"/>
+      </p:transition>
+    </mc:Choice>
+    <mc:Fallback>
+      <p:transition spd="slow">
+        <p:fade/>
+      </p:transition>
+    </mc:Fallback>
+  </mc:AlternateContent>
+</p:sld>
+</file>
+
 <file path=ppt/slides/slide2.xml><?xml version="1.0" encoding="utf-8"?>
 <p:sld xmlns:a="http://schemas.openxmlformats.org/drawingml/2006/main" xmlns:r="http://schemas.openxmlformats.org/officeDocument/2006/relationships" xmlns:p="http://schemas.openxmlformats.org/presentationml/2006/main">
   <p:cSld>

</xml_diff>

<commit_message>
ultimas cositas de las diapositivas:p
</commit_message>
<xml_diff>
--- a/Taller Nicolas Hoyos  y Mariana Gomez.pptx
+++ b/Taller Nicolas Hoyos  y Mariana Gomez.pptx
@@ -24654,13 +24654,13 @@
   <p:clrMapOvr>
     <a:masterClrMapping/>
   </p:clrMapOvr>
-  <mc:AlternateContent xmlns:mc="http://schemas.openxmlformats.org/markup-compatibility/2006">
-    <mc:Choice xmlns:p15="http://schemas.microsoft.com/office/powerpoint/2012/main" Requires="p15">
+  <mc:AlternateContent xmlns:mc="http://schemas.openxmlformats.org/markup-compatibility/2006" xmlns:p15="http://schemas.microsoft.com/office/powerpoint/2012/main">
+    <mc:Choice Requires="p15">
       <p:transition xmlns:p14="http://schemas.microsoft.com/office/powerpoint/2010/main" spd="slow" p14:dur="2000">
         <p15:prstTrans prst="prestige"/>
       </p:transition>
     </mc:Choice>
-    <mc:Fallback>
+    <mc:Fallback xmlns="">
       <p:transition spd="slow">
         <p:fade/>
       </p:transition>
@@ -25128,13 +25128,13 @@
   <p:clrMapOvr>
     <a:masterClrMapping/>
   </p:clrMapOvr>
-  <mc:AlternateContent xmlns:mc="http://schemas.openxmlformats.org/markup-compatibility/2006">
-    <mc:Choice xmlns:p15="http://schemas.microsoft.com/office/powerpoint/2012/main" Requires="p15">
+  <mc:AlternateContent xmlns:mc="http://schemas.openxmlformats.org/markup-compatibility/2006" xmlns:p15="http://schemas.microsoft.com/office/powerpoint/2012/main">
+    <mc:Choice Requires="p15">
       <p:transition xmlns:p14="http://schemas.microsoft.com/office/powerpoint/2010/main" spd="slow" p14:dur="2000">
         <p15:prstTrans prst="prestige"/>
       </p:transition>
     </mc:Choice>
-    <mc:Fallback>
+    <mc:Fallback xmlns="">
       <p:transition spd="slow">
         <p:fade/>
       </p:transition>
@@ -25602,13 +25602,13 @@
   <p:clrMapOvr>
     <a:masterClrMapping/>
   </p:clrMapOvr>
-  <mc:AlternateContent xmlns:mc="http://schemas.openxmlformats.org/markup-compatibility/2006">
-    <mc:Choice xmlns:p15="http://schemas.microsoft.com/office/powerpoint/2012/main" Requires="p15">
+  <mc:AlternateContent xmlns:mc="http://schemas.openxmlformats.org/markup-compatibility/2006" xmlns:p15="http://schemas.microsoft.com/office/powerpoint/2012/main">
+    <mc:Choice Requires="p15">
       <p:transition xmlns:p14="http://schemas.microsoft.com/office/powerpoint/2010/main" spd="slow" p14:dur="2000">
         <p15:prstTrans prst="prestige"/>
       </p:transition>
     </mc:Choice>
-    <mc:Fallback>
+    <mc:Fallback xmlns="">
       <p:transition spd="slow">
         <p:fade/>
       </p:transition>
@@ -26075,13 +26075,13 @@
   <p:clrMapOvr>
     <a:masterClrMapping/>
   </p:clrMapOvr>
-  <mc:AlternateContent xmlns:mc="http://schemas.openxmlformats.org/markup-compatibility/2006">
-    <mc:Choice xmlns:p15="http://schemas.microsoft.com/office/powerpoint/2012/main" Requires="p15">
+  <mc:AlternateContent xmlns:mc="http://schemas.openxmlformats.org/markup-compatibility/2006" xmlns:p15="http://schemas.microsoft.com/office/powerpoint/2012/main">
+    <mc:Choice Requires="p15">
       <p:transition xmlns:p14="http://schemas.microsoft.com/office/powerpoint/2010/main" spd="slow" p14:dur="2000">
         <p15:prstTrans prst="prestige"/>
       </p:transition>
     </mc:Choice>
-    <mc:Fallback>
+    <mc:Fallback xmlns="">
       <p:transition spd="slow">
         <p:fade/>
       </p:transition>
@@ -26547,13 +26547,13 @@
   <p:clrMapOvr>
     <a:masterClrMapping/>
   </p:clrMapOvr>
-  <mc:AlternateContent xmlns:mc="http://schemas.openxmlformats.org/markup-compatibility/2006">
-    <mc:Choice xmlns:p15="http://schemas.microsoft.com/office/powerpoint/2012/main" Requires="p15">
+  <mc:AlternateContent xmlns:mc="http://schemas.openxmlformats.org/markup-compatibility/2006" xmlns:p15="http://schemas.microsoft.com/office/powerpoint/2012/main">
+    <mc:Choice Requires="p15">
       <p:transition xmlns:p14="http://schemas.microsoft.com/office/powerpoint/2010/main" spd="slow" p14:dur="2000">
         <p15:prstTrans prst="prestige"/>
       </p:transition>
     </mc:Choice>
-    <mc:Fallback>
+    <mc:Fallback xmlns="">
       <p:transition spd="slow">
         <p:fade/>
       </p:transition>
@@ -28438,7 +28438,7 @@
         </p:nvSpPr>
         <p:spPr>
           <a:xfrm>
-            <a:off x="1371597" y="348865"/>
+            <a:off x="1371597" y="378362"/>
             <a:ext cx="10044023" cy="877729"/>
           </a:xfrm>
         </p:spPr>
@@ -29561,14 +29561,30 @@
           <a:lstStyle/>
           <a:p>
             <a:r>
-              <a:rPr lang="es-CO" sz="4000">
+              <a:rPr lang="es-CO" sz="4000" dirty="0">
                 <a:solidFill>
                   <a:srgbClr val="FFFFFF"/>
                 </a:solidFill>
               </a:rPr>
-              <a:t>¿Qué es un singleton?</a:t>
+              <a:t>3. ¿Qué es un </a:t>
             </a:r>
-            <a:endParaRPr lang="es-ES" sz="4000">
+            <a:r>
+              <a:rPr lang="es-CO" sz="4000" dirty="0" err="1">
+                <a:solidFill>
+                  <a:srgbClr val="FFFFFF"/>
+                </a:solidFill>
+              </a:rPr>
+              <a:t>singleton</a:t>
+            </a:r>
+            <a:r>
+              <a:rPr lang="es-CO" sz="4000" dirty="0">
+                <a:solidFill>
+                  <a:srgbClr val="FFFFFF"/>
+                </a:solidFill>
+              </a:rPr>
+              <a:t>?</a:t>
+            </a:r>
+            <a:endParaRPr lang="es-ES" sz="4000" dirty="0">
               <a:solidFill>
                 <a:srgbClr val="FFFFFF"/>
               </a:solidFill>
@@ -30593,14 +30609,14 @@
           <a:lstStyle/>
           <a:p>
             <a:r>
-              <a:rPr lang="es-CO" sz="4000">
+              <a:rPr lang="es-CO" sz="4000" dirty="0">
                 <a:solidFill>
                   <a:srgbClr val="FFFFFF"/>
                 </a:solidFill>
               </a:rPr>
-              <a:t>Implementación en C# y Unity</a:t>
+              <a:t> Implementación en C# y Unity</a:t>
             </a:r>
-            <a:endParaRPr lang="es-ES" sz="4000">
+            <a:endParaRPr lang="es-ES" sz="4000" dirty="0">
               <a:solidFill>
                 <a:srgbClr val="FFFFFF"/>
               </a:solidFill>

</xml_diff>